<commit_message>
design: Add SSD array design
</commit_message>
<xml_diff>
--- a/figures/figures.pptx
+++ b/figures/figures.pptx
@@ -4,8 +4,13 @@
   <p:sldMasterIdLst>
     <p:sldMasterId id="2147483648" r:id="rId1"/>
   </p:sldMasterIdLst>
+  <p:notesMasterIdLst>
+    <p:notesMasterId r:id="rId5"/>
+  </p:notesMasterIdLst>
   <p:sldIdLst>
     <p:sldId id="256" r:id="rId2"/>
+    <p:sldId id="257" r:id="rId3"/>
+    <p:sldId id="258" r:id="rId4"/>
   </p:sldIdLst>
   <p:sldSz cx="12192000" cy="6858000"/>
   <p:notesSz cx="6858000" cy="9144000"/>
@@ -104,7 +109,446 @@
       </a:defRPr>
     </a:lvl9pPr>
   </p:defaultTextStyle>
+  <p:extLst>
+    <p:ext uri="{EFAFB233-063F-42B5-8137-9DF3F51BA10A}">
+      <p15:sldGuideLst xmlns:p15="http://schemas.microsoft.com/office/powerpoint/2012/main"/>
+    </p:ext>
+  </p:extLst>
 </p:presentation>
+</file>
+
+<file path=ppt/notesMasters/notesMaster1.xml><?xml version="1.0" encoding="utf-8"?>
+<p:notesMaster xmlns:a="http://schemas.openxmlformats.org/drawingml/2006/main" xmlns:r="http://schemas.openxmlformats.org/officeDocument/2006/relationships" xmlns:p="http://schemas.openxmlformats.org/presentationml/2006/main">
+  <p:cSld>
+    <p:bg>
+      <p:bgRef idx="1001">
+        <a:schemeClr val="bg1"/>
+      </p:bgRef>
+    </p:bg>
+    <p:spTree>
+      <p:nvGrpSpPr>
+        <p:cNvPr id="1" name=""/>
+        <p:cNvGrpSpPr/>
+        <p:nvPr/>
+      </p:nvGrpSpPr>
+      <p:grpSpPr>
+        <a:xfrm>
+          <a:off x="0" y="0"/>
+          <a:ext cx="0" cy="0"/>
+          <a:chOff x="0" y="0"/>
+          <a:chExt cx="0" cy="0"/>
+        </a:xfrm>
+      </p:grpSpPr>
+      <p:sp>
+        <p:nvSpPr>
+          <p:cNvPr id="2" name="Header Placeholder 1"/>
+          <p:cNvSpPr>
+            <a:spLocks noGrp="1"/>
+          </p:cNvSpPr>
+          <p:nvPr>
+            <p:ph type="hdr" sz="quarter"/>
+          </p:nvPr>
+        </p:nvSpPr>
+        <p:spPr>
+          <a:xfrm>
+            <a:off x="0" y="0"/>
+            <a:ext cx="2971800" cy="458788"/>
+          </a:xfrm>
+          <a:prstGeom prst="rect">
+            <a:avLst/>
+          </a:prstGeom>
+        </p:spPr>
+        <p:txBody>
+          <a:bodyPr vert="horz" lIns="91440" tIns="45720" rIns="91440" bIns="45720" rtlCol="0"/>
+          <a:lstStyle>
+            <a:lvl1pPr algn="l">
+              <a:defRPr sz="1200"/>
+            </a:lvl1pPr>
+          </a:lstStyle>
+          <a:p>
+            <a:endParaRPr lang="en-CN"/>
+          </a:p>
+        </p:txBody>
+      </p:sp>
+      <p:sp>
+        <p:nvSpPr>
+          <p:cNvPr id="3" name="Date Placeholder 2"/>
+          <p:cNvSpPr>
+            <a:spLocks noGrp="1"/>
+          </p:cNvSpPr>
+          <p:nvPr>
+            <p:ph type="dt" idx="1"/>
+          </p:nvPr>
+        </p:nvSpPr>
+        <p:spPr>
+          <a:xfrm>
+            <a:off x="3884613" y="0"/>
+            <a:ext cx="2971800" cy="458788"/>
+          </a:xfrm>
+          <a:prstGeom prst="rect">
+            <a:avLst/>
+          </a:prstGeom>
+        </p:spPr>
+        <p:txBody>
+          <a:bodyPr vert="horz" lIns="91440" tIns="45720" rIns="91440" bIns="45720" rtlCol="0"/>
+          <a:lstStyle>
+            <a:lvl1pPr algn="r">
+              <a:defRPr sz="1200"/>
+            </a:lvl1pPr>
+          </a:lstStyle>
+          <a:p>
+            <a:fld id="{141DAA26-AA5C-CB41-A82C-69F7CA60948D}" type="datetimeFigureOut">
+              <a:rPr lang="en-CN" smtClean="0"/>
+              <a:t>2021/5/9</a:t>
+            </a:fld>
+            <a:endParaRPr lang="en-CN"/>
+          </a:p>
+        </p:txBody>
+      </p:sp>
+      <p:sp>
+        <p:nvSpPr>
+          <p:cNvPr id="4" name="Slide Image Placeholder 3"/>
+          <p:cNvSpPr>
+            <a:spLocks noGrp="1" noRot="1" noChangeAspect="1"/>
+          </p:cNvSpPr>
+          <p:nvPr>
+            <p:ph type="sldImg" idx="2"/>
+          </p:nvPr>
+        </p:nvSpPr>
+        <p:spPr>
+          <a:xfrm>
+            <a:off x="685800" y="1143000"/>
+            <a:ext cx="5486400" cy="3086100"/>
+          </a:xfrm>
+          <a:prstGeom prst="rect">
+            <a:avLst/>
+          </a:prstGeom>
+          <a:noFill/>
+          <a:ln w="12700">
+            <a:solidFill>
+              <a:prstClr val="black"/>
+            </a:solidFill>
+          </a:ln>
+        </p:spPr>
+        <p:txBody>
+          <a:bodyPr vert="horz" lIns="91440" tIns="45720" rIns="91440" bIns="45720" rtlCol="0" anchor="ctr"/>
+          <a:lstStyle/>
+          <a:p>
+            <a:endParaRPr lang="en-CN"/>
+          </a:p>
+        </p:txBody>
+      </p:sp>
+      <p:sp>
+        <p:nvSpPr>
+          <p:cNvPr id="5" name="Notes Placeholder 4"/>
+          <p:cNvSpPr>
+            <a:spLocks noGrp="1"/>
+          </p:cNvSpPr>
+          <p:nvPr>
+            <p:ph type="body" sz="quarter" idx="3"/>
+          </p:nvPr>
+        </p:nvSpPr>
+        <p:spPr>
+          <a:xfrm>
+            <a:off x="685800" y="4400550"/>
+            <a:ext cx="5486400" cy="3600450"/>
+          </a:xfrm>
+          <a:prstGeom prst="rect">
+            <a:avLst/>
+          </a:prstGeom>
+        </p:spPr>
+        <p:txBody>
+          <a:bodyPr vert="horz" lIns="91440" tIns="45720" rIns="91440" bIns="45720" rtlCol="0"/>
+          <a:lstStyle/>
+          <a:p>
+            <a:pPr lvl="0"/>
+            <a:r>
+              <a:rPr lang="en-US"/>
+              <a:t>Click to edit Master text styles</a:t>
+            </a:r>
+          </a:p>
+          <a:p>
+            <a:pPr lvl="1"/>
+            <a:r>
+              <a:rPr lang="en-US"/>
+              <a:t>Second level</a:t>
+            </a:r>
+          </a:p>
+          <a:p>
+            <a:pPr lvl="2"/>
+            <a:r>
+              <a:rPr lang="en-US"/>
+              <a:t>Third level</a:t>
+            </a:r>
+          </a:p>
+          <a:p>
+            <a:pPr lvl="3"/>
+            <a:r>
+              <a:rPr lang="en-US"/>
+              <a:t>Fourth level</a:t>
+            </a:r>
+          </a:p>
+          <a:p>
+            <a:pPr lvl="4"/>
+            <a:r>
+              <a:rPr lang="en-US"/>
+              <a:t>Fifth level</a:t>
+            </a:r>
+            <a:endParaRPr lang="en-CN"/>
+          </a:p>
+        </p:txBody>
+      </p:sp>
+      <p:sp>
+        <p:nvSpPr>
+          <p:cNvPr id="6" name="Footer Placeholder 5"/>
+          <p:cNvSpPr>
+            <a:spLocks noGrp="1"/>
+          </p:cNvSpPr>
+          <p:nvPr>
+            <p:ph type="ftr" sz="quarter" idx="4"/>
+          </p:nvPr>
+        </p:nvSpPr>
+        <p:spPr>
+          <a:xfrm>
+            <a:off x="0" y="8685213"/>
+            <a:ext cx="2971800" cy="458787"/>
+          </a:xfrm>
+          <a:prstGeom prst="rect">
+            <a:avLst/>
+          </a:prstGeom>
+        </p:spPr>
+        <p:txBody>
+          <a:bodyPr vert="horz" lIns="91440" tIns="45720" rIns="91440" bIns="45720" rtlCol="0" anchor="b"/>
+          <a:lstStyle>
+            <a:lvl1pPr algn="l">
+              <a:defRPr sz="1200"/>
+            </a:lvl1pPr>
+          </a:lstStyle>
+          <a:p>
+            <a:endParaRPr lang="en-CN"/>
+          </a:p>
+        </p:txBody>
+      </p:sp>
+      <p:sp>
+        <p:nvSpPr>
+          <p:cNvPr id="7" name="Slide Number Placeholder 6"/>
+          <p:cNvSpPr>
+            <a:spLocks noGrp="1"/>
+          </p:cNvSpPr>
+          <p:nvPr>
+            <p:ph type="sldNum" sz="quarter" idx="5"/>
+          </p:nvPr>
+        </p:nvSpPr>
+        <p:spPr>
+          <a:xfrm>
+            <a:off x="3884613" y="8685213"/>
+            <a:ext cx="2971800" cy="458787"/>
+          </a:xfrm>
+          <a:prstGeom prst="rect">
+            <a:avLst/>
+          </a:prstGeom>
+        </p:spPr>
+        <p:txBody>
+          <a:bodyPr vert="horz" lIns="91440" tIns="45720" rIns="91440" bIns="45720" rtlCol="0" anchor="b"/>
+          <a:lstStyle>
+            <a:lvl1pPr algn="r">
+              <a:defRPr sz="1200"/>
+            </a:lvl1pPr>
+          </a:lstStyle>
+          <a:p>
+            <a:fld id="{6C66B177-17C8-644D-8D2B-8EF5E3597B0D}" type="slidenum">
+              <a:rPr lang="en-CN" smtClean="0"/>
+              <a:t>‹#›</a:t>
+            </a:fld>
+            <a:endParaRPr lang="en-CN"/>
+          </a:p>
+        </p:txBody>
+      </p:sp>
+    </p:spTree>
+    <p:extLst>
+      <p:ext uri="{BB962C8B-B14F-4D97-AF65-F5344CB8AC3E}">
+        <p14:creationId xmlns:p14="http://schemas.microsoft.com/office/powerpoint/2010/main" val="3685848040"/>
+      </p:ext>
+    </p:extLst>
+  </p:cSld>
+  <p:clrMap bg1="lt1" tx1="dk1" bg2="lt2" tx2="dk2" accent1="accent1" accent2="accent2" accent3="accent3" accent4="accent4" accent5="accent5" accent6="accent6" hlink="hlink" folHlink="folHlink"/>
+  <p:notesStyle>
+    <a:lvl1pPr marL="0" algn="l" defTabSz="914400" rtl="0" eaLnBrk="1" latinLnBrk="0" hangingPunct="1">
+      <a:defRPr sz="1200" kern="1200">
+        <a:solidFill>
+          <a:schemeClr val="tx1"/>
+        </a:solidFill>
+        <a:latin typeface="+mn-lt"/>
+        <a:ea typeface="+mn-ea"/>
+        <a:cs typeface="+mn-cs"/>
+      </a:defRPr>
+    </a:lvl1pPr>
+    <a:lvl2pPr marL="457200" algn="l" defTabSz="914400" rtl="0" eaLnBrk="1" latinLnBrk="0" hangingPunct="1">
+      <a:defRPr sz="1200" kern="1200">
+        <a:solidFill>
+          <a:schemeClr val="tx1"/>
+        </a:solidFill>
+        <a:latin typeface="+mn-lt"/>
+        <a:ea typeface="+mn-ea"/>
+        <a:cs typeface="+mn-cs"/>
+      </a:defRPr>
+    </a:lvl2pPr>
+    <a:lvl3pPr marL="914400" algn="l" defTabSz="914400" rtl="0" eaLnBrk="1" latinLnBrk="0" hangingPunct="1">
+      <a:defRPr sz="1200" kern="1200">
+        <a:solidFill>
+          <a:schemeClr val="tx1"/>
+        </a:solidFill>
+        <a:latin typeface="+mn-lt"/>
+        <a:ea typeface="+mn-ea"/>
+        <a:cs typeface="+mn-cs"/>
+      </a:defRPr>
+    </a:lvl3pPr>
+    <a:lvl4pPr marL="1371600" algn="l" defTabSz="914400" rtl="0" eaLnBrk="1" latinLnBrk="0" hangingPunct="1">
+      <a:defRPr sz="1200" kern="1200">
+        <a:solidFill>
+          <a:schemeClr val="tx1"/>
+        </a:solidFill>
+        <a:latin typeface="+mn-lt"/>
+        <a:ea typeface="+mn-ea"/>
+        <a:cs typeface="+mn-cs"/>
+      </a:defRPr>
+    </a:lvl4pPr>
+    <a:lvl5pPr marL="1828800" algn="l" defTabSz="914400" rtl="0" eaLnBrk="1" latinLnBrk="0" hangingPunct="1">
+      <a:defRPr sz="1200" kern="1200">
+        <a:solidFill>
+          <a:schemeClr val="tx1"/>
+        </a:solidFill>
+        <a:latin typeface="+mn-lt"/>
+        <a:ea typeface="+mn-ea"/>
+        <a:cs typeface="+mn-cs"/>
+      </a:defRPr>
+    </a:lvl5pPr>
+    <a:lvl6pPr marL="2286000" algn="l" defTabSz="914400" rtl="0" eaLnBrk="1" latinLnBrk="0" hangingPunct="1">
+      <a:defRPr sz="1200" kern="1200">
+        <a:solidFill>
+          <a:schemeClr val="tx1"/>
+        </a:solidFill>
+        <a:latin typeface="+mn-lt"/>
+        <a:ea typeface="+mn-ea"/>
+        <a:cs typeface="+mn-cs"/>
+      </a:defRPr>
+    </a:lvl6pPr>
+    <a:lvl7pPr marL="2743200" algn="l" defTabSz="914400" rtl="0" eaLnBrk="1" latinLnBrk="0" hangingPunct="1">
+      <a:defRPr sz="1200" kern="1200">
+        <a:solidFill>
+          <a:schemeClr val="tx1"/>
+        </a:solidFill>
+        <a:latin typeface="+mn-lt"/>
+        <a:ea typeface="+mn-ea"/>
+        <a:cs typeface="+mn-cs"/>
+      </a:defRPr>
+    </a:lvl7pPr>
+    <a:lvl8pPr marL="3200400" algn="l" defTabSz="914400" rtl="0" eaLnBrk="1" latinLnBrk="0" hangingPunct="1">
+      <a:defRPr sz="1200" kern="1200">
+        <a:solidFill>
+          <a:schemeClr val="tx1"/>
+        </a:solidFill>
+        <a:latin typeface="+mn-lt"/>
+        <a:ea typeface="+mn-ea"/>
+        <a:cs typeface="+mn-cs"/>
+      </a:defRPr>
+    </a:lvl8pPr>
+    <a:lvl9pPr marL="3657600" algn="l" defTabSz="914400" rtl="0" eaLnBrk="1" latinLnBrk="0" hangingPunct="1">
+      <a:defRPr sz="1200" kern="1200">
+        <a:solidFill>
+          <a:schemeClr val="tx1"/>
+        </a:solidFill>
+        <a:latin typeface="+mn-lt"/>
+        <a:ea typeface="+mn-ea"/>
+        <a:cs typeface="+mn-cs"/>
+      </a:defRPr>
+    </a:lvl9pPr>
+  </p:notesStyle>
+</p:notesMaster>
+</file>
+
+<file path=ppt/notesSlides/notesSlide1.xml><?xml version="1.0" encoding="utf-8"?>
+<p:notes xmlns:a="http://schemas.openxmlformats.org/drawingml/2006/main" xmlns:r="http://schemas.openxmlformats.org/officeDocument/2006/relationships" xmlns:p="http://schemas.openxmlformats.org/presentationml/2006/main">
+  <p:cSld>
+    <p:spTree>
+      <p:nvGrpSpPr>
+        <p:cNvPr id="1" name=""/>
+        <p:cNvGrpSpPr/>
+        <p:nvPr/>
+      </p:nvGrpSpPr>
+      <p:grpSpPr>
+        <a:xfrm>
+          <a:off x="0" y="0"/>
+          <a:ext cx="0" cy="0"/>
+          <a:chOff x="0" y="0"/>
+          <a:chExt cx="0" cy="0"/>
+        </a:xfrm>
+      </p:grpSpPr>
+      <p:sp>
+        <p:nvSpPr>
+          <p:cNvPr id="2" name="Slide Image Placeholder 1"/>
+          <p:cNvSpPr>
+            <a:spLocks noGrp="1" noRot="1" noChangeAspect="1"/>
+          </p:cNvSpPr>
+          <p:nvPr>
+            <p:ph type="sldImg"/>
+          </p:nvPr>
+        </p:nvSpPr>
+        <p:spPr/>
+      </p:sp>
+      <p:sp>
+        <p:nvSpPr>
+          <p:cNvPr id="3" name="Notes Placeholder 2"/>
+          <p:cNvSpPr>
+            <a:spLocks noGrp="1"/>
+          </p:cNvSpPr>
+          <p:nvPr>
+            <p:ph type="body" idx="1"/>
+          </p:nvPr>
+        </p:nvSpPr>
+        <p:spPr/>
+        <p:txBody>
+          <a:bodyPr/>
+          <a:lstStyle/>
+          <a:p>
+            <a:endParaRPr lang="en-CN" dirty="0"/>
+          </a:p>
+        </p:txBody>
+      </p:sp>
+      <p:sp>
+        <p:nvSpPr>
+          <p:cNvPr id="4" name="Slide Number Placeholder 3"/>
+          <p:cNvSpPr>
+            <a:spLocks noGrp="1"/>
+          </p:cNvSpPr>
+          <p:nvPr>
+            <p:ph type="sldNum" sz="quarter" idx="5"/>
+          </p:nvPr>
+        </p:nvSpPr>
+        <p:spPr/>
+        <p:txBody>
+          <a:bodyPr/>
+          <a:lstStyle/>
+          <a:p>
+            <a:fld id="{6C66B177-17C8-644D-8D2B-8EF5E3597B0D}" type="slidenum">
+              <a:rPr lang="en-CN" smtClean="0"/>
+              <a:t>3</a:t>
+            </a:fld>
+            <a:endParaRPr lang="en-CN"/>
+          </a:p>
+        </p:txBody>
+      </p:sp>
+    </p:spTree>
+    <p:extLst>
+      <p:ext uri="{BB962C8B-B14F-4D97-AF65-F5344CB8AC3E}">
+        <p14:creationId xmlns:p14="http://schemas.microsoft.com/office/powerpoint/2010/main" val="2444879114"/>
+      </p:ext>
+    </p:extLst>
+  </p:cSld>
+  <p:clrMapOvr>
+    <a:masterClrMapping/>
+  </p:clrMapOvr>
+</p:notes>
 </file>
 
 <file path=ppt/slideLayouts/slideLayout1.xml><?xml version="1.0" encoding="utf-8"?>
@@ -254,7 +698,7 @@
           <a:p>
             <a:fld id="{055F3C6C-B473-4282-89BA-F9AD07143E5D}" type="datetimeFigureOut">
               <a:rPr lang="en-US" smtClean="0"/>
-              <a:t>5/8/2021</a:t>
+              <a:t>5/9/21</a:t>
             </a:fld>
             <a:endParaRPr lang="en-US"/>
           </a:p>
@@ -452,7 +896,7 @@
           <a:p>
             <a:fld id="{055F3C6C-B473-4282-89BA-F9AD07143E5D}" type="datetimeFigureOut">
               <a:rPr lang="en-US" smtClean="0"/>
-              <a:t>5/8/2021</a:t>
+              <a:t>5/9/21</a:t>
             </a:fld>
             <a:endParaRPr lang="en-US"/>
           </a:p>
@@ -660,7 +1104,7 @@
           <a:p>
             <a:fld id="{055F3C6C-B473-4282-89BA-F9AD07143E5D}" type="datetimeFigureOut">
               <a:rPr lang="en-US" smtClean="0"/>
-              <a:t>5/8/2021</a:t>
+              <a:t>5/9/21</a:t>
             </a:fld>
             <a:endParaRPr lang="en-US"/>
           </a:p>
@@ -858,7 +1302,7 @@
           <a:p>
             <a:fld id="{055F3C6C-B473-4282-89BA-F9AD07143E5D}" type="datetimeFigureOut">
               <a:rPr lang="en-US" smtClean="0"/>
-              <a:t>5/8/2021</a:t>
+              <a:t>5/9/21</a:t>
             </a:fld>
             <a:endParaRPr lang="en-US"/>
           </a:p>
@@ -1133,7 +1577,7 @@
           <a:p>
             <a:fld id="{055F3C6C-B473-4282-89BA-F9AD07143E5D}" type="datetimeFigureOut">
               <a:rPr lang="en-US" smtClean="0"/>
-              <a:t>5/8/2021</a:t>
+              <a:t>5/9/21</a:t>
             </a:fld>
             <a:endParaRPr lang="en-US"/>
           </a:p>
@@ -1398,7 +1842,7 @@
           <a:p>
             <a:fld id="{055F3C6C-B473-4282-89BA-F9AD07143E5D}" type="datetimeFigureOut">
               <a:rPr lang="en-US" smtClean="0"/>
-              <a:t>5/8/2021</a:t>
+              <a:t>5/9/21</a:t>
             </a:fld>
             <a:endParaRPr lang="en-US"/>
           </a:p>
@@ -1810,7 +2254,7 @@
           <a:p>
             <a:fld id="{055F3C6C-B473-4282-89BA-F9AD07143E5D}" type="datetimeFigureOut">
               <a:rPr lang="en-US" smtClean="0"/>
-              <a:t>5/8/2021</a:t>
+              <a:t>5/9/21</a:t>
             </a:fld>
             <a:endParaRPr lang="en-US"/>
           </a:p>
@@ -1951,7 +2395,7 @@
           <a:p>
             <a:fld id="{055F3C6C-B473-4282-89BA-F9AD07143E5D}" type="datetimeFigureOut">
               <a:rPr lang="en-US" smtClean="0"/>
-              <a:t>5/8/2021</a:t>
+              <a:t>5/9/21</a:t>
             </a:fld>
             <a:endParaRPr lang="en-US"/>
           </a:p>
@@ -2064,7 +2508,7 @@
           <a:p>
             <a:fld id="{055F3C6C-B473-4282-89BA-F9AD07143E5D}" type="datetimeFigureOut">
               <a:rPr lang="en-US" smtClean="0"/>
-              <a:t>5/8/2021</a:t>
+              <a:t>5/9/21</a:t>
             </a:fld>
             <a:endParaRPr lang="en-US"/>
           </a:p>
@@ -2375,7 +2819,7 @@
           <a:p>
             <a:fld id="{055F3C6C-B473-4282-89BA-F9AD07143E5D}" type="datetimeFigureOut">
               <a:rPr lang="en-US" smtClean="0"/>
-              <a:t>5/8/2021</a:t>
+              <a:t>5/9/21</a:t>
             </a:fld>
             <a:endParaRPr lang="en-US"/>
           </a:p>
@@ -2663,7 +3107,7 @@
           <a:p>
             <a:fld id="{055F3C6C-B473-4282-89BA-F9AD07143E5D}" type="datetimeFigureOut">
               <a:rPr lang="en-US" smtClean="0"/>
-              <a:t>5/8/2021</a:t>
+              <a:t>5/9/21</a:t>
             </a:fld>
             <a:endParaRPr lang="en-US"/>
           </a:p>
@@ -2904,7 +3348,7 @@
           <a:p>
             <a:fld id="{055F3C6C-B473-4282-89BA-F9AD07143E5D}" type="datetimeFigureOut">
               <a:rPr lang="en-US" smtClean="0"/>
-              <a:t>5/8/2021</a:t>
+              <a:t>5/9/21</a:t>
             </a:fld>
             <a:endParaRPr lang="en-US"/>
           </a:p>
@@ -5093,6 +5537,2038 @@
 </p:sld>
 </file>
 
+<file path=ppt/slides/slide2.xml><?xml version="1.0" encoding="utf-8"?>
+<p:sld xmlns:a="http://schemas.openxmlformats.org/drawingml/2006/main" xmlns:r="http://schemas.openxmlformats.org/officeDocument/2006/relationships" xmlns:p="http://schemas.openxmlformats.org/presentationml/2006/main">
+  <p:cSld>
+    <p:spTree>
+      <p:nvGrpSpPr>
+        <p:cNvPr id="1" name=""/>
+        <p:cNvGrpSpPr/>
+        <p:nvPr/>
+      </p:nvGrpSpPr>
+      <p:grpSpPr>
+        <a:xfrm>
+          <a:off x="0" y="0"/>
+          <a:ext cx="0" cy="0"/>
+          <a:chOff x="0" y="0"/>
+          <a:chExt cx="0" cy="0"/>
+        </a:xfrm>
+      </p:grpSpPr>
+      <p:sp>
+        <p:nvSpPr>
+          <p:cNvPr id="2" name="Title 1">
+            <a:extLst>
+              <a:ext uri="{FF2B5EF4-FFF2-40B4-BE49-F238E27FC236}">
+                <a16:creationId xmlns:a16="http://schemas.microsoft.com/office/drawing/2014/main" id="{EB48EF75-5BD9-714E-820B-B5D833038B01}"/>
+              </a:ext>
+            </a:extLst>
+          </p:cNvPr>
+          <p:cNvSpPr>
+            <a:spLocks noGrp="1"/>
+          </p:cNvSpPr>
+          <p:nvPr>
+            <p:ph type="title"/>
+          </p:nvPr>
+        </p:nvSpPr>
+        <p:spPr/>
+        <p:txBody>
+          <a:bodyPr/>
+          <a:lstStyle/>
+          <a:p>
+            <a:endParaRPr lang="en-CN"/>
+          </a:p>
+        </p:txBody>
+      </p:sp>
+      <p:sp>
+        <p:nvSpPr>
+          <p:cNvPr id="5" name="Rectangle 4">
+            <a:extLst>
+              <a:ext uri="{FF2B5EF4-FFF2-40B4-BE49-F238E27FC236}">
+                <a16:creationId xmlns:a16="http://schemas.microsoft.com/office/drawing/2014/main" id="{90E2D70E-68E6-1543-92E3-312B4158D9D1}"/>
+              </a:ext>
+            </a:extLst>
+          </p:cNvPr>
+          <p:cNvSpPr/>
+          <p:nvPr/>
+        </p:nvSpPr>
+        <p:spPr>
+          <a:xfrm>
+            <a:off x="3018198" y="4763567"/>
+            <a:ext cx="2157046" cy="677862"/>
+          </a:xfrm>
+          <a:prstGeom prst="rect">
+            <a:avLst/>
+          </a:prstGeom>
+          <a:solidFill>
+            <a:schemeClr val="accent1">
+              <a:lumMod val="60000"/>
+              <a:lumOff val="40000"/>
+            </a:schemeClr>
+          </a:solidFill>
+        </p:spPr>
+        <p:style>
+          <a:lnRef idx="2">
+            <a:schemeClr val="accent5">
+              <a:shade val="50000"/>
+            </a:schemeClr>
+          </a:lnRef>
+          <a:fillRef idx="1">
+            <a:schemeClr val="accent5"/>
+          </a:fillRef>
+          <a:effectRef idx="0">
+            <a:schemeClr val="accent5"/>
+          </a:effectRef>
+          <a:fontRef idx="minor">
+            <a:schemeClr val="lt1"/>
+          </a:fontRef>
+        </p:style>
+        <p:txBody>
+          <a:bodyPr rtlCol="0" anchor="ctr"/>
+          <a:lstStyle/>
+          <a:p>
+            <a:pPr algn="ctr"/>
+            <a:r>
+              <a:rPr lang="en-US" sz="2400" dirty="0" err="1">
+                <a:solidFill>
+                  <a:schemeClr val="tx1"/>
+                </a:solidFill>
+                <a:latin typeface="SimHei" panose="02010609060101010101" pitchFamily="49" charset="-122"/>
+                <a:ea typeface="SimHei" panose="02010609060101010101" pitchFamily="49" charset="-122"/>
+              </a:rPr>
+              <a:t>读窗口</a:t>
+            </a:r>
+            <a:endParaRPr lang="en-US" sz="2400" dirty="0">
+              <a:solidFill>
+                <a:schemeClr val="tx1"/>
+              </a:solidFill>
+              <a:latin typeface="SimHei" panose="02010609060101010101" pitchFamily="49" charset="-122"/>
+              <a:ea typeface="SimHei" panose="02010609060101010101" pitchFamily="49" charset="-122"/>
+            </a:endParaRPr>
+          </a:p>
+        </p:txBody>
+      </p:sp>
+      <p:sp>
+        <p:nvSpPr>
+          <p:cNvPr id="8" name="Rectangle 7">
+            <a:extLst>
+              <a:ext uri="{FF2B5EF4-FFF2-40B4-BE49-F238E27FC236}">
+                <a16:creationId xmlns:a16="http://schemas.microsoft.com/office/drawing/2014/main" id="{E058B4C6-F4B6-394E-8C39-6426EA1721A6}"/>
+              </a:ext>
+            </a:extLst>
+          </p:cNvPr>
+          <p:cNvSpPr/>
+          <p:nvPr/>
+        </p:nvSpPr>
+        <p:spPr>
+          <a:xfrm>
+            <a:off x="1901092" y="4763567"/>
+            <a:ext cx="1117106" cy="677862"/>
+          </a:xfrm>
+          <a:prstGeom prst="rect">
+            <a:avLst/>
+          </a:prstGeom>
+          <a:solidFill>
+            <a:schemeClr val="accent2">
+              <a:lumMod val="60000"/>
+              <a:lumOff val="40000"/>
+            </a:schemeClr>
+          </a:solidFill>
+        </p:spPr>
+        <p:style>
+          <a:lnRef idx="2">
+            <a:schemeClr val="accent4">
+              <a:shade val="50000"/>
+            </a:schemeClr>
+          </a:lnRef>
+          <a:fillRef idx="1">
+            <a:schemeClr val="accent4"/>
+          </a:fillRef>
+          <a:effectRef idx="0">
+            <a:schemeClr val="accent4"/>
+          </a:effectRef>
+          <a:fontRef idx="minor">
+            <a:schemeClr val="lt1"/>
+          </a:fontRef>
+        </p:style>
+        <p:txBody>
+          <a:bodyPr rtlCol="0" anchor="ctr"/>
+          <a:lstStyle/>
+          <a:p>
+            <a:pPr algn="ctr"/>
+            <a:r>
+              <a:rPr lang="en-US" sz="2400" dirty="0" err="1">
+                <a:solidFill>
+                  <a:schemeClr val="tx1"/>
+                </a:solidFill>
+                <a:latin typeface="SimHei" panose="02010609060101010101" pitchFamily="49" charset="-122"/>
+                <a:ea typeface="SimHei" panose="02010609060101010101" pitchFamily="49" charset="-122"/>
+              </a:rPr>
+              <a:t>写窗口</a:t>
+            </a:r>
+            <a:endParaRPr lang="en-US" sz="2400" dirty="0">
+              <a:solidFill>
+                <a:schemeClr val="tx1"/>
+              </a:solidFill>
+              <a:latin typeface="SimHei" panose="02010609060101010101" pitchFamily="49" charset="-122"/>
+              <a:ea typeface="SimHei" panose="02010609060101010101" pitchFamily="49" charset="-122"/>
+            </a:endParaRPr>
+          </a:p>
+        </p:txBody>
+      </p:sp>
+      <p:sp>
+        <p:nvSpPr>
+          <p:cNvPr id="12" name="Rectangle 11">
+            <a:extLst>
+              <a:ext uri="{FF2B5EF4-FFF2-40B4-BE49-F238E27FC236}">
+                <a16:creationId xmlns:a16="http://schemas.microsoft.com/office/drawing/2014/main" id="{9558CB4D-6A0C-6640-9C4E-16B25BF340B6}"/>
+              </a:ext>
+            </a:extLst>
+          </p:cNvPr>
+          <p:cNvSpPr/>
+          <p:nvPr/>
+        </p:nvSpPr>
+        <p:spPr>
+          <a:xfrm>
+            <a:off x="6292350" y="4763567"/>
+            <a:ext cx="2157046" cy="670044"/>
+          </a:xfrm>
+          <a:prstGeom prst="rect">
+            <a:avLst/>
+          </a:prstGeom>
+          <a:solidFill>
+            <a:schemeClr val="accent1">
+              <a:lumMod val="60000"/>
+              <a:lumOff val="40000"/>
+            </a:schemeClr>
+          </a:solidFill>
+        </p:spPr>
+        <p:style>
+          <a:lnRef idx="2">
+            <a:schemeClr val="accent6">
+              <a:shade val="50000"/>
+            </a:schemeClr>
+          </a:lnRef>
+          <a:fillRef idx="1">
+            <a:schemeClr val="accent6"/>
+          </a:fillRef>
+          <a:effectRef idx="0">
+            <a:schemeClr val="accent6"/>
+          </a:effectRef>
+          <a:fontRef idx="minor">
+            <a:schemeClr val="lt1"/>
+          </a:fontRef>
+        </p:style>
+        <p:txBody>
+          <a:bodyPr rtlCol="0" anchor="ctr"/>
+          <a:lstStyle/>
+          <a:p>
+            <a:pPr algn="ctr"/>
+            <a:r>
+              <a:rPr lang="en-US" sz="2400" dirty="0" err="1">
+                <a:solidFill>
+                  <a:schemeClr val="tx1"/>
+                </a:solidFill>
+                <a:latin typeface="SimHei" panose="02010609060101010101" pitchFamily="49" charset="-122"/>
+                <a:ea typeface="SimHei" panose="02010609060101010101" pitchFamily="49" charset="-122"/>
+              </a:rPr>
+              <a:t>读窗口</a:t>
+            </a:r>
+            <a:endParaRPr lang="en-US" sz="2400" dirty="0">
+              <a:solidFill>
+                <a:schemeClr val="tx1"/>
+              </a:solidFill>
+              <a:latin typeface="SimHei" panose="02010609060101010101" pitchFamily="49" charset="-122"/>
+              <a:ea typeface="SimHei" panose="02010609060101010101" pitchFamily="49" charset="-122"/>
+            </a:endParaRPr>
+          </a:p>
+        </p:txBody>
+      </p:sp>
+      <p:sp>
+        <p:nvSpPr>
+          <p:cNvPr id="13" name="Rectangle 12">
+            <a:extLst>
+              <a:ext uri="{FF2B5EF4-FFF2-40B4-BE49-F238E27FC236}">
+                <a16:creationId xmlns:a16="http://schemas.microsoft.com/office/drawing/2014/main" id="{E2643F25-8C9B-CF4D-AEB6-E289E8773EC1}"/>
+              </a:ext>
+            </a:extLst>
+          </p:cNvPr>
+          <p:cNvSpPr/>
+          <p:nvPr/>
+        </p:nvSpPr>
+        <p:spPr>
+          <a:xfrm>
+            <a:off x="5175244" y="4763567"/>
+            <a:ext cx="1117106" cy="670044"/>
+          </a:xfrm>
+          <a:prstGeom prst="rect">
+            <a:avLst/>
+          </a:prstGeom>
+          <a:solidFill>
+            <a:schemeClr val="accent2">
+              <a:lumMod val="60000"/>
+              <a:lumOff val="40000"/>
+            </a:schemeClr>
+          </a:solidFill>
+        </p:spPr>
+        <p:style>
+          <a:lnRef idx="2">
+            <a:schemeClr val="accent4">
+              <a:shade val="50000"/>
+            </a:schemeClr>
+          </a:lnRef>
+          <a:fillRef idx="1">
+            <a:schemeClr val="accent4"/>
+          </a:fillRef>
+          <a:effectRef idx="0">
+            <a:schemeClr val="accent4"/>
+          </a:effectRef>
+          <a:fontRef idx="minor">
+            <a:schemeClr val="lt1"/>
+          </a:fontRef>
+        </p:style>
+        <p:txBody>
+          <a:bodyPr rtlCol="0" anchor="ctr"/>
+          <a:lstStyle/>
+          <a:p>
+            <a:pPr algn="ctr"/>
+            <a:r>
+              <a:rPr lang="en-US" sz="2400" dirty="0" err="1">
+                <a:solidFill>
+                  <a:schemeClr val="tx1"/>
+                </a:solidFill>
+                <a:latin typeface="SimHei" panose="02010609060101010101" pitchFamily="49" charset="-122"/>
+                <a:ea typeface="SimHei" panose="02010609060101010101" pitchFamily="49" charset="-122"/>
+              </a:rPr>
+              <a:t>写窗口</a:t>
+            </a:r>
+            <a:endParaRPr lang="en-US" sz="2400" dirty="0">
+              <a:solidFill>
+                <a:schemeClr val="tx1"/>
+              </a:solidFill>
+              <a:latin typeface="SimHei" panose="02010609060101010101" pitchFamily="49" charset="-122"/>
+              <a:ea typeface="SimHei" panose="02010609060101010101" pitchFamily="49" charset="-122"/>
+            </a:endParaRPr>
+          </a:p>
+        </p:txBody>
+      </p:sp>
+      <p:sp>
+        <p:nvSpPr>
+          <p:cNvPr id="14" name="Rectangle 13">
+            <a:extLst>
+              <a:ext uri="{FF2B5EF4-FFF2-40B4-BE49-F238E27FC236}">
+                <a16:creationId xmlns:a16="http://schemas.microsoft.com/office/drawing/2014/main" id="{51BA8464-A57D-294C-9262-1AC57249969D}"/>
+              </a:ext>
+            </a:extLst>
+          </p:cNvPr>
+          <p:cNvSpPr/>
+          <p:nvPr/>
+        </p:nvSpPr>
+        <p:spPr>
+          <a:xfrm>
+            <a:off x="8449396" y="4767476"/>
+            <a:ext cx="1117106" cy="670044"/>
+          </a:xfrm>
+          <a:prstGeom prst="rect">
+            <a:avLst/>
+          </a:prstGeom>
+          <a:solidFill>
+            <a:schemeClr val="accent2">
+              <a:lumMod val="60000"/>
+              <a:lumOff val="40000"/>
+            </a:schemeClr>
+          </a:solidFill>
+        </p:spPr>
+        <p:style>
+          <a:lnRef idx="2">
+            <a:schemeClr val="accent4">
+              <a:shade val="50000"/>
+            </a:schemeClr>
+          </a:lnRef>
+          <a:fillRef idx="1">
+            <a:schemeClr val="accent4"/>
+          </a:fillRef>
+          <a:effectRef idx="0">
+            <a:schemeClr val="accent4"/>
+          </a:effectRef>
+          <a:fontRef idx="minor">
+            <a:schemeClr val="lt1"/>
+          </a:fontRef>
+        </p:style>
+        <p:txBody>
+          <a:bodyPr rtlCol="0" anchor="ctr"/>
+          <a:lstStyle/>
+          <a:p>
+            <a:pPr algn="ctr"/>
+            <a:r>
+              <a:rPr lang="en-US" sz="2400" dirty="0" err="1">
+                <a:solidFill>
+                  <a:schemeClr val="tx1"/>
+                </a:solidFill>
+                <a:latin typeface="SimHei" panose="02010609060101010101" pitchFamily="49" charset="-122"/>
+                <a:ea typeface="SimHei" panose="02010609060101010101" pitchFamily="49" charset="-122"/>
+              </a:rPr>
+              <a:t>写窗口</a:t>
+            </a:r>
+            <a:endParaRPr lang="en-US" sz="2400" dirty="0">
+              <a:solidFill>
+                <a:schemeClr val="tx1"/>
+              </a:solidFill>
+              <a:latin typeface="SimHei" panose="02010609060101010101" pitchFamily="49" charset="-122"/>
+              <a:ea typeface="SimHei" panose="02010609060101010101" pitchFamily="49" charset="-122"/>
+            </a:endParaRPr>
+          </a:p>
+        </p:txBody>
+      </p:sp>
+      <p:sp>
+        <p:nvSpPr>
+          <p:cNvPr id="15" name="TextBox 14">
+            <a:extLst>
+              <a:ext uri="{FF2B5EF4-FFF2-40B4-BE49-F238E27FC236}">
+                <a16:creationId xmlns:a16="http://schemas.microsoft.com/office/drawing/2014/main" id="{A8D79E16-EDF3-6C44-8589-FE27ABB916CA}"/>
+              </a:ext>
+            </a:extLst>
+          </p:cNvPr>
+          <p:cNvSpPr txBox="1"/>
+          <p:nvPr/>
+        </p:nvSpPr>
+        <p:spPr>
+          <a:xfrm>
+            <a:off x="9566502" y="4576894"/>
+            <a:ext cx="1726932" cy="769441"/>
+          </a:xfrm>
+          <a:prstGeom prst="rect">
+            <a:avLst/>
+          </a:prstGeom>
+          <a:noFill/>
+        </p:spPr>
+        <p:txBody>
+          <a:bodyPr wrap="square" rtlCol="0">
+            <a:spAutoFit/>
+          </a:bodyPr>
+          <a:lstStyle/>
+          <a:p>
+            <a:r>
+              <a:rPr lang="en-US" sz="4400" dirty="0"/>
+              <a:t>.  .  .</a:t>
+            </a:r>
+            <a:r>
+              <a:rPr lang="en-CN" sz="4400" dirty="0"/>
+              <a:t> </a:t>
+            </a:r>
+          </a:p>
+        </p:txBody>
+      </p:sp>
+      <p:sp>
+        <p:nvSpPr>
+          <p:cNvPr id="16" name="TextBox 15">
+            <a:extLst>
+              <a:ext uri="{FF2B5EF4-FFF2-40B4-BE49-F238E27FC236}">
+                <a16:creationId xmlns:a16="http://schemas.microsoft.com/office/drawing/2014/main" id="{6B3B0632-EE5A-0F4D-949B-D5A5773EE34E}"/>
+              </a:ext>
+            </a:extLst>
+          </p:cNvPr>
+          <p:cNvSpPr txBox="1"/>
+          <p:nvPr/>
+        </p:nvSpPr>
+        <p:spPr>
+          <a:xfrm>
+            <a:off x="5336495" y="4159493"/>
+            <a:ext cx="1705360" cy="400110"/>
+          </a:xfrm>
+          <a:prstGeom prst="rect">
+            <a:avLst/>
+          </a:prstGeom>
+          <a:noFill/>
+        </p:spPr>
+        <p:txBody>
+          <a:bodyPr wrap="square" rtlCol="0">
+            <a:spAutoFit/>
+          </a:bodyPr>
+          <a:lstStyle/>
+          <a:p>
+            <a:r>
+              <a:rPr lang="en-CN" sz="2000" dirty="0">
+                <a:latin typeface="SimHei" panose="02010609060101010101" pitchFamily="49" charset="-122"/>
+                <a:ea typeface="SimHei" panose="02010609060101010101" pitchFamily="49" charset="-122"/>
+              </a:rPr>
+              <a:t>时间</a:t>
+            </a:r>
+          </a:p>
+        </p:txBody>
+      </p:sp>
+      <p:sp>
+        <p:nvSpPr>
+          <p:cNvPr id="17" name="Right Arrow 16">
+            <a:extLst>
+              <a:ext uri="{FF2B5EF4-FFF2-40B4-BE49-F238E27FC236}">
+                <a16:creationId xmlns:a16="http://schemas.microsoft.com/office/drawing/2014/main" id="{161CEE03-9E36-2F44-B9F8-D0B451975889}"/>
+              </a:ext>
+            </a:extLst>
+          </p:cNvPr>
+          <p:cNvSpPr/>
+          <p:nvPr/>
+        </p:nvSpPr>
+        <p:spPr>
+          <a:xfrm>
+            <a:off x="6003617" y="4272198"/>
+            <a:ext cx="362203" cy="180444"/>
+          </a:xfrm>
+          <a:prstGeom prst="rightArrow">
+            <a:avLst/>
+          </a:prstGeom>
+          <a:noFill/>
+        </p:spPr>
+        <p:style>
+          <a:lnRef idx="2">
+            <a:schemeClr val="accent1">
+              <a:shade val="50000"/>
+            </a:schemeClr>
+          </a:lnRef>
+          <a:fillRef idx="1">
+            <a:schemeClr val="accent1"/>
+          </a:fillRef>
+          <a:effectRef idx="0">
+            <a:schemeClr val="accent1"/>
+          </a:effectRef>
+          <a:fontRef idx="minor">
+            <a:schemeClr val="lt1"/>
+          </a:fontRef>
+        </p:style>
+        <p:txBody>
+          <a:bodyPr rtlCol="0" anchor="ctr"/>
+          <a:lstStyle/>
+          <a:p>
+            <a:pPr algn="ctr"/>
+            <a:endParaRPr lang="en-CN"/>
+          </a:p>
+        </p:txBody>
+      </p:sp>
+      <p:sp>
+        <p:nvSpPr>
+          <p:cNvPr id="18" name="Can 17">
+            <a:extLst>
+              <a:ext uri="{FF2B5EF4-FFF2-40B4-BE49-F238E27FC236}">
+                <a16:creationId xmlns:a16="http://schemas.microsoft.com/office/drawing/2014/main" id="{BE652985-2825-AC4A-B1F1-C755F2FF0E19}"/>
+              </a:ext>
+            </a:extLst>
+          </p:cNvPr>
+          <p:cNvSpPr/>
+          <p:nvPr/>
+        </p:nvSpPr>
+        <p:spPr>
+          <a:xfrm>
+            <a:off x="224454" y="4576894"/>
+            <a:ext cx="1261445" cy="988189"/>
+          </a:xfrm>
+          <a:prstGeom prst="can">
+            <a:avLst/>
+          </a:prstGeom>
+          <a:solidFill>
+            <a:schemeClr val="accent6">
+              <a:lumMod val="40000"/>
+              <a:lumOff val="60000"/>
+            </a:schemeClr>
+          </a:solidFill>
+        </p:spPr>
+        <p:style>
+          <a:lnRef idx="2">
+            <a:schemeClr val="accent1">
+              <a:shade val="50000"/>
+            </a:schemeClr>
+          </a:lnRef>
+          <a:fillRef idx="1">
+            <a:schemeClr val="accent1"/>
+          </a:fillRef>
+          <a:effectRef idx="0">
+            <a:schemeClr val="accent1"/>
+          </a:effectRef>
+          <a:fontRef idx="minor">
+            <a:schemeClr val="lt1"/>
+          </a:fontRef>
+        </p:style>
+        <p:txBody>
+          <a:bodyPr rtlCol="0" anchor="ctr"/>
+          <a:lstStyle/>
+          <a:p>
+            <a:pPr algn="ctr"/>
+            <a:r>
+              <a:rPr lang="en-CN" sz="2400" dirty="0">
+                <a:solidFill>
+                  <a:schemeClr val="tx1"/>
+                </a:solidFill>
+              </a:rPr>
+              <a:t>SSD</a:t>
+            </a:r>
+          </a:p>
+        </p:txBody>
+      </p:sp>
+    </p:spTree>
+    <p:extLst>
+      <p:ext uri="{BB962C8B-B14F-4D97-AF65-F5344CB8AC3E}">
+        <p14:creationId xmlns:p14="http://schemas.microsoft.com/office/powerpoint/2010/main" val="2781989277"/>
+      </p:ext>
+    </p:extLst>
+  </p:cSld>
+  <p:clrMapOvr>
+    <a:masterClrMapping/>
+  </p:clrMapOvr>
+</p:sld>
+</file>
+
+<file path=ppt/slides/slide3.xml><?xml version="1.0" encoding="utf-8"?>
+<p:sld xmlns:a="http://schemas.openxmlformats.org/drawingml/2006/main" xmlns:r="http://schemas.openxmlformats.org/officeDocument/2006/relationships" xmlns:p="http://schemas.openxmlformats.org/presentationml/2006/main">
+  <p:cSld>
+    <p:spTree>
+      <p:nvGrpSpPr>
+        <p:cNvPr id="1" name=""/>
+        <p:cNvGrpSpPr/>
+        <p:nvPr/>
+      </p:nvGrpSpPr>
+      <p:grpSpPr>
+        <a:xfrm>
+          <a:off x="0" y="0"/>
+          <a:ext cx="0" cy="0"/>
+          <a:chOff x="0" y="0"/>
+          <a:chExt cx="0" cy="0"/>
+        </a:xfrm>
+      </p:grpSpPr>
+      <p:sp>
+        <p:nvSpPr>
+          <p:cNvPr id="2" name="Title 1">
+            <a:extLst>
+              <a:ext uri="{FF2B5EF4-FFF2-40B4-BE49-F238E27FC236}">
+                <a16:creationId xmlns:a16="http://schemas.microsoft.com/office/drawing/2014/main" id="{EB48EF75-5BD9-714E-820B-B5D833038B01}"/>
+              </a:ext>
+            </a:extLst>
+          </p:cNvPr>
+          <p:cNvSpPr>
+            <a:spLocks noGrp="1"/>
+          </p:cNvSpPr>
+          <p:nvPr>
+            <p:ph type="title"/>
+          </p:nvPr>
+        </p:nvSpPr>
+        <p:spPr/>
+        <p:txBody>
+          <a:bodyPr/>
+          <a:lstStyle/>
+          <a:p>
+            <a:endParaRPr lang="en-CN"/>
+          </a:p>
+        </p:txBody>
+      </p:sp>
+      <p:sp>
+        <p:nvSpPr>
+          <p:cNvPr id="5" name="Rectangle 4">
+            <a:extLst>
+              <a:ext uri="{FF2B5EF4-FFF2-40B4-BE49-F238E27FC236}">
+                <a16:creationId xmlns:a16="http://schemas.microsoft.com/office/drawing/2014/main" id="{90E2D70E-68E6-1543-92E3-312B4158D9D1}"/>
+              </a:ext>
+            </a:extLst>
+          </p:cNvPr>
+          <p:cNvSpPr/>
+          <p:nvPr/>
+        </p:nvSpPr>
+        <p:spPr>
+          <a:xfrm>
+            <a:off x="3078564" y="2453420"/>
+            <a:ext cx="2234212" cy="677862"/>
+          </a:xfrm>
+          <a:prstGeom prst="rect">
+            <a:avLst/>
+          </a:prstGeom>
+          <a:solidFill>
+            <a:schemeClr val="accent1">
+              <a:lumMod val="60000"/>
+              <a:lumOff val="40000"/>
+            </a:schemeClr>
+          </a:solidFill>
+        </p:spPr>
+        <p:style>
+          <a:lnRef idx="2">
+            <a:schemeClr val="accent5">
+              <a:shade val="50000"/>
+            </a:schemeClr>
+          </a:lnRef>
+          <a:fillRef idx="1">
+            <a:schemeClr val="accent5"/>
+          </a:fillRef>
+          <a:effectRef idx="0">
+            <a:schemeClr val="accent5"/>
+          </a:effectRef>
+          <a:fontRef idx="minor">
+            <a:schemeClr val="lt1"/>
+          </a:fontRef>
+        </p:style>
+        <p:txBody>
+          <a:bodyPr rtlCol="0" anchor="ctr"/>
+          <a:lstStyle/>
+          <a:p>
+            <a:pPr algn="ctr"/>
+            <a:r>
+              <a:rPr lang="en-US" sz="2400" dirty="0" err="1">
+                <a:solidFill>
+                  <a:schemeClr val="tx1"/>
+                </a:solidFill>
+                <a:latin typeface="SimHei" panose="02010609060101010101" pitchFamily="49" charset="-122"/>
+                <a:ea typeface="SimHei" panose="02010609060101010101" pitchFamily="49" charset="-122"/>
+              </a:rPr>
+              <a:t>读窗口</a:t>
+            </a:r>
+            <a:endParaRPr lang="en-US" sz="2400" dirty="0">
+              <a:solidFill>
+                <a:schemeClr val="tx1"/>
+              </a:solidFill>
+              <a:latin typeface="SimHei" panose="02010609060101010101" pitchFamily="49" charset="-122"/>
+              <a:ea typeface="SimHei" panose="02010609060101010101" pitchFamily="49" charset="-122"/>
+            </a:endParaRPr>
+          </a:p>
+        </p:txBody>
+      </p:sp>
+      <p:sp>
+        <p:nvSpPr>
+          <p:cNvPr id="8" name="Rectangle 7">
+            <a:extLst>
+              <a:ext uri="{FF2B5EF4-FFF2-40B4-BE49-F238E27FC236}">
+                <a16:creationId xmlns:a16="http://schemas.microsoft.com/office/drawing/2014/main" id="{E058B4C6-F4B6-394E-8C39-6426EA1721A6}"/>
+              </a:ext>
+            </a:extLst>
+          </p:cNvPr>
+          <p:cNvSpPr/>
+          <p:nvPr/>
+        </p:nvSpPr>
+        <p:spPr>
+          <a:xfrm>
+            <a:off x="1961458" y="2461238"/>
+            <a:ext cx="1117106" cy="677862"/>
+          </a:xfrm>
+          <a:prstGeom prst="rect">
+            <a:avLst/>
+          </a:prstGeom>
+          <a:solidFill>
+            <a:schemeClr val="accent2">
+              <a:lumMod val="60000"/>
+              <a:lumOff val="40000"/>
+            </a:schemeClr>
+          </a:solidFill>
+        </p:spPr>
+        <p:style>
+          <a:lnRef idx="2">
+            <a:schemeClr val="accent4">
+              <a:shade val="50000"/>
+            </a:schemeClr>
+          </a:lnRef>
+          <a:fillRef idx="1">
+            <a:schemeClr val="accent4"/>
+          </a:fillRef>
+          <a:effectRef idx="0">
+            <a:schemeClr val="accent4"/>
+          </a:effectRef>
+          <a:fontRef idx="minor">
+            <a:schemeClr val="lt1"/>
+          </a:fontRef>
+        </p:style>
+        <p:txBody>
+          <a:bodyPr rtlCol="0" anchor="ctr"/>
+          <a:lstStyle/>
+          <a:p>
+            <a:pPr algn="ctr"/>
+            <a:r>
+              <a:rPr lang="en-US" sz="2400" dirty="0" err="1">
+                <a:solidFill>
+                  <a:schemeClr val="tx1"/>
+                </a:solidFill>
+                <a:latin typeface="SimHei" panose="02010609060101010101" pitchFamily="49" charset="-122"/>
+                <a:ea typeface="SimHei" panose="02010609060101010101" pitchFamily="49" charset="-122"/>
+              </a:rPr>
+              <a:t>写窗口</a:t>
+            </a:r>
+            <a:endParaRPr lang="en-US" sz="2400" dirty="0">
+              <a:solidFill>
+                <a:schemeClr val="tx1"/>
+              </a:solidFill>
+              <a:latin typeface="SimHei" panose="02010609060101010101" pitchFamily="49" charset="-122"/>
+              <a:ea typeface="SimHei" panose="02010609060101010101" pitchFamily="49" charset="-122"/>
+            </a:endParaRPr>
+          </a:p>
+        </p:txBody>
+      </p:sp>
+      <p:sp>
+        <p:nvSpPr>
+          <p:cNvPr id="13" name="Rectangle 12">
+            <a:extLst>
+              <a:ext uri="{FF2B5EF4-FFF2-40B4-BE49-F238E27FC236}">
+                <a16:creationId xmlns:a16="http://schemas.microsoft.com/office/drawing/2014/main" id="{E2643F25-8C9B-CF4D-AEB6-E289E8773EC1}"/>
+              </a:ext>
+            </a:extLst>
+          </p:cNvPr>
+          <p:cNvSpPr/>
+          <p:nvPr/>
+        </p:nvSpPr>
+        <p:spPr>
+          <a:xfrm>
+            <a:off x="5309080" y="2457329"/>
+            <a:ext cx="1117106" cy="670044"/>
+          </a:xfrm>
+          <a:prstGeom prst="rect">
+            <a:avLst/>
+          </a:prstGeom>
+          <a:solidFill>
+            <a:schemeClr val="accent2">
+              <a:lumMod val="60000"/>
+              <a:lumOff val="40000"/>
+            </a:schemeClr>
+          </a:solidFill>
+        </p:spPr>
+        <p:style>
+          <a:lnRef idx="2">
+            <a:schemeClr val="accent4">
+              <a:shade val="50000"/>
+            </a:schemeClr>
+          </a:lnRef>
+          <a:fillRef idx="1">
+            <a:schemeClr val="accent4"/>
+          </a:fillRef>
+          <a:effectRef idx="0">
+            <a:schemeClr val="accent4"/>
+          </a:effectRef>
+          <a:fontRef idx="minor">
+            <a:schemeClr val="lt1"/>
+          </a:fontRef>
+        </p:style>
+        <p:txBody>
+          <a:bodyPr rtlCol="0" anchor="ctr"/>
+          <a:lstStyle/>
+          <a:p>
+            <a:pPr algn="ctr"/>
+            <a:r>
+              <a:rPr lang="en-US" sz="2400" dirty="0" err="1">
+                <a:solidFill>
+                  <a:schemeClr val="tx1"/>
+                </a:solidFill>
+                <a:latin typeface="SimHei" panose="02010609060101010101" pitchFamily="49" charset="-122"/>
+                <a:ea typeface="SimHei" panose="02010609060101010101" pitchFamily="49" charset="-122"/>
+              </a:rPr>
+              <a:t>写窗口</a:t>
+            </a:r>
+            <a:endParaRPr lang="en-US" sz="2400" dirty="0">
+              <a:solidFill>
+                <a:schemeClr val="tx1"/>
+              </a:solidFill>
+              <a:latin typeface="SimHei" panose="02010609060101010101" pitchFamily="49" charset="-122"/>
+              <a:ea typeface="SimHei" panose="02010609060101010101" pitchFamily="49" charset="-122"/>
+            </a:endParaRPr>
+          </a:p>
+        </p:txBody>
+      </p:sp>
+      <p:sp>
+        <p:nvSpPr>
+          <p:cNvPr id="14" name="Rectangle 13">
+            <a:extLst>
+              <a:ext uri="{FF2B5EF4-FFF2-40B4-BE49-F238E27FC236}">
+                <a16:creationId xmlns:a16="http://schemas.microsoft.com/office/drawing/2014/main" id="{51BA8464-A57D-294C-9262-1AC57249969D}"/>
+              </a:ext>
+            </a:extLst>
+          </p:cNvPr>
+          <p:cNvSpPr/>
+          <p:nvPr/>
+        </p:nvSpPr>
+        <p:spPr>
+          <a:xfrm>
+            <a:off x="8656702" y="2465147"/>
+            <a:ext cx="1117106" cy="670044"/>
+          </a:xfrm>
+          <a:prstGeom prst="rect">
+            <a:avLst/>
+          </a:prstGeom>
+          <a:solidFill>
+            <a:schemeClr val="accent2">
+              <a:lumMod val="60000"/>
+              <a:lumOff val="40000"/>
+            </a:schemeClr>
+          </a:solidFill>
+        </p:spPr>
+        <p:style>
+          <a:lnRef idx="2">
+            <a:schemeClr val="accent4">
+              <a:shade val="50000"/>
+            </a:schemeClr>
+          </a:lnRef>
+          <a:fillRef idx="1">
+            <a:schemeClr val="accent4"/>
+          </a:fillRef>
+          <a:effectRef idx="0">
+            <a:schemeClr val="accent4"/>
+          </a:effectRef>
+          <a:fontRef idx="minor">
+            <a:schemeClr val="lt1"/>
+          </a:fontRef>
+        </p:style>
+        <p:txBody>
+          <a:bodyPr rtlCol="0" anchor="ctr"/>
+          <a:lstStyle/>
+          <a:p>
+            <a:pPr algn="ctr"/>
+            <a:r>
+              <a:rPr lang="en-US" sz="2400" dirty="0" err="1">
+                <a:solidFill>
+                  <a:schemeClr val="tx1"/>
+                </a:solidFill>
+                <a:latin typeface="SimHei" panose="02010609060101010101" pitchFamily="49" charset="-122"/>
+                <a:ea typeface="SimHei" panose="02010609060101010101" pitchFamily="49" charset="-122"/>
+              </a:rPr>
+              <a:t>写窗口</a:t>
+            </a:r>
+            <a:endParaRPr lang="en-US" sz="2400" dirty="0">
+              <a:solidFill>
+                <a:schemeClr val="tx1"/>
+              </a:solidFill>
+              <a:latin typeface="SimHei" panose="02010609060101010101" pitchFamily="49" charset="-122"/>
+              <a:ea typeface="SimHei" panose="02010609060101010101" pitchFamily="49" charset="-122"/>
+            </a:endParaRPr>
+          </a:p>
+        </p:txBody>
+      </p:sp>
+      <p:sp>
+        <p:nvSpPr>
+          <p:cNvPr id="15" name="TextBox 14">
+            <a:extLst>
+              <a:ext uri="{FF2B5EF4-FFF2-40B4-BE49-F238E27FC236}">
+                <a16:creationId xmlns:a16="http://schemas.microsoft.com/office/drawing/2014/main" id="{A8D79E16-EDF3-6C44-8589-FE27ABB916CA}"/>
+              </a:ext>
+            </a:extLst>
+          </p:cNvPr>
+          <p:cNvSpPr txBox="1"/>
+          <p:nvPr/>
+        </p:nvSpPr>
+        <p:spPr>
+          <a:xfrm>
+            <a:off x="9983512" y="2289291"/>
+            <a:ext cx="1726932" cy="769441"/>
+          </a:xfrm>
+          <a:prstGeom prst="rect">
+            <a:avLst/>
+          </a:prstGeom>
+          <a:noFill/>
+        </p:spPr>
+        <p:txBody>
+          <a:bodyPr wrap="square" rtlCol="0">
+            <a:spAutoFit/>
+          </a:bodyPr>
+          <a:lstStyle/>
+          <a:p>
+            <a:r>
+              <a:rPr lang="en-US" sz="4400" dirty="0"/>
+              <a:t>.  .  .</a:t>
+            </a:r>
+            <a:r>
+              <a:rPr lang="en-CN" sz="4400" dirty="0"/>
+              <a:t> </a:t>
+            </a:r>
+          </a:p>
+        </p:txBody>
+      </p:sp>
+      <p:sp>
+        <p:nvSpPr>
+          <p:cNvPr id="16" name="TextBox 15">
+            <a:extLst>
+              <a:ext uri="{FF2B5EF4-FFF2-40B4-BE49-F238E27FC236}">
+                <a16:creationId xmlns:a16="http://schemas.microsoft.com/office/drawing/2014/main" id="{6B3B0632-EE5A-0F4D-949B-D5A5773EE34E}"/>
+              </a:ext>
+            </a:extLst>
+          </p:cNvPr>
+          <p:cNvSpPr txBox="1"/>
+          <p:nvPr/>
+        </p:nvSpPr>
+        <p:spPr>
+          <a:xfrm>
+            <a:off x="5396861" y="1857164"/>
+            <a:ext cx="1705360" cy="400110"/>
+          </a:xfrm>
+          <a:prstGeom prst="rect">
+            <a:avLst/>
+          </a:prstGeom>
+          <a:noFill/>
+        </p:spPr>
+        <p:txBody>
+          <a:bodyPr wrap="square" rtlCol="0">
+            <a:spAutoFit/>
+          </a:bodyPr>
+          <a:lstStyle/>
+          <a:p>
+            <a:r>
+              <a:rPr lang="en-CN" sz="2000" dirty="0">
+                <a:latin typeface="SimHei" panose="02010609060101010101" pitchFamily="49" charset="-122"/>
+                <a:ea typeface="SimHei" panose="02010609060101010101" pitchFamily="49" charset="-122"/>
+              </a:rPr>
+              <a:t>时间</a:t>
+            </a:r>
+          </a:p>
+        </p:txBody>
+      </p:sp>
+      <p:sp>
+        <p:nvSpPr>
+          <p:cNvPr id="17" name="Right Arrow 16">
+            <a:extLst>
+              <a:ext uri="{FF2B5EF4-FFF2-40B4-BE49-F238E27FC236}">
+                <a16:creationId xmlns:a16="http://schemas.microsoft.com/office/drawing/2014/main" id="{161CEE03-9E36-2F44-B9F8-D0B451975889}"/>
+              </a:ext>
+            </a:extLst>
+          </p:cNvPr>
+          <p:cNvSpPr/>
+          <p:nvPr/>
+        </p:nvSpPr>
+        <p:spPr>
+          <a:xfrm>
+            <a:off x="6063983" y="1969869"/>
+            <a:ext cx="362203" cy="180444"/>
+          </a:xfrm>
+          <a:prstGeom prst="rightArrow">
+            <a:avLst/>
+          </a:prstGeom>
+          <a:noFill/>
+        </p:spPr>
+        <p:style>
+          <a:lnRef idx="2">
+            <a:schemeClr val="accent1">
+              <a:shade val="50000"/>
+            </a:schemeClr>
+          </a:lnRef>
+          <a:fillRef idx="1">
+            <a:schemeClr val="accent1"/>
+          </a:fillRef>
+          <a:effectRef idx="0">
+            <a:schemeClr val="accent1"/>
+          </a:effectRef>
+          <a:fontRef idx="minor">
+            <a:schemeClr val="lt1"/>
+          </a:fontRef>
+        </p:style>
+        <p:txBody>
+          <a:bodyPr rtlCol="0" anchor="ctr"/>
+          <a:lstStyle/>
+          <a:p>
+            <a:pPr algn="ctr"/>
+            <a:endParaRPr lang="en-CN"/>
+          </a:p>
+        </p:txBody>
+      </p:sp>
+      <p:sp>
+        <p:nvSpPr>
+          <p:cNvPr id="18" name="Can 17">
+            <a:extLst>
+              <a:ext uri="{FF2B5EF4-FFF2-40B4-BE49-F238E27FC236}">
+                <a16:creationId xmlns:a16="http://schemas.microsoft.com/office/drawing/2014/main" id="{BE652985-2825-AC4A-B1F1-C755F2FF0E19}"/>
+              </a:ext>
+            </a:extLst>
+          </p:cNvPr>
+          <p:cNvSpPr/>
+          <p:nvPr/>
+        </p:nvSpPr>
+        <p:spPr>
+          <a:xfrm>
+            <a:off x="284820" y="2274565"/>
+            <a:ext cx="1261445" cy="988189"/>
+          </a:xfrm>
+          <a:prstGeom prst="can">
+            <a:avLst/>
+          </a:prstGeom>
+          <a:solidFill>
+            <a:schemeClr val="accent6">
+              <a:lumMod val="40000"/>
+              <a:lumOff val="60000"/>
+            </a:schemeClr>
+          </a:solidFill>
+        </p:spPr>
+        <p:style>
+          <a:lnRef idx="2">
+            <a:schemeClr val="accent1">
+              <a:shade val="50000"/>
+            </a:schemeClr>
+          </a:lnRef>
+          <a:fillRef idx="1">
+            <a:schemeClr val="accent1"/>
+          </a:fillRef>
+          <a:effectRef idx="0">
+            <a:schemeClr val="accent1"/>
+          </a:effectRef>
+          <a:fontRef idx="minor">
+            <a:schemeClr val="lt1"/>
+          </a:fontRef>
+        </p:style>
+        <p:txBody>
+          <a:bodyPr rtlCol="0" anchor="ctr"/>
+          <a:lstStyle/>
+          <a:p>
+            <a:pPr algn="ctr"/>
+            <a:r>
+              <a:rPr lang="en-CN" sz="2400" dirty="0">
+                <a:solidFill>
+                  <a:schemeClr val="tx1"/>
+                </a:solidFill>
+              </a:rPr>
+              <a:t>SSD #1</a:t>
+            </a:r>
+          </a:p>
+        </p:txBody>
+      </p:sp>
+      <p:sp>
+        <p:nvSpPr>
+          <p:cNvPr id="19" name="Can 18">
+            <a:extLst>
+              <a:ext uri="{FF2B5EF4-FFF2-40B4-BE49-F238E27FC236}">
+                <a16:creationId xmlns:a16="http://schemas.microsoft.com/office/drawing/2014/main" id="{1A41BBAF-1080-3048-A822-A722D22F878B}"/>
+              </a:ext>
+            </a:extLst>
+          </p:cNvPr>
+          <p:cNvSpPr/>
+          <p:nvPr/>
+        </p:nvSpPr>
+        <p:spPr>
+          <a:xfrm>
+            <a:off x="284820" y="4632142"/>
+            <a:ext cx="1261445" cy="988189"/>
+          </a:xfrm>
+          <a:prstGeom prst="can">
+            <a:avLst/>
+          </a:prstGeom>
+          <a:solidFill>
+            <a:schemeClr val="accent6">
+              <a:lumMod val="40000"/>
+              <a:lumOff val="60000"/>
+            </a:schemeClr>
+          </a:solidFill>
+        </p:spPr>
+        <p:style>
+          <a:lnRef idx="2">
+            <a:schemeClr val="accent1">
+              <a:shade val="50000"/>
+            </a:schemeClr>
+          </a:lnRef>
+          <a:fillRef idx="1">
+            <a:schemeClr val="accent1"/>
+          </a:fillRef>
+          <a:effectRef idx="0">
+            <a:schemeClr val="accent1"/>
+          </a:effectRef>
+          <a:fontRef idx="minor">
+            <a:schemeClr val="lt1"/>
+          </a:fontRef>
+        </p:style>
+        <p:txBody>
+          <a:bodyPr rtlCol="0" anchor="ctr"/>
+          <a:lstStyle/>
+          <a:p>
+            <a:pPr algn="ctr"/>
+            <a:r>
+              <a:rPr lang="en-CN" sz="2400" dirty="0">
+                <a:solidFill>
+                  <a:schemeClr val="tx1"/>
+                </a:solidFill>
+              </a:rPr>
+              <a:t>SSD #3</a:t>
+            </a:r>
+          </a:p>
+        </p:txBody>
+      </p:sp>
+      <p:sp>
+        <p:nvSpPr>
+          <p:cNvPr id="20" name="Can 19">
+            <a:extLst>
+              <a:ext uri="{FF2B5EF4-FFF2-40B4-BE49-F238E27FC236}">
+                <a16:creationId xmlns:a16="http://schemas.microsoft.com/office/drawing/2014/main" id="{738288A5-65E2-5040-A51F-3229B34CE162}"/>
+              </a:ext>
+            </a:extLst>
+          </p:cNvPr>
+          <p:cNvSpPr/>
+          <p:nvPr/>
+        </p:nvSpPr>
+        <p:spPr>
+          <a:xfrm>
+            <a:off x="284820" y="3446316"/>
+            <a:ext cx="1261445" cy="988189"/>
+          </a:xfrm>
+          <a:prstGeom prst="can">
+            <a:avLst/>
+          </a:prstGeom>
+          <a:solidFill>
+            <a:schemeClr val="accent6">
+              <a:lumMod val="40000"/>
+              <a:lumOff val="60000"/>
+            </a:schemeClr>
+          </a:solidFill>
+        </p:spPr>
+        <p:style>
+          <a:lnRef idx="2">
+            <a:schemeClr val="accent1">
+              <a:shade val="50000"/>
+            </a:schemeClr>
+          </a:lnRef>
+          <a:fillRef idx="1">
+            <a:schemeClr val="accent1"/>
+          </a:fillRef>
+          <a:effectRef idx="0">
+            <a:schemeClr val="accent1"/>
+          </a:effectRef>
+          <a:fontRef idx="minor">
+            <a:schemeClr val="lt1"/>
+          </a:fontRef>
+        </p:style>
+        <p:txBody>
+          <a:bodyPr rtlCol="0" anchor="ctr"/>
+          <a:lstStyle/>
+          <a:p>
+            <a:pPr algn="ctr"/>
+            <a:r>
+              <a:rPr lang="en-CN" sz="2400" dirty="0">
+                <a:solidFill>
+                  <a:schemeClr val="tx1"/>
+                </a:solidFill>
+              </a:rPr>
+              <a:t>SSD #2</a:t>
+            </a:r>
+          </a:p>
+        </p:txBody>
+      </p:sp>
+      <p:sp>
+        <p:nvSpPr>
+          <p:cNvPr id="21" name="Rectangle 20">
+            <a:extLst>
+              <a:ext uri="{FF2B5EF4-FFF2-40B4-BE49-F238E27FC236}">
+                <a16:creationId xmlns:a16="http://schemas.microsoft.com/office/drawing/2014/main" id="{371C2756-00FD-4A4F-BBDA-778DF9733302}"/>
+              </a:ext>
+            </a:extLst>
+          </p:cNvPr>
+          <p:cNvSpPr/>
+          <p:nvPr/>
+        </p:nvSpPr>
+        <p:spPr>
+          <a:xfrm>
+            <a:off x="6426186" y="2461238"/>
+            <a:ext cx="2234212" cy="677862"/>
+          </a:xfrm>
+          <a:prstGeom prst="rect">
+            <a:avLst/>
+          </a:prstGeom>
+          <a:solidFill>
+            <a:schemeClr val="accent1">
+              <a:lumMod val="60000"/>
+              <a:lumOff val="40000"/>
+            </a:schemeClr>
+          </a:solidFill>
+        </p:spPr>
+        <p:style>
+          <a:lnRef idx="2">
+            <a:schemeClr val="accent5">
+              <a:shade val="50000"/>
+            </a:schemeClr>
+          </a:lnRef>
+          <a:fillRef idx="1">
+            <a:schemeClr val="accent5"/>
+          </a:fillRef>
+          <a:effectRef idx="0">
+            <a:schemeClr val="accent5"/>
+          </a:effectRef>
+          <a:fontRef idx="minor">
+            <a:schemeClr val="lt1"/>
+          </a:fontRef>
+        </p:style>
+        <p:txBody>
+          <a:bodyPr rtlCol="0" anchor="ctr"/>
+          <a:lstStyle/>
+          <a:p>
+            <a:pPr algn="ctr"/>
+            <a:r>
+              <a:rPr lang="en-US" sz="2400" dirty="0" err="1">
+                <a:solidFill>
+                  <a:schemeClr val="tx1"/>
+                </a:solidFill>
+                <a:latin typeface="SimHei" panose="02010609060101010101" pitchFamily="49" charset="-122"/>
+                <a:ea typeface="SimHei" panose="02010609060101010101" pitchFamily="49" charset="-122"/>
+              </a:rPr>
+              <a:t>读窗口</a:t>
+            </a:r>
+            <a:endParaRPr lang="en-US" sz="2400" dirty="0">
+              <a:solidFill>
+                <a:schemeClr val="tx1"/>
+              </a:solidFill>
+              <a:latin typeface="SimHei" panose="02010609060101010101" pitchFamily="49" charset="-122"/>
+              <a:ea typeface="SimHei" panose="02010609060101010101" pitchFamily="49" charset="-122"/>
+            </a:endParaRPr>
+          </a:p>
+        </p:txBody>
+      </p:sp>
+      <p:sp>
+        <p:nvSpPr>
+          <p:cNvPr id="22" name="Rectangle 21">
+            <a:extLst>
+              <a:ext uri="{FF2B5EF4-FFF2-40B4-BE49-F238E27FC236}">
+                <a16:creationId xmlns:a16="http://schemas.microsoft.com/office/drawing/2014/main" id="{6C98B969-26CD-1A46-9DE2-987D1AC074C0}"/>
+              </a:ext>
+            </a:extLst>
+          </p:cNvPr>
+          <p:cNvSpPr/>
+          <p:nvPr/>
+        </p:nvSpPr>
+        <p:spPr>
+          <a:xfrm>
+            <a:off x="4195670" y="3587957"/>
+            <a:ext cx="2234212" cy="677862"/>
+          </a:xfrm>
+          <a:prstGeom prst="rect">
+            <a:avLst/>
+          </a:prstGeom>
+          <a:solidFill>
+            <a:schemeClr val="accent1">
+              <a:lumMod val="60000"/>
+              <a:lumOff val="40000"/>
+            </a:schemeClr>
+          </a:solidFill>
+        </p:spPr>
+        <p:style>
+          <a:lnRef idx="2">
+            <a:schemeClr val="accent5">
+              <a:shade val="50000"/>
+            </a:schemeClr>
+          </a:lnRef>
+          <a:fillRef idx="1">
+            <a:schemeClr val="accent5"/>
+          </a:fillRef>
+          <a:effectRef idx="0">
+            <a:schemeClr val="accent5"/>
+          </a:effectRef>
+          <a:fontRef idx="minor">
+            <a:schemeClr val="lt1"/>
+          </a:fontRef>
+        </p:style>
+        <p:txBody>
+          <a:bodyPr rtlCol="0" anchor="ctr"/>
+          <a:lstStyle/>
+          <a:p>
+            <a:pPr algn="ctr"/>
+            <a:r>
+              <a:rPr lang="en-US" sz="2400" dirty="0" err="1">
+                <a:solidFill>
+                  <a:schemeClr val="tx1"/>
+                </a:solidFill>
+                <a:latin typeface="SimHei" panose="02010609060101010101" pitchFamily="49" charset="-122"/>
+                <a:ea typeface="SimHei" panose="02010609060101010101" pitchFamily="49" charset="-122"/>
+              </a:rPr>
+              <a:t>读窗口</a:t>
+            </a:r>
+            <a:endParaRPr lang="en-US" sz="2400" dirty="0">
+              <a:solidFill>
+                <a:schemeClr val="tx1"/>
+              </a:solidFill>
+              <a:latin typeface="SimHei" panose="02010609060101010101" pitchFamily="49" charset="-122"/>
+              <a:ea typeface="SimHei" panose="02010609060101010101" pitchFamily="49" charset="-122"/>
+            </a:endParaRPr>
+          </a:p>
+        </p:txBody>
+      </p:sp>
+      <p:sp>
+        <p:nvSpPr>
+          <p:cNvPr id="23" name="Rectangle 22">
+            <a:extLst>
+              <a:ext uri="{FF2B5EF4-FFF2-40B4-BE49-F238E27FC236}">
+                <a16:creationId xmlns:a16="http://schemas.microsoft.com/office/drawing/2014/main" id="{596E4353-C8D3-134C-A693-3A62DF4831A5}"/>
+              </a:ext>
+            </a:extLst>
+          </p:cNvPr>
+          <p:cNvSpPr/>
+          <p:nvPr/>
+        </p:nvSpPr>
+        <p:spPr>
+          <a:xfrm>
+            <a:off x="3078564" y="3595775"/>
+            <a:ext cx="1117106" cy="677862"/>
+          </a:xfrm>
+          <a:prstGeom prst="rect">
+            <a:avLst/>
+          </a:prstGeom>
+          <a:solidFill>
+            <a:schemeClr val="accent2">
+              <a:lumMod val="60000"/>
+              <a:lumOff val="40000"/>
+            </a:schemeClr>
+          </a:solidFill>
+        </p:spPr>
+        <p:style>
+          <a:lnRef idx="2">
+            <a:schemeClr val="accent4">
+              <a:shade val="50000"/>
+            </a:schemeClr>
+          </a:lnRef>
+          <a:fillRef idx="1">
+            <a:schemeClr val="accent4"/>
+          </a:fillRef>
+          <a:effectRef idx="0">
+            <a:schemeClr val="accent4"/>
+          </a:effectRef>
+          <a:fontRef idx="minor">
+            <a:schemeClr val="lt1"/>
+          </a:fontRef>
+        </p:style>
+        <p:txBody>
+          <a:bodyPr rtlCol="0" anchor="ctr"/>
+          <a:lstStyle/>
+          <a:p>
+            <a:pPr algn="ctr"/>
+            <a:r>
+              <a:rPr lang="en-US" sz="2400" dirty="0" err="1">
+                <a:solidFill>
+                  <a:schemeClr val="tx1"/>
+                </a:solidFill>
+                <a:latin typeface="SimHei" panose="02010609060101010101" pitchFamily="49" charset="-122"/>
+                <a:ea typeface="SimHei" panose="02010609060101010101" pitchFamily="49" charset="-122"/>
+              </a:rPr>
+              <a:t>写窗口</a:t>
+            </a:r>
+            <a:endParaRPr lang="en-US" sz="2400" dirty="0">
+              <a:solidFill>
+                <a:schemeClr val="tx1"/>
+              </a:solidFill>
+              <a:latin typeface="SimHei" panose="02010609060101010101" pitchFamily="49" charset="-122"/>
+              <a:ea typeface="SimHei" panose="02010609060101010101" pitchFamily="49" charset="-122"/>
+            </a:endParaRPr>
+          </a:p>
+        </p:txBody>
+      </p:sp>
+      <p:sp>
+        <p:nvSpPr>
+          <p:cNvPr id="24" name="Rectangle 23">
+            <a:extLst>
+              <a:ext uri="{FF2B5EF4-FFF2-40B4-BE49-F238E27FC236}">
+                <a16:creationId xmlns:a16="http://schemas.microsoft.com/office/drawing/2014/main" id="{63A7F16A-6E03-EB4D-A384-D5D3F0E4A95F}"/>
+              </a:ext>
+            </a:extLst>
+          </p:cNvPr>
+          <p:cNvSpPr/>
+          <p:nvPr/>
+        </p:nvSpPr>
+        <p:spPr>
+          <a:xfrm>
+            <a:off x="6426186" y="3591866"/>
+            <a:ext cx="1117106" cy="670044"/>
+          </a:xfrm>
+          <a:prstGeom prst="rect">
+            <a:avLst/>
+          </a:prstGeom>
+          <a:solidFill>
+            <a:schemeClr val="accent2">
+              <a:lumMod val="60000"/>
+              <a:lumOff val="40000"/>
+            </a:schemeClr>
+          </a:solidFill>
+        </p:spPr>
+        <p:style>
+          <a:lnRef idx="2">
+            <a:schemeClr val="accent4">
+              <a:shade val="50000"/>
+            </a:schemeClr>
+          </a:lnRef>
+          <a:fillRef idx="1">
+            <a:schemeClr val="accent4"/>
+          </a:fillRef>
+          <a:effectRef idx="0">
+            <a:schemeClr val="accent4"/>
+          </a:effectRef>
+          <a:fontRef idx="minor">
+            <a:schemeClr val="lt1"/>
+          </a:fontRef>
+        </p:style>
+        <p:txBody>
+          <a:bodyPr rtlCol="0" anchor="ctr"/>
+          <a:lstStyle/>
+          <a:p>
+            <a:pPr algn="ctr"/>
+            <a:r>
+              <a:rPr lang="en-US" sz="2400" dirty="0" err="1">
+                <a:solidFill>
+                  <a:schemeClr val="tx1"/>
+                </a:solidFill>
+                <a:latin typeface="SimHei" panose="02010609060101010101" pitchFamily="49" charset="-122"/>
+                <a:ea typeface="SimHei" panose="02010609060101010101" pitchFamily="49" charset="-122"/>
+              </a:rPr>
+              <a:t>写窗口</a:t>
+            </a:r>
+            <a:endParaRPr lang="en-US" sz="2400" dirty="0">
+              <a:solidFill>
+                <a:schemeClr val="tx1"/>
+              </a:solidFill>
+              <a:latin typeface="SimHei" panose="02010609060101010101" pitchFamily="49" charset="-122"/>
+              <a:ea typeface="SimHei" panose="02010609060101010101" pitchFamily="49" charset="-122"/>
+            </a:endParaRPr>
+          </a:p>
+        </p:txBody>
+      </p:sp>
+      <p:sp>
+        <p:nvSpPr>
+          <p:cNvPr id="25" name="Rectangle 24">
+            <a:extLst>
+              <a:ext uri="{FF2B5EF4-FFF2-40B4-BE49-F238E27FC236}">
+                <a16:creationId xmlns:a16="http://schemas.microsoft.com/office/drawing/2014/main" id="{7A2AF15E-CE90-3943-A1F0-977408921322}"/>
+              </a:ext>
+            </a:extLst>
+          </p:cNvPr>
+          <p:cNvSpPr/>
+          <p:nvPr/>
+        </p:nvSpPr>
+        <p:spPr>
+          <a:xfrm>
+            <a:off x="7543292" y="3595775"/>
+            <a:ext cx="2234212" cy="677862"/>
+          </a:xfrm>
+          <a:prstGeom prst="rect">
+            <a:avLst/>
+          </a:prstGeom>
+          <a:solidFill>
+            <a:schemeClr val="accent1">
+              <a:lumMod val="60000"/>
+              <a:lumOff val="40000"/>
+            </a:schemeClr>
+          </a:solidFill>
+        </p:spPr>
+        <p:style>
+          <a:lnRef idx="2">
+            <a:schemeClr val="accent5">
+              <a:shade val="50000"/>
+            </a:schemeClr>
+          </a:lnRef>
+          <a:fillRef idx="1">
+            <a:schemeClr val="accent5"/>
+          </a:fillRef>
+          <a:effectRef idx="0">
+            <a:schemeClr val="accent5"/>
+          </a:effectRef>
+          <a:fontRef idx="minor">
+            <a:schemeClr val="lt1"/>
+          </a:fontRef>
+        </p:style>
+        <p:txBody>
+          <a:bodyPr rtlCol="0" anchor="ctr"/>
+          <a:lstStyle/>
+          <a:p>
+            <a:pPr algn="ctr"/>
+            <a:r>
+              <a:rPr lang="en-US" sz="2400" dirty="0" err="1">
+                <a:solidFill>
+                  <a:schemeClr val="tx1"/>
+                </a:solidFill>
+                <a:latin typeface="SimHei" panose="02010609060101010101" pitchFamily="49" charset="-122"/>
+                <a:ea typeface="SimHei" panose="02010609060101010101" pitchFamily="49" charset="-122"/>
+              </a:rPr>
+              <a:t>读窗口</a:t>
+            </a:r>
+            <a:endParaRPr lang="en-US" sz="2400" dirty="0">
+              <a:solidFill>
+                <a:schemeClr val="tx1"/>
+              </a:solidFill>
+              <a:latin typeface="SimHei" panose="02010609060101010101" pitchFamily="49" charset="-122"/>
+              <a:ea typeface="SimHei" panose="02010609060101010101" pitchFamily="49" charset="-122"/>
+            </a:endParaRPr>
+          </a:p>
+        </p:txBody>
+      </p:sp>
+      <p:sp>
+        <p:nvSpPr>
+          <p:cNvPr id="27" name="Rectangle 26">
+            <a:extLst>
+              <a:ext uri="{FF2B5EF4-FFF2-40B4-BE49-F238E27FC236}">
+                <a16:creationId xmlns:a16="http://schemas.microsoft.com/office/drawing/2014/main" id="{1FB55A47-6BAE-EE4C-B12E-279D18892751}"/>
+              </a:ext>
+            </a:extLst>
+          </p:cNvPr>
+          <p:cNvSpPr/>
+          <p:nvPr/>
+        </p:nvSpPr>
+        <p:spPr>
+          <a:xfrm>
+            <a:off x="1955304" y="3595775"/>
+            <a:ext cx="1117107" cy="677862"/>
+          </a:xfrm>
+          <a:prstGeom prst="rect">
+            <a:avLst/>
+          </a:prstGeom>
+          <a:solidFill>
+            <a:schemeClr val="accent1">
+              <a:lumMod val="60000"/>
+              <a:lumOff val="40000"/>
+            </a:schemeClr>
+          </a:solidFill>
+        </p:spPr>
+        <p:style>
+          <a:lnRef idx="2">
+            <a:schemeClr val="accent5">
+              <a:shade val="50000"/>
+            </a:schemeClr>
+          </a:lnRef>
+          <a:fillRef idx="1">
+            <a:schemeClr val="accent5"/>
+          </a:fillRef>
+          <a:effectRef idx="0">
+            <a:schemeClr val="accent5"/>
+          </a:effectRef>
+          <a:fontRef idx="minor">
+            <a:schemeClr val="lt1"/>
+          </a:fontRef>
+        </p:style>
+        <p:txBody>
+          <a:bodyPr rtlCol="0" anchor="ctr"/>
+          <a:lstStyle/>
+          <a:p>
+            <a:pPr algn="ctr"/>
+            <a:r>
+              <a:rPr lang="en-US" sz="2400" dirty="0" err="1">
+                <a:solidFill>
+                  <a:schemeClr val="tx1"/>
+                </a:solidFill>
+                <a:latin typeface="SimHei" panose="02010609060101010101" pitchFamily="49" charset="-122"/>
+                <a:ea typeface="SimHei" panose="02010609060101010101" pitchFamily="49" charset="-122"/>
+              </a:rPr>
+              <a:t>读窗口</a:t>
+            </a:r>
+            <a:endParaRPr lang="en-US" sz="2400" dirty="0">
+              <a:solidFill>
+                <a:schemeClr val="tx1"/>
+              </a:solidFill>
+              <a:latin typeface="SimHei" panose="02010609060101010101" pitchFamily="49" charset="-122"/>
+              <a:ea typeface="SimHei" panose="02010609060101010101" pitchFamily="49" charset="-122"/>
+            </a:endParaRPr>
+          </a:p>
+        </p:txBody>
+      </p:sp>
+      <p:sp>
+        <p:nvSpPr>
+          <p:cNvPr id="28" name="Rectangle 27">
+            <a:extLst>
+              <a:ext uri="{FF2B5EF4-FFF2-40B4-BE49-F238E27FC236}">
+                <a16:creationId xmlns:a16="http://schemas.microsoft.com/office/drawing/2014/main" id="{9FCC9E42-8E35-DD48-B228-E6472BC624DC}"/>
+              </a:ext>
+            </a:extLst>
+          </p:cNvPr>
+          <p:cNvSpPr/>
+          <p:nvPr/>
+        </p:nvSpPr>
+        <p:spPr>
+          <a:xfrm>
+            <a:off x="1955304" y="4823788"/>
+            <a:ext cx="2234212" cy="677862"/>
+          </a:xfrm>
+          <a:prstGeom prst="rect">
+            <a:avLst/>
+          </a:prstGeom>
+          <a:solidFill>
+            <a:schemeClr val="accent1">
+              <a:lumMod val="60000"/>
+              <a:lumOff val="40000"/>
+            </a:schemeClr>
+          </a:solidFill>
+        </p:spPr>
+        <p:style>
+          <a:lnRef idx="2">
+            <a:schemeClr val="accent5">
+              <a:shade val="50000"/>
+            </a:schemeClr>
+          </a:lnRef>
+          <a:fillRef idx="1">
+            <a:schemeClr val="accent5"/>
+          </a:fillRef>
+          <a:effectRef idx="0">
+            <a:schemeClr val="accent5"/>
+          </a:effectRef>
+          <a:fontRef idx="minor">
+            <a:schemeClr val="lt1"/>
+          </a:fontRef>
+        </p:style>
+        <p:txBody>
+          <a:bodyPr rtlCol="0" anchor="ctr"/>
+          <a:lstStyle/>
+          <a:p>
+            <a:pPr algn="ctr"/>
+            <a:r>
+              <a:rPr lang="en-US" sz="2400" dirty="0" err="1">
+                <a:solidFill>
+                  <a:schemeClr val="tx1"/>
+                </a:solidFill>
+                <a:latin typeface="SimHei" panose="02010609060101010101" pitchFamily="49" charset="-122"/>
+                <a:ea typeface="SimHei" panose="02010609060101010101" pitchFamily="49" charset="-122"/>
+              </a:rPr>
+              <a:t>读窗口</a:t>
+            </a:r>
+            <a:endParaRPr lang="en-US" sz="2400" dirty="0">
+              <a:solidFill>
+                <a:schemeClr val="tx1"/>
+              </a:solidFill>
+              <a:latin typeface="SimHei" panose="02010609060101010101" pitchFamily="49" charset="-122"/>
+              <a:ea typeface="SimHei" panose="02010609060101010101" pitchFamily="49" charset="-122"/>
+            </a:endParaRPr>
+          </a:p>
+        </p:txBody>
+      </p:sp>
+      <p:sp>
+        <p:nvSpPr>
+          <p:cNvPr id="29" name="Rectangle 28">
+            <a:extLst>
+              <a:ext uri="{FF2B5EF4-FFF2-40B4-BE49-F238E27FC236}">
+                <a16:creationId xmlns:a16="http://schemas.microsoft.com/office/drawing/2014/main" id="{27FFF75B-05D5-1246-B810-4D74EE62BFF9}"/>
+              </a:ext>
+            </a:extLst>
+          </p:cNvPr>
+          <p:cNvSpPr/>
+          <p:nvPr/>
+        </p:nvSpPr>
+        <p:spPr>
+          <a:xfrm>
+            <a:off x="4185820" y="4827697"/>
+            <a:ext cx="1117106" cy="670044"/>
+          </a:xfrm>
+          <a:prstGeom prst="rect">
+            <a:avLst/>
+          </a:prstGeom>
+          <a:solidFill>
+            <a:schemeClr val="accent2">
+              <a:lumMod val="60000"/>
+              <a:lumOff val="40000"/>
+            </a:schemeClr>
+          </a:solidFill>
+        </p:spPr>
+        <p:style>
+          <a:lnRef idx="2">
+            <a:schemeClr val="accent4">
+              <a:shade val="50000"/>
+            </a:schemeClr>
+          </a:lnRef>
+          <a:fillRef idx="1">
+            <a:schemeClr val="accent4"/>
+          </a:fillRef>
+          <a:effectRef idx="0">
+            <a:schemeClr val="accent4"/>
+          </a:effectRef>
+          <a:fontRef idx="minor">
+            <a:schemeClr val="lt1"/>
+          </a:fontRef>
+        </p:style>
+        <p:txBody>
+          <a:bodyPr rtlCol="0" anchor="ctr"/>
+          <a:lstStyle/>
+          <a:p>
+            <a:pPr algn="ctr"/>
+            <a:r>
+              <a:rPr lang="en-US" sz="2400" dirty="0" err="1">
+                <a:solidFill>
+                  <a:schemeClr val="tx1"/>
+                </a:solidFill>
+                <a:latin typeface="SimHei" panose="02010609060101010101" pitchFamily="49" charset="-122"/>
+                <a:ea typeface="SimHei" panose="02010609060101010101" pitchFamily="49" charset="-122"/>
+              </a:rPr>
+              <a:t>写窗口</a:t>
+            </a:r>
+            <a:endParaRPr lang="en-US" sz="2400" dirty="0">
+              <a:solidFill>
+                <a:schemeClr val="tx1"/>
+              </a:solidFill>
+              <a:latin typeface="SimHei" panose="02010609060101010101" pitchFamily="49" charset="-122"/>
+              <a:ea typeface="SimHei" panose="02010609060101010101" pitchFamily="49" charset="-122"/>
+            </a:endParaRPr>
+          </a:p>
+        </p:txBody>
+      </p:sp>
+      <p:sp>
+        <p:nvSpPr>
+          <p:cNvPr id="30" name="Rectangle 29">
+            <a:extLst>
+              <a:ext uri="{FF2B5EF4-FFF2-40B4-BE49-F238E27FC236}">
+                <a16:creationId xmlns:a16="http://schemas.microsoft.com/office/drawing/2014/main" id="{AF869B13-28CA-F24D-997B-4FF6206945D1}"/>
+              </a:ext>
+            </a:extLst>
+          </p:cNvPr>
+          <p:cNvSpPr/>
+          <p:nvPr/>
+        </p:nvSpPr>
+        <p:spPr>
+          <a:xfrm>
+            <a:off x="7533442" y="4835515"/>
+            <a:ext cx="1117106" cy="670044"/>
+          </a:xfrm>
+          <a:prstGeom prst="rect">
+            <a:avLst/>
+          </a:prstGeom>
+          <a:solidFill>
+            <a:schemeClr val="accent2">
+              <a:lumMod val="60000"/>
+              <a:lumOff val="40000"/>
+            </a:schemeClr>
+          </a:solidFill>
+        </p:spPr>
+        <p:style>
+          <a:lnRef idx="2">
+            <a:schemeClr val="accent4">
+              <a:shade val="50000"/>
+            </a:schemeClr>
+          </a:lnRef>
+          <a:fillRef idx="1">
+            <a:schemeClr val="accent4"/>
+          </a:fillRef>
+          <a:effectRef idx="0">
+            <a:schemeClr val="accent4"/>
+          </a:effectRef>
+          <a:fontRef idx="minor">
+            <a:schemeClr val="lt1"/>
+          </a:fontRef>
+        </p:style>
+        <p:txBody>
+          <a:bodyPr rtlCol="0" anchor="ctr"/>
+          <a:lstStyle/>
+          <a:p>
+            <a:pPr algn="ctr"/>
+            <a:r>
+              <a:rPr lang="en-US" sz="2400" dirty="0" err="1">
+                <a:solidFill>
+                  <a:schemeClr val="tx1"/>
+                </a:solidFill>
+                <a:latin typeface="SimHei" panose="02010609060101010101" pitchFamily="49" charset="-122"/>
+                <a:ea typeface="SimHei" panose="02010609060101010101" pitchFamily="49" charset="-122"/>
+              </a:rPr>
+              <a:t>写窗口</a:t>
+            </a:r>
+            <a:endParaRPr lang="en-US" sz="2400" dirty="0">
+              <a:solidFill>
+                <a:schemeClr val="tx1"/>
+              </a:solidFill>
+              <a:latin typeface="SimHei" panose="02010609060101010101" pitchFamily="49" charset="-122"/>
+              <a:ea typeface="SimHei" panose="02010609060101010101" pitchFamily="49" charset="-122"/>
+            </a:endParaRPr>
+          </a:p>
+        </p:txBody>
+      </p:sp>
+      <p:sp>
+        <p:nvSpPr>
+          <p:cNvPr id="31" name="Rectangle 30">
+            <a:extLst>
+              <a:ext uri="{FF2B5EF4-FFF2-40B4-BE49-F238E27FC236}">
+                <a16:creationId xmlns:a16="http://schemas.microsoft.com/office/drawing/2014/main" id="{10273424-6EBE-604D-AC40-9602C71394B9}"/>
+              </a:ext>
+            </a:extLst>
+          </p:cNvPr>
+          <p:cNvSpPr/>
+          <p:nvPr/>
+        </p:nvSpPr>
+        <p:spPr>
+          <a:xfrm>
+            <a:off x="5302926" y="4831606"/>
+            <a:ext cx="2234212" cy="677862"/>
+          </a:xfrm>
+          <a:prstGeom prst="rect">
+            <a:avLst/>
+          </a:prstGeom>
+          <a:solidFill>
+            <a:schemeClr val="accent1">
+              <a:lumMod val="60000"/>
+              <a:lumOff val="40000"/>
+            </a:schemeClr>
+          </a:solidFill>
+        </p:spPr>
+        <p:style>
+          <a:lnRef idx="2">
+            <a:schemeClr val="accent5">
+              <a:shade val="50000"/>
+            </a:schemeClr>
+          </a:lnRef>
+          <a:fillRef idx="1">
+            <a:schemeClr val="accent5"/>
+          </a:fillRef>
+          <a:effectRef idx="0">
+            <a:schemeClr val="accent5"/>
+          </a:effectRef>
+          <a:fontRef idx="minor">
+            <a:schemeClr val="lt1"/>
+          </a:fontRef>
+        </p:style>
+        <p:txBody>
+          <a:bodyPr rtlCol="0" anchor="ctr"/>
+          <a:lstStyle/>
+          <a:p>
+            <a:pPr algn="ctr"/>
+            <a:r>
+              <a:rPr lang="en-US" sz="2400" dirty="0" err="1">
+                <a:solidFill>
+                  <a:schemeClr val="tx1"/>
+                </a:solidFill>
+                <a:latin typeface="SimHei" panose="02010609060101010101" pitchFamily="49" charset="-122"/>
+                <a:ea typeface="SimHei" panose="02010609060101010101" pitchFamily="49" charset="-122"/>
+              </a:rPr>
+              <a:t>读窗口</a:t>
+            </a:r>
+            <a:endParaRPr lang="en-US" sz="2400" dirty="0">
+              <a:solidFill>
+                <a:schemeClr val="tx1"/>
+              </a:solidFill>
+              <a:latin typeface="SimHei" panose="02010609060101010101" pitchFamily="49" charset="-122"/>
+              <a:ea typeface="SimHei" panose="02010609060101010101" pitchFamily="49" charset="-122"/>
+            </a:endParaRPr>
+          </a:p>
+        </p:txBody>
+      </p:sp>
+      <p:sp>
+        <p:nvSpPr>
+          <p:cNvPr id="32" name="Rectangle 31">
+            <a:extLst>
+              <a:ext uri="{FF2B5EF4-FFF2-40B4-BE49-F238E27FC236}">
+                <a16:creationId xmlns:a16="http://schemas.microsoft.com/office/drawing/2014/main" id="{39D64C95-98FE-B24C-80E6-5F58CD12E951}"/>
+              </a:ext>
+            </a:extLst>
+          </p:cNvPr>
+          <p:cNvSpPr/>
+          <p:nvPr/>
+        </p:nvSpPr>
+        <p:spPr>
+          <a:xfrm>
+            <a:off x="8660398" y="4831606"/>
+            <a:ext cx="1117107" cy="677862"/>
+          </a:xfrm>
+          <a:prstGeom prst="rect">
+            <a:avLst/>
+          </a:prstGeom>
+          <a:solidFill>
+            <a:schemeClr val="accent1">
+              <a:lumMod val="60000"/>
+              <a:lumOff val="40000"/>
+            </a:schemeClr>
+          </a:solidFill>
+        </p:spPr>
+        <p:style>
+          <a:lnRef idx="2">
+            <a:schemeClr val="accent5">
+              <a:shade val="50000"/>
+            </a:schemeClr>
+          </a:lnRef>
+          <a:fillRef idx="1">
+            <a:schemeClr val="accent5"/>
+          </a:fillRef>
+          <a:effectRef idx="0">
+            <a:schemeClr val="accent5"/>
+          </a:effectRef>
+          <a:fontRef idx="minor">
+            <a:schemeClr val="lt1"/>
+          </a:fontRef>
+        </p:style>
+        <p:txBody>
+          <a:bodyPr rtlCol="0" anchor="ctr"/>
+          <a:lstStyle/>
+          <a:p>
+            <a:pPr algn="ctr"/>
+            <a:r>
+              <a:rPr lang="en-US" sz="2400" dirty="0" err="1">
+                <a:solidFill>
+                  <a:schemeClr val="tx1"/>
+                </a:solidFill>
+                <a:latin typeface="SimHei" panose="02010609060101010101" pitchFamily="49" charset="-122"/>
+                <a:ea typeface="SimHei" panose="02010609060101010101" pitchFamily="49" charset="-122"/>
+              </a:rPr>
+              <a:t>读窗口</a:t>
+            </a:r>
+            <a:endParaRPr lang="en-US" sz="2400" dirty="0">
+              <a:solidFill>
+                <a:schemeClr val="tx1"/>
+              </a:solidFill>
+              <a:latin typeface="SimHei" panose="02010609060101010101" pitchFamily="49" charset="-122"/>
+              <a:ea typeface="SimHei" panose="02010609060101010101" pitchFamily="49" charset="-122"/>
+            </a:endParaRPr>
+          </a:p>
+        </p:txBody>
+      </p:sp>
+      <p:sp>
+        <p:nvSpPr>
+          <p:cNvPr id="33" name="TextBox 32">
+            <a:extLst>
+              <a:ext uri="{FF2B5EF4-FFF2-40B4-BE49-F238E27FC236}">
+                <a16:creationId xmlns:a16="http://schemas.microsoft.com/office/drawing/2014/main" id="{5CC03406-8420-AD46-A02E-D8ECCD8A3D00}"/>
+              </a:ext>
+            </a:extLst>
+          </p:cNvPr>
+          <p:cNvSpPr txBox="1"/>
+          <p:nvPr/>
+        </p:nvSpPr>
+        <p:spPr>
+          <a:xfrm>
+            <a:off x="9977883" y="3416275"/>
+            <a:ext cx="1726932" cy="769441"/>
+          </a:xfrm>
+          <a:prstGeom prst="rect">
+            <a:avLst/>
+          </a:prstGeom>
+          <a:noFill/>
+        </p:spPr>
+        <p:txBody>
+          <a:bodyPr wrap="square" rtlCol="0">
+            <a:spAutoFit/>
+          </a:bodyPr>
+          <a:lstStyle/>
+          <a:p>
+            <a:r>
+              <a:rPr lang="en-US" sz="4400" dirty="0"/>
+              <a:t>.  .  .</a:t>
+            </a:r>
+            <a:r>
+              <a:rPr lang="en-CN" sz="4400" dirty="0"/>
+              <a:t> </a:t>
+            </a:r>
+          </a:p>
+        </p:txBody>
+      </p:sp>
+      <p:sp>
+        <p:nvSpPr>
+          <p:cNvPr id="34" name="TextBox 33">
+            <a:extLst>
+              <a:ext uri="{FF2B5EF4-FFF2-40B4-BE49-F238E27FC236}">
+                <a16:creationId xmlns:a16="http://schemas.microsoft.com/office/drawing/2014/main" id="{1D8A9C1E-4A1B-3749-B27E-F0F30A54ADB4}"/>
+              </a:ext>
+            </a:extLst>
+          </p:cNvPr>
+          <p:cNvSpPr txBox="1"/>
+          <p:nvPr/>
+        </p:nvSpPr>
+        <p:spPr>
+          <a:xfrm>
+            <a:off x="9977883" y="4632142"/>
+            <a:ext cx="1726932" cy="769441"/>
+          </a:xfrm>
+          <a:prstGeom prst="rect">
+            <a:avLst/>
+          </a:prstGeom>
+          <a:noFill/>
+        </p:spPr>
+        <p:txBody>
+          <a:bodyPr wrap="square" rtlCol="0">
+            <a:spAutoFit/>
+          </a:bodyPr>
+          <a:lstStyle/>
+          <a:p>
+            <a:r>
+              <a:rPr lang="en-US" sz="4400" dirty="0"/>
+              <a:t>.  .  .</a:t>
+            </a:r>
+            <a:r>
+              <a:rPr lang="en-CN" sz="4400" dirty="0"/>
+              <a:t> </a:t>
+            </a:r>
+          </a:p>
+        </p:txBody>
+      </p:sp>
+    </p:spTree>
+    <p:extLst>
+      <p:ext uri="{BB962C8B-B14F-4D97-AF65-F5344CB8AC3E}">
+        <p14:creationId xmlns:p14="http://schemas.microsoft.com/office/powerpoint/2010/main" val="4119957090"/>
+      </p:ext>
+    </p:extLst>
+  </p:cSld>
+  <p:clrMapOvr>
+    <a:masterClrMapping/>
+  </p:clrMapOvr>
+</p:sld>
+</file>
+
 <file path=ppt/theme/theme1.xml><?xml version="1.0" encoding="utf-8"?>
 <a:theme xmlns:a="http://schemas.openxmlformats.org/drawingml/2006/main" name="Office Theme">
   <a:themeElements>
@@ -5386,4 +7862,299 @@
     </a:ext>
   </a:extLst>
 </a:theme>
+</file>
+
+<file path=ppt/theme/theme2.xml><?xml version="1.0" encoding="utf-8"?>
+<a:theme xmlns:a="http://schemas.openxmlformats.org/drawingml/2006/main" name="Office Theme">
+  <a:themeElements>
+    <a:clrScheme name="Office">
+      <a:dk1>
+        <a:sysClr val="windowText" lastClr="000000"/>
+      </a:dk1>
+      <a:lt1>
+        <a:sysClr val="window" lastClr="FFFFFF"/>
+      </a:lt1>
+      <a:dk2>
+        <a:srgbClr val="44546A"/>
+      </a:dk2>
+      <a:lt2>
+        <a:srgbClr val="E7E6E6"/>
+      </a:lt2>
+      <a:accent1>
+        <a:srgbClr val="4472C4"/>
+      </a:accent1>
+      <a:accent2>
+        <a:srgbClr val="ED7D31"/>
+      </a:accent2>
+      <a:accent3>
+        <a:srgbClr val="A5A5A5"/>
+      </a:accent3>
+      <a:accent4>
+        <a:srgbClr val="FFC000"/>
+      </a:accent4>
+      <a:accent5>
+        <a:srgbClr val="5B9BD5"/>
+      </a:accent5>
+      <a:accent6>
+        <a:srgbClr val="70AD47"/>
+      </a:accent6>
+      <a:hlink>
+        <a:srgbClr val="0563C1"/>
+      </a:hlink>
+      <a:folHlink>
+        <a:srgbClr val="954F72"/>
+      </a:folHlink>
+    </a:clrScheme>
+    <a:fontScheme name="Office">
+      <a:majorFont>
+        <a:latin typeface="Calibri Light" panose="020F0302020204030204"/>
+        <a:ea typeface=""/>
+        <a:cs typeface=""/>
+        <a:font script="Jpan" typeface="游ゴシック Light"/>
+        <a:font script="Hang" typeface="맑은 고딕"/>
+        <a:font script="Hans" typeface="等线 Light"/>
+        <a:font script="Hant" typeface="新細明體"/>
+        <a:font script="Arab" typeface="Times New Roman"/>
+        <a:font script="Hebr" typeface="Times New Roman"/>
+        <a:font script="Thai" typeface="Angsana New"/>
+        <a:font script="Ethi" typeface="Nyala"/>
+        <a:font script="Beng" typeface="Vrinda"/>
+        <a:font script="Gujr" typeface="Shruti"/>
+        <a:font script="Khmr" typeface="MoolBoran"/>
+        <a:font script="Knda" typeface="Tunga"/>
+        <a:font script="Guru" typeface="Raavi"/>
+        <a:font script="Cans" typeface="Euphemia"/>
+        <a:font script="Cher" typeface="Plantagenet Cherokee"/>
+        <a:font script="Yiii" typeface="Microsoft Yi Baiti"/>
+        <a:font script="Tibt" typeface="Microsoft Himalaya"/>
+        <a:font script="Thaa" typeface="MV Boli"/>
+        <a:font script="Deva" typeface="Mangal"/>
+        <a:font script="Telu" typeface="Gautami"/>
+        <a:font script="Taml" typeface="Latha"/>
+        <a:font script="Syrc" typeface="Estrangelo Edessa"/>
+        <a:font script="Orya" typeface="Kalinga"/>
+        <a:font script="Mlym" typeface="Kartika"/>
+        <a:font script="Laoo" typeface="DokChampa"/>
+        <a:font script="Sinh" typeface="Iskoola Pota"/>
+        <a:font script="Mong" typeface="Mongolian Baiti"/>
+        <a:font script="Viet" typeface="Times New Roman"/>
+        <a:font script="Uigh" typeface="Microsoft Uighur"/>
+        <a:font script="Geor" typeface="Sylfaen"/>
+        <a:font script="Armn" typeface="Arial"/>
+        <a:font script="Bugi" typeface="Leelawadee UI"/>
+        <a:font script="Bopo" typeface="Microsoft JhengHei"/>
+        <a:font script="Java" typeface="Javanese Text"/>
+        <a:font script="Lisu" typeface="Segoe UI"/>
+        <a:font script="Mymr" typeface="Myanmar Text"/>
+        <a:font script="Nkoo" typeface="Ebrima"/>
+        <a:font script="Olck" typeface="Nirmala UI"/>
+        <a:font script="Osma" typeface="Ebrima"/>
+        <a:font script="Phag" typeface="Phagspa"/>
+        <a:font script="Syrn" typeface="Estrangelo Edessa"/>
+        <a:font script="Syrj" typeface="Estrangelo Edessa"/>
+        <a:font script="Syre" typeface="Estrangelo Edessa"/>
+        <a:font script="Sora" typeface="Nirmala UI"/>
+        <a:font script="Tale" typeface="Microsoft Tai Le"/>
+        <a:font script="Talu" typeface="Microsoft New Tai Lue"/>
+        <a:font script="Tfng" typeface="Ebrima"/>
+      </a:majorFont>
+      <a:minorFont>
+        <a:latin typeface="Calibri" panose="020F0502020204030204"/>
+        <a:ea typeface=""/>
+        <a:cs typeface=""/>
+        <a:font script="Jpan" typeface="游ゴシック"/>
+        <a:font script="Hang" typeface="맑은 고딕"/>
+        <a:font script="Hans" typeface="等线"/>
+        <a:font script="Hant" typeface="新細明體"/>
+        <a:font script="Arab" typeface="Arial"/>
+        <a:font script="Hebr" typeface="Arial"/>
+        <a:font script="Thai" typeface="Cordia New"/>
+        <a:font script="Ethi" typeface="Nyala"/>
+        <a:font script="Beng" typeface="Vrinda"/>
+        <a:font script="Gujr" typeface="Shruti"/>
+        <a:font script="Khmr" typeface="DaunPenh"/>
+        <a:font script="Knda" typeface="Tunga"/>
+        <a:font script="Guru" typeface="Raavi"/>
+        <a:font script="Cans" typeface="Euphemia"/>
+        <a:font script="Cher" typeface="Plantagenet Cherokee"/>
+        <a:font script="Yiii" typeface="Microsoft Yi Baiti"/>
+        <a:font script="Tibt" typeface="Microsoft Himalaya"/>
+        <a:font script="Thaa" typeface="MV Boli"/>
+        <a:font script="Deva" typeface="Mangal"/>
+        <a:font script="Telu" typeface="Gautami"/>
+        <a:font script="Taml" typeface="Latha"/>
+        <a:font script="Syrc" typeface="Estrangelo Edessa"/>
+        <a:font script="Orya" typeface="Kalinga"/>
+        <a:font script="Mlym" typeface="Kartika"/>
+        <a:font script="Laoo" typeface="DokChampa"/>
+        <a:font script="Sinh" typeface="Iskoola Pota"/>
+        <a:font script="Mong" typeface="Mongolian Baiti"/>
+        <a:font script="Viet" typeface="Arial"/>
+        <a:font script="Uigh" typeface="Microsoft Uighur"/>
+        <a:font script="Geor" typeface="Sylfaen"/>
+        <a:font script="Armn" typeface="Arial"/>
+        <a:font script="Bugi" typeface="Leelawadee UI"/>
+        <a:font script="Bopo" typeface="Microsoft JhengHei"/>
+        <a:font script="Java" typeface="Javanese Text"/>
+        <a:font script="Lisu" typeface="Segoe UI"/>
+        <a:font script="Mymr" typeface="Myanmar Text"/>
+        <a:font script="Nkoo" typeface="Ebrima"/>
+        <a:font script="Olck" typeface="Nirmala UI"/>
+        <a:font script="Osma" typeface="Ebrima"/>
+        <a:font script="Phag" typeface="Phagspa"/>
+        <a:font script="Syrn" typeface="Estrangelo Edessa"/>
+        <a:font script="Syrj" typeface="Estrangelo Edessa"/>
+        <a:font script="Syre" typeface="Estrangelo Edessa"/>
+        <a:font script="Sora" typeface="Nirmala UI"/>
+        <a:font script="Tale" typeface="Microsoft Tai Le"/>
+        <a:font script="Talu" typeface="Microsoft New Tai Lue"/>
+        <a:font script="Tfng" typeface="Ebrima"/>
+      </a:minorFont>
+    </a:fontScheme>
+    <a:fmtScheme name="Office">
+      <a:fillStyleLst>
+        <a:solidFill>
+          <a:schemeClr val="phClr"/>
+        </a:solidFill>
+        <a:gradFill rotWithShape="1">
+          <a:gsLst>
+            <a:gs pos="0">
+              <a:schemeClr val="phClr">
+                <a:lumMod val="110000"/>
+                <a:satMod val="105000"/>
+                <a:tint val="67000"/>
+              </a:schemeClr>
+            </a:gs>
+            <a:gs pos="50000">
+              <a:schemeClr val="phClr">
+                <a:lumMod val="105000"/>
+                <a:satMod val="103000"/>
+                <a:tint val="73000"/>
+              </a:schemeClr>
+            </a:gs>
+            <a:gs pos="100000">
+              <a:schemeClr val="phClr">
+                <a:lumMod val="105000"/>
+                <a:satMod val="109000"/>
+                <a:tint val="81000"/>
+              </a:schemeClr>
+            </a:gs>
+          </a:gsLst>
+          <a:lin ang="5400000" scaled="0"/>
+        </a:gradFill>
+        <a:gradFill rotWithShape="1">
+          <a:gsLst>
+            <a:gs pos="0">
+              <a:schemeClr val="phClr">
+                <a:satMod val="103000"/>
+                <a:lumMod val="102000"/>
+                <a:tint val="94000"/>
+              </a:schemeClr>
+            </a:gs>
+            <a:gs pos="50000">
+              <a:schemeClr val="phClr">
+                <a:satMod val="110000"/>
+                <a:lumMod val="100000"/>
+                <a:shade val="100000"/>
+              </a:schemeClr>
+            </a:gs>
+            <a:gs pos="100000">
+              <a:schemeClr val="phClr">
+                <a:lumMod val="99000"/>
+                <a:satMod val="120000"/>
+                <a:shade val="78000"/>
+              </a:schemeClr>
+            </a:gs>
+          </a:gsLst>
+          <a:lin ang="5400000" scaled="0"/>
+        </a:gradFill>
+      </a:fillStyleLst>
+      <a:lnStyleLst>
+        <a:ln w="6350" cap="flat" cmpd="sng" algn="ctr">
+          <a:solidFill>
+            <a:schemeClr val="phClr"/>
+          </a:solidFill>
+          <a:prstDash val="solid"/>
+          <a:miter lim="800000"/>
+        </a:ln>
+        <a:ln w="12700" cap="flat" cmpd="sng" algn="ctr">
+          <a:solidFill>
+            <a:schemeClr val="phClr"/>
+          </a:solidFill>
+          <a:prstDash val="solid"/>
+          <a:miter lim="800000"/>
+        </a:ln>
+        <a:ln w="19050" cap="flat" cmpd="sng" algn="ctr">
+          <a:solidFill>
+            <a:schemeClr val="phClr"/>
+          </a:solidFill>
+          <a:prstDash val="solid"/>
+          <a:miter lim="800000"/>
+        </a:ln>
+      </a:lnStyleLst>
+      <a:effectStyleLst>
+        <a:effectStyle>
+          <a:effectLst/>
+        </a:effectStyle>
+        <a:effectStyle>
+          <a:effectLst/>
+        </a:effectStyle>
+        <a:effectStyle>
+          <a:effectLst>
+            <a:outerShdw blurRad="57150" dist="19050" dir="5400000" algn="ctr" rotWithShape="0">
+              <a:srgbClr val="000000">
+                <a:alpha val="63000"/>
+              </a:srgbClr>
+            </a:outerShdw>
+          </a:effectLst>
+        </a:effectStyle>
+      </a:effectStyleLst>
+      <a:bgFillStyleLst>
+        <a:solidFill>
+          <a:schemeClr val="phClr"/>
+        </a:solidFill>
+        <a:solidFill>
+          <a:schemeClr val="phClr">
+            <a:tint val="95000"/>
+            <a:satMod val="170000"/>
+          </a:schemeClr>
+        </a:solidFill>
+        <a:gradFill rotWithShape="1">
+          <a:gsLst>
+            <a:gs pos="0">
+              <a:schemeClr val="phClr">
+                <a:tint val="93000"/>
+                <a:satMod val="150000"/>
+                <a:shade val="98000"/>
+                <a:lumMod val="102000"/>
+              </a:schemeClr>
+            </a:gs>
+            <a:gs pos="50000">
+              <a:schemeClr val="phClr">
+                <a:tint val="98000"/>
+                <a:satMod val="130000"/>
+                <a:shade val="90000"/>
+                <a:lumMod val="103000"/>
+              </a:schemeClr>
+            </a:gs>
+            <a:gs pos="100000">
+              <a:schemeClr val="phClr">
+                <a:shade val="63000"/>
+                <a:satMod val="120000"/>
+              </a:schemeClr>
+            </a:gs>
+          </a:gsLst>
+          <a:lin ang="5400000" scaled="0"/>
+        </a:gradFill>
+      </a:bgFillStyleLst>
+    </a:fmtScheme>
+  </a:themeElements>
+  <a:objectDefaults/>
+  <a:extraClrSchemeLst/>
+  <a:extLst>
+    <a:ext uri="{05A4C25C-085E-4340-85A3-A5531E510DB2}">
+      <thm15:themeFamily xmlns:thm15="http://schemas.microsoft.com/office/thememl/2012/main" name="Office Theme" id="{62F939B6-93AF-4DB8-9C6B-D6C7DFDC589F}" vid="{4A3C46E8-61CC-4603-A589-7422A47A8E4A}"/>
+    </a:ext>
+  </a:extLst>
+</a:theme>
 </file>
</xml_diff>

<commit_message>
design: Update overview figure
</commit_message>
<xml_diff>
--- a/figures/figures.pptx
+++ b/figures/figures.pptx
@@ -8,7 +8,7 @@
     <p:notesMasterId r:id="rId5"/>
   </p:notesMasterIdLst>
   <p:sldIdLst>
-    <p:sldId id="256" r:id="rId2"/>
+    <p:sldId id="259" r:id="rId2"/>
     <p:sldId id="257" r:id="rId3"/>
     <p:sldId id="258" r:id="rId4"/>
   </p:sldIdLst>
@@ -199,7 +199,7 @@
           <a:p>
             <a:fld id="{141DAA26-AA5C-CB41-A82C-69F7CA60948D}" type="datetimeFigureOut">
               <a:rPr lang="en-CN" smtClean="0"/>
-              <a:t>2021/5/9</a:t>
+              <a:t>05/10/2021</a:t>
             </a:fld>
             <a:endParaRPr lang="en-CN"/>
           </a:p>
@@ -698,7 +698,7 @@
           <a:p>
             <a:fld id="{055F3C6C-B473-4282-89BA-F9AD07143E5D}" type="datetimeFigureOut">
               <a:rPr lang="en-US" smtClean="0"/>
-              <a:t>5/9/21</a:t>
+              <a:t>5/10/2021</a:t>
             </a:fld>
             <a:endParaRPr lang="en-US"/>
           </a:p>
@@ -896,7 +896,7 @@
           <a:p>
             <a:fld id="{055F3C6C-B473-4282-89BA-F9AD07143E5D}" type="datetimeFigureOut">
               <a:rPr lang="en-US" smtClean="0"/>
-              <a:t>5/9/21</a:t>
+              <a:t>5/10/2021</a:t>
             </a:fld>
             <a:endParaRPr lang="en-US"/>
           </a:p>
@@ -1104,7 +1104,7 @@
           <a:p>
             <a:fld id="{055F3C6C-B473-4282-89BA-F9AD07143E5D}" type="datetimeFigureOut">
               <a:rPr lang="en-US" smtClean="0"/>
-              <a:t>5/9/21</a:t>
+              <a:t>5/10/2021</a:t>
             </a:fld>
             <a:endParaRPr lang="en-US"/>
           </a:p>
@@ -1302,7 +1302,7 @@
           <a:p>
             <a:fld id="{055F3C6C-B473-4282-89BA-F9AD07143E5D}" type="datetimeFigureOut">
               <a:rPr lang="en-US" smtClean="0"/>
-              <a:t>5/9/21</a:t>
+              <a:t>5/10/2021</a:t>
             </a:fld>
             <a:endParaRPr lang="en-US"/>
           </a:p>
@@ -1577,7 +1577,7 @@
           <a:p>
             <a:fld id="{055F3C6C-B473-4282-89BA-F9AD07143E5D}" type="datetimeFigureOut">
               <a:rPr lang="en-US" smtClean="0"/>
-              <a:t>5/9/21</a:t>
+              <a:t>5/10/2021</a:t>
             </a:fld>
             <a:endParaRPr lang="en-US"/>
           </a:p>
@@ -1842,7 +1842,7 @@
           <a:p>
             <a:fld id="{055F3C6C-B473-4282-89BA-F9AD07143E5D}" type="datetimeFigureOut">
               <a:rPr lang="en-US" smtClean="0"/>
-              <a:t>5/9/21</a:t>
+              <a:t>5/10/2021</a:t>
             </a:fld>
             <a:endParaRPr lang="en-US"/>
           </a:p>
@@ -2254,7 +2254,7 @@
           <a:p>
             <a:fld id="{055F3C6C-B473-4282-89BA-F9AD07143E5D}" type="datetimeFigureOut">
               <a:rPr lang="en-US" smtClean="0"/>
-              <a:t>5/9/21</a:t>
+              <a:t>5/10/2021</a:t>
             </a:fld>
             <a:endParaRPr lang="en-US"/>
           </a:p>
@@ -2395,7 +2395,7 @@
           <a:p>
             <a:fld id="{055F3C6C-B473-4282-89BA-F9AD07143E5D}" type="datetimeFigureOut">
               <a:rPr lang="en-US" smtClean="0"/>
-              <a:t>5/9/21</a:t>
+              <a:t>5/10/2021</a:t>
             </a:fld>
             <a:endParaRPr lang="en-US"/>
           </a:p>
@@ -2508,7 +2508,7 @@
           <a:p>
             <a:fld id="{055F3C6C-B473-4282-89BA-F9AD07143E5D}" type="datetimeFigureOut">
               <a:rPr lang="en-US" smtClean="0"/>
-              <a:t>5/9/21</a:t>
+              <a:t>5/10/2021</a:t>
             </a:fld>
             <a:endParaRPr lang="en-US"/>
           </a:p>
@@ -2819,7 +2819,7 @@
           <a:p>
             <a:fld id="{055F3C6C-B473-4282-89BA-F9AD07143E5D}" type="datetimeFigureOut">
               <a:rPr lang="en-US" smtClean="0"/>
-              <a:t>5/9/21</a:t>
+              <a:t>5/10/2021</a:t>
             </a:fld>
             <a:endParaRPr lang="en-US"/>
           </a:p>
@@ -3107,7 +3107,7 @@
           <a:p>
             <a:fld id="{055F3C6C-B473-4282-89BA-F9AD07143E5D}" type="datetimeFigureOut">
               <a:rPr lang="en-US" smtClean="0"/>
-              <a:t>5/9/21</a:t>
+              <a:t>5/10/2021</a:t>
             </a:fld>
             <a:endParaRPr lang="en-US"/>
           </a:p>
@@ -3348,7 +3348,7 @@
           <a:p>
             <a:fld id="{055F3C6C-B473-4282-89BA-F9AD07143E5D}" type="datetimeFigureOut">
               <a:rPr lang="en-US" smtClean="0"/>
-              <a:t>5/9/21</a:t>
+              <a:t>5/10/2021</a:t>
             </a:fld>
             <a:endParaRPr lang="en-US"/>
           </a:p>
@@ -3812,23 +3812,53 @@
           <a:bodyPr rtlCol="0" anchor="ctr"/>
           <a:lstStyle/>
           <a:p>
-            <a:pPr algn="ctr"/>
-            <a:r>
-              <a:rPr lang="zh-CN" altLang="en-US" sz="1600" dirty="0">
+            <a:pPr marL="0" marR="0" lvl="0" indent="0" algn="ctr" defTabSz="914400" rtl="0" eaLnBrk="1" fontAlgn="auto" latinLnBrk="0" hangingPunct="1">
+              <a:lnSpc>
+                <a:spcPct val="100000"/>
+              </a:lnSpc>
+              <a:spcBef>
+                <a:spcPts val="0"/>
+              </a:spcBef>
+              <a:spcAft>
+                <a:spcPts val="0"/>
+              </a:spcAft>
+              <a:buClrTx/>
+              <a:buSzTx/>
+              <a:buFontTx/>
+              <a:buNone/>
+              <a:tabLst/>
+              <a:defRPr/>
+            </a:pPr>
+            <a:r>
+              <a:rPr kumimoji="0" lang="zh-CN" altLang="en-US" sz="1600" b="0" i="0" u="none" strike="noStrike" kern="1200" cap="none" spc="0" normalizeH="0" baseline="0" noProof="0" dirty="0">
+                <a:ln>
+                  <a:noFill/>
+                </a:ln>
                 <a:solidFill>
-                  <a:schemeClr val="tx1"/>
+                  <a:prstClr val="black"/>
                 </a:solidFill>
+                <a:effectLst/>
+                <a:uLnTx/>
+                <a:uFillTx/>
                 <a:latin typeface="SimHei" panose="02010609060101010101" pitchFamily="49" charset="-122"/>
                 <a:ea typeface="SimHei" panose="02010609060101010101" pitchFamily="49" charset="-122"/>
+                <a:cs typeface="+mn-cs"/>
               </a:rPr>
               <a:t>控制器</a:t>
             </a:r>
-            <a:endParaRPr lang="en-US" altLang="zh-CN" sz="1600" dirty="0">
+            <a:endParaRPr kumimoji="0" lang="en-US" altLang="zh-CN" sz="1600" b="0" i="0" u="none" strike="noStrike" kern="1200" cap="none" spc="0" normalizeH="0" baseline="0" noProof="0" dirty="0">
+              <a:ln>
+                <a:noFill/>
+              </a:ln>
               <a:solidFill>
-                <a:schemeClr val="tx1"/>
+                <a:prstClr val="black"/>
               </a:solidFill>
+              <a:effectLst/>
+              <a:uLnTx/>
+              <a:uFillTx/>
               <a:latin typeface="SimHei" panose="02010609060101010101" pitchFamily="49" charset="-122"/>
               <a:ea typeface="SimHei" panose="02010609060101010101" pitchFamily="49" charset="-122"/>
+              <a:cs typeface="+mn-cs"/>
             </a:endParaRPr>
           </a:p>
         </p:txBody>
@@ -3847,7 +3877,7 @@
         </p:nvSpPr>
         <p:spPr>
           <a:xfrm>
-            <a:off x="6936741" y="2783457"/>
+            <a:off x="6952372" y="3348699"/>
             <a:ext cx="2041236" cy="461818"/>
           </a:xfrm>
           <a:prstGeom prst="roundRect">
@@ -3880,15 +3910,76 @@
           <a:bodyPr rtlCol="0" anchor="ctr"/>
           <a:lstStyle/>
           <a:p>
-            <a:pPr algn="ctr"/>
-            <a:r>
-              <a:rPr lang="en-US" sz="1200" dirty="0">
+            <a:pPr marL="0" marR="0" lvl="0" indent="0" algn="ctr" defTabSz="914400" rtl="0" eaLnBrk="1" fontAlgn="auto" latinLnBrk="0" hangingPunct="1">
+              <a:lnSpc>
+                <a:spcPct val="100000"/>
+              </a:lnSpc>
+              <a:spcBef>
+                <a:spcPts val="0"/>
+              </a:spcBef>
+              <a:spcAft>
+                <a:spcPts val="0"/>
+              </a:spcAft>
+              <a:buClrTx/>
+              <a:buSzTx/>
+              <a:buFontTx/>
+              <a:buNone/>
+              <a:tabLst/>
+              <a:defRPr/>
+            </a:pPr>
+            <a:r>
+              <a:rPr kumimoji="0" lang="en-US" sz="1200" b="0" i="0" u="none" strike="noStrike" kern="1200" cap="none" spc="0" normalizeH="0" baseline="0" noProof="0" dirty="0">
+                <a:ln>
+                  <a:noFill/>
+                </a:ln>
                 <a:solidFill>
-                  <a:schemeClr val="tx1"/>
+                  <a:prstClr val="black"/>
                 </a:solidFill>
+                <a:effectLst/>
+                <a:uLnTx/>
+                <a:uFillTx/>
+                <a:latin typeface="Calibri" panose="020F0502020204030204"/>
                 <a:ea typeface="SimHei" panose="02010609060101010101" pitchFamily="49" charset="-122"/>
+                <a:cs typeface="+mn-cs"/>
               </a:rPr>
-              <a:t>(80,            , P99 &lt; 2ms), P=2         </a:t>
+              <a:t>(80,</a:t>
+            </a:r>
+            <a:r>
+              <a:rPr kumimoji="0" lang="en-US" sz="1200" b="0" i="0" u="none" strike="noStrike" kern="1200" cap="none" spc="0" normalizeH="0" baseline="0" noProof="0" dirty="0">
+                <a:ln>
+                  <a:noFill/>
+                </a:ln>
+                <a:solidFill>
+                  <a:srgbClr val="A5A5A5">
+                    <a:lumMod val="20000"/>
+                    <a:lumOff val="80000"/>
+                  </a:srgbClr>
+                </a:solidFill>
+                <a:effectLst/>
+                <a:uLnTx/>
+                <a:uFillTx/>
+                <a:latin typeface="Calibri" panose="020F0502020204030204"/>
+                <a:ea typeface="SimHei" panose="02010609060101010101" pitchFamily="49" charset="-122"/>
+                <a:cs typeface="+mn-cs"/>
+              </a:rPr>
+              <a:t>aaaaaa</a:t>
+            </a:r>
+            <a:r>
+              <a:rPr kumimoji="0" lang="en-US" sz="1200" b="0" i="0" u="none" strike="noStrike" kern="1200" cap="none" spc="0" normalizeH="0" baseline="0" noProof="0" dirty="0">
+                <a:ln>
+                  <a:noFill/>
+                </a:ln>
+                <a:solidFill>
+                  <a:prstClr val="black"/>
+                </a:solidFill>
+                <a:effectLst/>
+                <a:uLnTx/>
+                <a:uFillTx/>
+                <a:latin typeface="Calibri" panose="020F0502020204030204"/>
+                <a:ea typeface="SimHei" panose="02010609060101010101" pitchFamily="49" charset="-122"/>
+                <a:cs typeface="+mn-cs"/>
+              </a:rPr>
+              <a:t>, P99 &lt; 2ms), P=2         </a:t>
             </a:r>
           </a:p>
         </p:txBody>
@@ -3907,7 +3998,7 @@
         </p:nvSpPr>
         <p:spPr>
           <a:xfrm>
-            <a:off x="6936741" y="3395365"/>
+            <a:off x="6952372" y="3960607"/>
             <a:ext cx="2041236" cy="461818"/>
           </a:xfrm>
           <a:prstGeom prst="roundRect">
@@ -3940,15 +4031,76 @@
           <a:bodyPr rtlCol="0" anchor="ctr"/>
           <a:lstStyle/>
           <a:p>
-            <a:pPr algn="ctr"/>
-            <a:r>
-              <a:rPr lang="en-US" sz="1200" dirty="0">
+            <a:pPr marL="0" marR="0" lvl="0" indent="0" algn="ctr" defTabSz="914400" rtl="0" eaLnBrk="1" fontAlgn="auto" latinLnBrk="0" hangingPunct="1">
+              <a:lnSpc>
+                <a:spcPct val="100000"/>
+              </a:lnSpc>
+              <a:spcBef>
+                <a:spcPts val="0"/>
+              </a:spcBef>
+              <a:spcAft>
+                <a:spcPts val="0"/>
+              </a:spcAft>
+              <a:buClrTx/>
+              <a:buSzTx/>
+              <a:buFontTx/>
+              <a:buNone/>
+              <a:tabLst/>
+              <a:defRPr/>
+            </a:pPr>
+            <a:r>
+              <a:rPr kumimoji="0" lang="en-US" sz="1200" b="0" i="0" u="none" strike="noStrike" kern="1200" cap="none" spc="0" normalizeH="0" baseline="0" noProof="0" dirty="0">
+                <a:ln>
+                  <a:noFill/>
+                </a:ln>
                 <a:solidFill>
-                  <a:schemeClr val="tx1"/>
+                  <a:prstClr val="black"/>
                 </a:solidFill>
+                <a:effectLst/>
+                <a:uLnTx/>
+                <a:uFillTx/>
+                <a:latin typeface="Calibri" panose="020F0502020204030204"/>
                 <a:ea typeface="SimHei" panose="02010609060101010101" pitchFamily="49" charset="-122"/>
+                <a:cs typeface="+mn-cs"/>
               </a:rPr>
-              <a:t>(48,            , P90 &lt; 2ms), P=1         </a:t>
+              <a:t>(48,</a:t>
+            </a:r>
+            <a:r>
+              <a:rPr kumimoji="0" lang="en-US" sz="1200" b="0" i="0" u="none" strike="noStrike" kern="1200" cap="none" spc="0" normalizeH="0" baseline="0" noProof="0" dirty="0">
+                <a:ln>
+                  <a:noFill/>
+                </a:ln>
+                <a:solidFill>
+                  <a:srgbClr val="A5A5A5">
+                    <a:lumMod val="20000"/>
+                    <a:lumOff val="80000"/>
+                  </a:srgbClr>
+                </a:solidFill>
+                <a:effectLst/>
+                <a:uLnTx/>
+                <a:uFillTx/>
+                <a:latin typeface="Calibri" panose="020F0502020204030204"/>
+                <a:ea typeface="SimHei" panose="02010609060101010101" pitchFamily="49" charset="-122"/>
+                <a:cs typeface="+mn-cs"/>
+              </a:rPr>
+              <a:t>aaaaaa</a:t>
+            </a:r>
+            <a:r>
+              <a:rPr kumimoji="0" lang="en-US" sz="1200" b="0" i="0" u="none" strike="noStrike" kern="1200" cap="none" spc="0" normalizeH="0" baseline="0" noProof="0" dirty="0">
+                <a:ln>
+                  <a:noFill/>
+                </a:ln>
+                <a:solidFill>
+                  <a:prstClr val="black"/>
+                </a:solidFill>
+                <a:effectLst/>
+                <a:uLnTx/>
+                <a:uFillTx/>
+                <a:latin typeface="Calibri" panose="020F0502020204030204"/>
+                <a:ea typeface="SimHei" panose="02010609060101010101" pitchFamily="49" charset="-122"/>
+                <a:cs typeface="+mn-cs"/>
+              </a:rPr>
+              <a:t>, P90 &lt; 2ms), P=1         </a:t>
             </a:r>
           </a:p>
         </p:txBody>
@@ -3984,7 +4136,7 @@
         </p:blipFill>
         <p:spPr>
           <a:xfrm>
-            <a:off x="7250776" y="2783457"/>
+            <a:off x="7266407" y="3343432"/>
             <a:ext cx="548640" cy="511029"/>
           </a:xfrm>
           <a:prstGeom prst="rect">
@@ -4006,7 +4158,7 @@
         </p:nvSpPr>
         <p:spPr>
           <a:xfrm>
-            <a:off x="6936741" y="4007273"/>
+            <a:off x="6952372" y="4572515"/>
             <a:ext cx="2041236" cy="461818"/>
           </a:xfrm>
           <a:prstGeom prst="roundRect">
@@ -4039,15 +4191,76 @@
           <a:bodyPr rtlCol="0" anchor="ctr"/>
           <a:lstStyle/>
           <a:p>
-            <a:pPr algn="ctr"/>
-            <a:r>
-              <a:rPr lang="en-US" sz="1200" dirty="0">
+            <a:pPr marL="0" marR="0" lvl="0" indent="0" algn="ctr" defTabSz="914400" rtl="0" eaLnBrk="1" fontAlgn="auto" latinLnBrk="0" hangingPunct="1">
+              <a:lnSpc>
+                <a:spcPct val="100000"/>
+              </a:lnSpc>
+              <a:spcBef>
+                <a:spcPts val="0"/>
+              </a:spcBef>
+              <a:spcAft>
+                <a:spcPts val="0"/>
+              </a:spcAft>
+              <a:buClrTx/>
+              <a:buSzTx/>
+              <a:buFontTx/>
+              <a:buNone/>
+              <a:tabLst/>
+              <a:defRPr/>
+            </a:pPr>
+            <a:r>
+              <a:rPr kumimoji="0" lang="en-US" sz="1200" b="0" i="0" u="none" strike="noStrike" kern="1200" cap="none" spc="0" normalizeH="0" baseline="0" noProof="0" dirty="0">
+                <a:ln>
+                  <a:noFill/>
+                </a:ln>
                 <a:solidFill>
-                  <a:schemeClr val="tx1"/>
+                  <a:prstClr val="black"/>
                 </a:solidFill>
+                <a:effectLst/>
+                <a:uLnTx/>
+                <a:uFillTx/>
+                <a:latin typeface="Calibri" panose="020F0502020204030204"/>
                 <a:ea typeface="SimHei" panose="02010609060101010101" pitchFamily="49" charset="-122"/>
+                <a:cs typeface="+mn-cs"/>
               </a:rPr>
-              <a:t>(64,            , P99 &lt; 2ms), P=3         </a:t>
+              <a:t>(64,</a:t>
+            </a:r>
+            <a:r>
+              <a:rPr kumimoji="0" lang="en-US" sz="1200" b="0" i="0" u="none" strike="noStrike" kern="1200" cap="none" spc="0" normalizeH="0" baseline="0" noProof="0" dirty="0">
+                <a:ln>
+                  <a:noFill/>
+                </a:ln>
+                <a:solidFill>
+                  <a:srgbClr val="A5A5A5">
+                    <a:lumMod val="20000"/>
+                    <a:lumOff val="80000"/>
+                  </a:srgbClr>
+                </a:solidFill>
+                <a:effectLst/>
+                <a:uLnTx/>
+                <a:uFillTx/>
+                <a:latin typeface="Calibri" panose="020F0502020204030204"/>
+                <a:ea typeface="SimHei" panose="02010609060101010101" pitchFamily="49" charset="-122"/>
+                <a:cs typeface="+mn-cs"/>
+              </a:rPr>
+              <a:t>aaaaaa</a:t>
+            </a:r>
+            <a:r>
+              <a:rPr kumimoji="0" lang="en-US" sz="1200" b="0" i="0" u="none" strike="noStrike" kern="1200" cap="none" spc="0" normalizeH="0" baseline="0" noProof="0" dirty="0">
+                <a:ln>
+                  <a:noFill/>
+                </a:ln>
+                <a:solidFill>
+                  <a:prstClr val="black"/>
+                </a:solidFill>
+                <a:effectLst/>
+                <a:uLnTx/>
+                <a:uFillTx/>
+                <a:latin typeface="Calibri" panose="020F0502020204030204"/>
+                <a:ea typeface="SimHei" panose="02010609060101010101" pitchFamily="49" charset="-122"/>
+                <a:cs typeface="+mn-cs"/>
+              </a:rPr>
+              <a:t>, P99 &lt; 2ms), P=3         </a:t>
             </a:r>
           </a:p>
         </p:txBody>
@@ -4066,7 +4279,7 @@
         </p:nvSpPr>
         <p:spPr>
           <a:xfrm>
-            <a:off x="6936741" y="4619181"/>
+            <a:off x="6952372" y="2744681"/>
             <a:ext cx="2041236" cy="461818"/>
           </a:xfrm>
           <a:prstGeom prst="roundRect">
@@ -4099,15 +4312,76 @@
           <a:bodyPr rtlCol="0" anchor="ctr"/>
           <a:lstStyle/>
           <a:p>
-            <a:pPr algn="ctr"/>
-            <a:r>
-              <a:rPr lang="en-US" sz="1200" dirty="0">
+            <a:pPr marL="0" marR="0" lvl="0" indent="0" algn="ctr" defTabSz="914400" rtl="0" eaLnBrk="1" fontAlgn="auto" latinLnBrk="0" hangingPunct="1">
+              <a:lnSpc>
+                <a:spcPct val="100000"/>
+              </a:lnSpc>
+              <a:spcBef>
+                <a:spcPts val="0"/>
+              </a:spcBef>
+              <a:spcAft>
+                <a:spcPts val="0"/>
+              </a:spcAft>
+              <a:buClrTx/>
+              <a:buSzTx/>
+              <a:buFontTx/>
+              <a:buNone/>
+              <a:tabLst/>
+              <a:defRPr/>
+            </a:pPr>
+            <a:r>
+              <a:rPr kumimoji="0" lang="en-US" sz="1200" b="0" i="0" u="none" strike="noStrike" kern="1200" cap="none" spc="0" normalizeH="0" baseline="0" noProof="0" dirty="0">
+                <a:ln>
+                  <a:noFill/>
+                </a:ln>
                 <a:solidFill>
-                  <a:schemeClr val="tx1"/>
+                  <a:prstClr val="black"/>
                 </a:solidFill>
+                <a:effectLst/>
+                <a:uLnTx/>
+                <a:uFillTx/>
+                <a:latin typeface="Calibri" panose="020F0502020204030204"/>
                 <a:ea typeface="SimHei" panose="02010609060101010101" pitchFamily="49" charset="-122"/>
+                <a:cs typeface="+mn-cs"/>
               </a:rPr>
-              <a:t>(16,            , P95 &lt; 2ms), P=1         </a:t>
+              <a:t>(16,</a:t>
+            </a:r>
+            <a:r>
+              <a:rPr kumimoji="0" lang="en-US" sz="1200" b="0" i="0" u="none" strike="noStrike" kern="1200" cap="none" spc="0" normalizeH="0" baseline="0" noProof="0" dirty="0">
+                <a:ln>
+                  <a:noFill/>
+                </a:ln>
+                <a:solidFill>
+                  <a:srgbClr val="A5A5A5">
+                    <a:lumMod val="20000"/>
+                    <a:lumOff val="80000"/>
+                  </a:srgbClr>
+                </a:solidFill>
+                <a:effectLst/>
+                <a:uLnTx/>
+                <a:uFillTx/>
+                <a:latin typeface="Calibri" panose="020F0502020204030204"/>
+                <a:ea typeface="SimHei" panose="02010609060101010101" pitchFamily="49" charset="-122"/>
+                <a:cs typeface="+mn-cs"/>
+              </a:rPr>
+              <a:t>aaaaaa</a:t>
+            </a:r>
+            <a:r>
+              <a:rPr kumimoji="0" lang="en-US" sz="1200" b="0" i="0" u="none" strike="noStrike" kern="1200" cap="none" spc="0" normalizeH="0" baseline="0" noProof="0" dirty="0">
+                <a:ln>
+                  <a:noFill/>
+                </a:ln>
+                <a:solidFill>
+                  <a:prstClr val="black"/>
+                </a:solidFill>
+                <a:effectLst/>
+                <a:uLnTx/>
+                <a:uFillTx/>
+                <a:latin typeface="Calibri" panose="020F0502020204030204"/>
+                <a:ea typeface="SimHei" panose="02010609060101010101" pitchFamily="49" charset="-122"/>
+                <a:cs typeface="+mn-cs"/>
+              </a:rPr>
+              <a:t>, P95 &lt; 2ms), P=1         </a:t>
             </a:r>
           </a:p>
         </p:txBody>
@@ -4159,15 +4433,76 @@
           <a:bodyPr rtlCol="0" anchor="ctr"/>
           <a:lstStyle/>
           <a:p>
-            <a:pPr algn="ctr"/>
-            <a:r>
-              <a:rPr lang="en-US" sz="1200" dirty="0">
+            <a:pPr marL="0" marR="0" lvl="0" indent="0" algn="ctr" defTabSz="914400" rtl="0" eaLnBrk="1" fontAlgn="auto" latinLnBrk="0" hangingPunct="1">
+              <a:lnSpc>
+                <a:spcPct val="100000"/>
+              </a:lnSpc>
+              <a:spcBef>
+                <a:spcPts val="0"/>
+              </a:spcBef>
+              <a:spcAft>
+                <a:spcPts val="0"/>
+              </a:spcAft>
+              <a:buClrTx/>
+              <a:buSzTx/>
+              <a:buFontTx/>
+              <a:buNone/>
+              <a:tabLst/>
+              <a:defRPr/>
+            </a:pPr>
+            <a:r>
+              <a:rPr kumimoji="0" lang="en-US" sz="1200" b="0" i="0" u="none" strike="noStrike" kern="1200" cap="none" spc="0" normalizeH="0" baseline="0" noProof="0" dirty="0">
+                <a:ln>
+                  <a:noFill/>
+                </a:ln>
                 <a:solidFill>
-                  <a:schemeClr val="tx1"/>
+                  <a:prstClr val="black"/>
                 </a:solidFill>
+                <a:effectLst/>
+                <a:uLnTx/>
+                <a:uFillTx/>
+                <a:latin typeface="Calibri" panose="020F0502020204030204"/>
                 <a:ea typeface="SimHei" panose="02010609060101010101" pitchFamily="49" charset="-122"/>
+                <a:cs typeface="+mn-cs"/>
               </a:rPr>
-              <a:t>(40,            , P95 &lt; 2ms)         </a:t>
+              <a:t>(40,</a:t>
+            </a:r>
+            <a:r>
+              <a:rPr kumimoji="0" lang="en-US" sz="1200" b="0" i="0" u="none" strike="noStrike" kern="1200" cap="none" spc="0" normalizeH="0" baseline="0" noProof="0" dirty="0">
+                <a:ln>
+                  <a:noFill/>
+                </a:ln>
+                <a:solidFill>
+                  <a:srgbClr val="A5A5A5">
+                    <a:lumMod val="20000"/>
+                    <a:lumOff val="80000"/>
+                  </a:srgbClr>
+                </a:solidFill>
+                <a:effectLst/>
+                <a:uLnTx/>
+                <a:uFillTx/>
+                <a:latin typeface="Calibri" panose="020F0502020204030204"/>
+                <a:ea typeface="SimHei" panose="02010609060101010101" pitchFamily="49" charset="-122"/>
+                <a:cs typeface="+mn-cs"/>
+              </a:rPr>
+              <a:t>aaaaaa</a:t>
+            </a:r>
+            <a:r>
+              <a:rPr kumimoji="0" lang="en-US" sz="1200" b="0" i="0" u="none" strike="noStrike" kern="1200" cap="none" spc="0" normalizeH="0" baseline="0" noProof="0" dirty="0">
+                <a:ln>
+                  <a:noFill/>
+                </a:ln>
+                <a:solidFill>
+                  <a:prstClr val="black"/>
+                </a:solidFill>
+                <a:effectLst/>
+                <a:uLnTx/>
+                <a:uFillTx/>
+                <a:latin typeface="Calibri" panose="020F0502020204030204"/>
+                <a:ea typeface="SimHei" panose="02010609060101010101" pitchFamily="49" charset="-122"/>
+                <a:cs typeface="+mn-cs"/>
+              </a:rPr>
+              <a:t>, P95 &lt; 2ms)         </a:t>
             </a:r>
           </a:p>
         </p:txBody>
@@ -4203,7 +4538,7 @@
         </p:blipFill>
         <p:spPr>
           <a:xfrm>
-            <a:off x="7250776" y="3958062"/>
+            <a:off x="7286255" y="4522999"/>
             <a:ext cx="548640" cy="548640"/>
           </a:xfrm>
           <a:prstGeom prst="rect">
@@ -4242,7 +4577,7 @@
         </p:blipFill>
         <p:spPr>
           <a:xfrm>
-            <a:off x="7250776" y="3383588"/>
+            <a:off x="7286255" y="3934012"/>
             <a:ext cx="548640" cy="548640"/>
           </a:xfrm>
           <a:prstGeom prst="rect">
@@ -4281,7 +4616,7 @@
         </p:blipFill>
         <p:spPr>
           <a:xfrm>
-            <a:off x="2594121" y="3030968"/>
+            <a:off x="2570672" y="3030968"/>
             <a:ext cx="548640" cy="548640"/>
           </a:xfrm>
           <a:prstGeom prst="rect">
@@ -4320,7 +4655,7 @@
         </p:blipFill>
         <p:spPr>
           <a:xfrm>
-            <a:off x="7250776" y="4588006"/>
+            <a:off x="7286255" y="2720999"/>
             <a:ext cx="548640" cy="548640"/>
           </a:xfrm>
           <a:prstGeom prst="rect">
@@ -4375,15 +4710,76 @@
           <a:bodyPr rtlCol="0" anchor="ctr"/>
           <a:lstStyle/>
           <a:p>
-            <a:pPr algn="ctr"/>
-            <a:r>
-              <a:rPr lang="en-US" sz="1200" dirty="0">
+            <a:pPr marL="0" marR="0" lvl="0" indent="0" algn="ctr" defTabSz="914400" rtl="0" eaLnBrk="1" fontAlgn="auto" latinLnBrk="0" hangingPunct="1">
+              <a:lnSpc>
+                <a:spcPct val="100000"/>
+              </a:lnSpc>
+              <a:spcBef>
+                <a:spcPts val="0"/>
+              </a:spcBef>
+              <a:spcAft>
+                <a:spcPts val="0"/>
+              </a:spcAft>
+              <a:buClrTx/>
+              <a:buSzTx/>
+              <a:buFontTx/>
+              <a:buNone/>
+              <a:tabLst/>
+              <a:defRPr/>
+            </a:pPr>
+            <a:r>
+              <a:rPr kumimoji="0" lang="en-US" sz="1200" b="0" i="0" u="none" strike="noStrike" kern="1200" cap="none" spc="0" normalizeH="0" baseline="0" noProof="0" dirty="0">
+                <a:ln>
+                  <a:noFill/>
+                </a:ln>
                 <a:solidFill>
-                  <a:schemeClr val="tx1"/>
+                  <a:prstClr val="black"/>
                 </a:solidFill>
+                <a:effectLst/>
+                <a:uLnTx/>
+                <a:uFillTx/>
+                <a:latin typeface="Calibri" panose="020F0502020204030204"/>
                 <a:ea typeface="SimHei" panose="02010609060101010101" pitchFamily="49" charset="-122"/>
+                <a:cs typeface="+mn-cs"/>
               </a:rPr>
-              <a:t>(32,            , P90 &lt; 2ms)         </a:t>
+              <a:t>(32,</a:t>
+            </a:r>
+            <a:r>
+              <a:rPr kumimoji="0" lang="en-US" sz="1200" b="0" i="0" u="none" strike="noStrike" kern="1200" cap="none" spc="0" normalizeH="0" baseline="0" noProof="0" dirty="0">
+                <a:ln>
+                  <a:noFill/>
+                </a:ln>
+                <a:solidFill>
+                  <a:srgbClr val="70AD47">
+                    <a:lumMod val="20000"/>
+                    <a:lumOff val="80000"/>
+                  </a:srgbClr>
+                </a:solidFill>
+                <a:effectLst/>
+                <a:uLnTx/>
+                <a:uFillTx/>
+                <a:latin typeface="Calibri" panose="020F0502020204030204"/>
+                <a:ea typeface="SimHei" panose="02010609060101010101" pitchFamily="49" charset="-122"/>
+                <a:cs typeface="+mn-cs"/>
+              </a:rPr>
+              <a:t>aaaaaa</a:t>
+            </a:r>
+            <a:r>
+              <a:rPr kumimoji="0" lang="en-US" sz="1200" b="0" i="0" u="none" strike="noStrike" kern="1200" cap="none" spc="0" normalizeH="0" baseline="0" noProof="0" dirty="0">
+                <a:ln>
+                  <a:noFill/>
+                </a:ln>
+                <a:solidFill>
+                  <a:prstClr val="black"/>
+                </a:solidFill>
+                <a:effectLst/>
+                <a:uLnTx/>
+                <a:uFillTx/>
+                <a:latin typeface="Calibri" panose="020F0502020204030204"/>
+                <a:ea typeface="SimHei" panose="02010609060101010101" pitchFamily="49" charset="-122"/>
+                <a:cs typeface="+mn-cs"/>
+              </a:rPr>
+              <a:t>, P90 &lt; 2ms)         </a:t>
             </a:r>
           </a:p>
         </p:txBody>
@@ -4435,15 +4831,76 @@
           <a:bodyPr rtlCol="0" anchor="ctr"/>
           <a:lstStyle/>
           <a:p>
-            <a:pPr algn="ctr"/>
-            <a:r>
-              <a:rPr lang="en-US" sz="1200" dirty="0">
+            <a:pPr marL="0" marR="0" lvl="0" indent="0" algn="ctr" defTabSz="914400" rtl="0" eaLnBrk="1" fontAlgn="auto" latinLnBrk="0" hangingPunct="1">
+              <a:lnSpc>
+                <a:spcPct val="100000"/>
+              </a:lnSpc>
+              <a:spcBef>
+                <a:spcPts val="0"/>
+              </a:spcBef>
+              <a:spcAft>
+                <a:spcPts val="0"/>
+              </a:spcAft>
+              <a:buClrTx/>
+              <a:buSzTx/>
+              <a:buFontTx/>
+              <a:buNone/>
+              <a:tabLst/>
+              <a:defRPr/>
+            </a:pPr>
+            <a:r>
+              <a:rPr kumimoji="0" lang="en-US" sz="1200" b="0" i="0" u="none" strike="noStrike" kern="1200" cap="none" spc="0" normalizeH="0" baseline="0" noProof="0" dirty="0">
+                <a:ln>
+                  <a:noFill/>
+                </a:ln>
                 <a:solidFill>
-                  <a:schemeClr val="tx1"/>
+                  <a:prstClr val="black"/>
                 </a:solidFill>
+                <a:effectLst/>
+                <a:uLnTx/>
+                <a:uFillTx/>
+                <a:latin typeface="Calibri" panose="020F0502020204030204"/>
                 <a:ea typeface="SimHei" panose="02010609060101010101" pitchFamily="49" charset="-122"/>
+                <a:cs typeface="+mn-cs"/>
               </a:rPr>
-              <a:t>(80,            , P99 &lt; 2ms)         </a:t>
+              <a:t>(80,</a:t>
+            </a:r>
+            <a:r>
+              <a:rPr kumimoji="0" lang="en-US" sz="1200" b="0" i="0" u="none" strike="noStrike" kern="1200" cap="none" spc="0" normalizeH="0" baseline="0" noProof="0" dirty="0">
+                <a:ln>
+                  <a:noFill/>
+                </a:ln>
+                <a:solidFill>
+                  <a:srgbClr val="A5A5A5">
+                    <a:lumMod val="20000"/>
+                    <a:lumOff val="80000"/>
+                  </a:srgbClr>
+                </a:solidFill>
+                <a:effectLst/>
+                <a:uLnTx/>
+                <a:uFillTx/>
+                <a:latin typeface="Calibri" panose="020F0502020204030204"/>
+                <a:ea typeface="SimHei" panose="02010609060101010101" pitchFamily="49" charset="-122"/>
+                <a:cs typeface="+mn-cs"/>
+              </a:rPr>
+              <a:t>aaaaaa</a:t>
+            </a:r>
+            <a:r>
+              <a:rPr kumimoji="0" lang="en-US" sz="1200" b="0" i="0" u="none" strike="noStrike" kern="1200" cap="none" spc="0" normalizeH="0" baseline="0" noProof="0" dirty="0">
+                <a:ln>
+                  <a:noFill/>
+                </a:ln>
+                <a:solidFill>
+                  <a:prstClr val="black"/>
+                </a:solidFill>
+                <a:effectLst/>
+                <a:uLnTx/>
+                <a:uFillTx/>
+                <a:latin typeface="Calibri" panose="020F0502020204030204"/>
+                <a:ea typeface="SimHei" panose="02010609060101010101" pitchFamily="49" charset="-122"/>
+                <a:cs typeface="+mn-cs"/>
+              </a:rPr>
+              <a:t>, P99 &lt; 2ms)         </a:t>
             </a:r>
           </a:p>
         </p:txBody>
@@ -4479,7 +4936,7 @@
         </p:blipFill>
         <p:spPr>
           <a:xfrm>
-            <a:off x="2594121" y="3681613"/>
+            <a:off x="2570672" y="3681613"/>
             <a:ext cx="548640" cy="548640"/>
           </a:xfrm>
           <a:prstGeom prst="rect">
@@ -4518,7 +4975,7 @@
         </p:blipFill>
         <p:spPr>
           <a:xfrm>
-            <a:off x="2588581" y="4332258"/>
+            <a:off x="2570672" y="4321179"/>
             <a:ext cx="548640" cy="548640"/>
           </a:xfrm>
           <a:prstGeom prst="rect">
@@ -4573,23 +5030,53 @@
           <a:bodyPr rtlCol="0" anchor="ctr"/>
           <a:lstStyle/>
           <a:p>
-            <a:pPr algn="ctr"/>
-            <a:r>
-              <a:rPr lang="zh-CN" altLang="en-US" sz="1200" dirty="0">
+            <a:pPr marL="0" marR="0" lvl="0" indent="0" algn="ctr" defTabSz="914400" rtl="0" eaLnBrk="1" fontAlgn="auto" latinLnBrk="0" hangingPunct="1">
+              <a:lnSpc>
+                <a:spcPct val="100000"/>
+              </a:lnSpc>
+              <a:spcBef>
+                <a:spcPts val="0"/>
+              </a:spcBef>
+              <a:spcAft>
+                <a:spcPts val="0"/>
+              </a:spcAft>
+              <a:buClrTx/>
+              <a:buSzTx/>
+              <a:buFontTx/>
+              <a:buNone/>
+              <a:tabLst/>
+              <a:defRPr/>
+            </a:pPr>
+            <a:r>
+              <a:rPr kumimoji="0" lang="zh-CN" altLang="en-US" sz="1200" b="0" i="0" u="none" strike="noStrike" kern="1200" cap="none" spc="0" normalizeH="0" baseline="0" noProof="0" dirty="0">
+                <a:ln>
+                  <a:noFill/>
+                </a:ln>
                 <a:solidFill>
-                  <a:schemeClr val="tx1"/>
+                  <a:prstClr val="black"/>
                 </a:solidFill>
+                <a:effectLst/>
+                <a:uLnTx/>
+                <a:uFillTx/>
                 <a:latin typeface="SimHei" panose="02010609060101010101" pitchFamily="49" charset="-122"/>
                 <a:ea typeface="SimHei" panose="02010609060101010101" pitchFamily="49" charset="-122"/>
+                <a:cs typeface="+mn-cs"/>
               </a:rPr>
               <a:t>客户端</a:t>
             </a:r>
-            <a:endParaRPr lang="en-US" sz="1200" dirty="0">
+            <a:endParaRPr kumimoji="0" lang="en-US" sz="1200" b="0" i="0" u="none" strike="noStrike" kern="1200" cap="none" spc="0" normalizeH="0" baseline="0" noProof="0" dirty="0">
+              <a:ln>
+                <a:noFill/>
+              </a:ln>
               <a:solidFill>
-                <a:schemeClr val="tx1"/>
+                <a:prstClr val="black"/>
               </a:solidFill>
+              <a:effectLst/>
+              <a:uLnTx/>
+              <a:uFillTx/>
               <a:latin typeface="SimHei" panose="02010609060101010101" pitchFamily="49" charset="-122"/>
               <a:ea typeface="SimHei" panose="02010609060101010101" pitchFamily="49" charset="-122"/>
+              <a:cs typeface="+mn-cs"/>
             </a:endParaRPr>
           </a:p>
         </p:txBody>
@@ -4641,23 +5128,53 @@
           <a:bodyPr rtlCol="0" anchor="ctr"/>
           <a:lstStyle/>
           <a:p>
-            <a:pPr algn="ctr"/>
-            <a:r>
-              <a:rPr lang="zh-CN" altLang="en-US" sz="1200" dirty="0">
+            <a:pPr marL="0" marR="0" lvl="0" indent="0" algn="ctr" defTabSz="914400" rtl="0" eaLnBrk="1" fontAlgn="auto" latinLnBrk="0" hangingPunct="1">
+              <a:lnSpc>
+                <a:spcPct val="100000"/>
+              </a:lnSpc>
+              <a:spcBef>
+                <a:spcPts val="0"/>
+              </a:spcBef>
+              <a:spcAft>
+                <a:spcPts val="0"/>
+              </a:spcAft>
+              <a:buClrTx/>
+              <a:buSzTx/>
+              <a:buFontTx/>
+              <a:buNone/>
+              <a:tabLst/>
+              <a:defRPr/>
+            </a:pPr>
+            <a:r>
+              <a:rPr kumimoji="0" lang="zh-CN" altLang="en-US" sz="1200" b="0" i="0" u="none" strike="noStrike" kern="1200" cap="none" spc="0" normalizeH="0" baseline="0" noProof="0" dirty="0">
+                <a:ln>
+                  <a:noFill/>
+                </a:ln>
                 <a:solidFill>
-                  <a:schemeClr val="tx1"/>
+                  <a:prstClr val="black"/>
                 </a:solidFill>
+                <a:effectLst/>
+                <a:uLnTx/>
+                <a:uFillTx/>
                 <a:latin typeface="SimHei" panose="02010609060101010101" pitchFamily="49" charset="-122"/>
                 <a:ea typeface="SimHei" panose="02010609060101010101" pitchFamily="49" charset="-122"/>
+                <a:cs typeface="+mn-cs"/>
               </a:rPr>
               <a:t>客户端</a:t>
             </a:r>
-            <a:endParaRPr lang="en-US" sz="1200" dirty="0">
+            <a:endParaRPr kumimoji="0" lang="en-US" sz="1200" b="0" i="0" u="none" strike="noStrike" kern="1200" cap="none" spc="0" normalizeH="0" baseline="0" noProof="0" dirty="0">
+              <a:ln>
+                <a:noFill/>
+              </a:ln>
               <a:solidFill>
-                <a:schemeClr val="tx1"/>
+                <a:prstClr val="black"/>
               </a:solidFill>
+              <a:effectLst/>
+              <a:uLnTx/>
+              <a:uFillTx/>
               <a:latin typeface="SimHei" panose="02010609060101010101" pitchFamily="49" charset="-122"/>
               <a:ea typeface="SimHei" panose="02010609060101010101" pitchFamily="49" charset="-122"/>
+              <a:cs typeface="+mn-cs"/>
             </a:endParaRPr>
           </a:p>
         </p:txBody>
@@ -4709,23 +5226,53 @@
           <a:bodyPr rtlCol="0" anchor="ctr"/>
           <a:lstStyle/>
           <a:p>
-            <a:pPr algn="ctr"/>
-            <a:r>
-              <a:rPr lang="zh-CN" altLang="en-US" sz="1200" dirty="0">
+            <a:pPr marL="0" marR="0" lvl="0" indent="0" algn="ctr" defTabSz="914400" rtl="0" eaLnBrk="1" fontAlgn="auto" latinLnBrk="0" hangingPunct="1">
+              <a:lnSpc>
+                <a:spcPct val="100000"/>
+              </a:lnSpc>
+              <a:spcBef>
+                <a:spcPts val="0"/>
+              </a:spcBef>
+              <a:spcAft>
+                <a:spcPts val="0"/>
+              </a:spcAft>
+              <a:buClrTx/>
+              <a:buSzTx/>
+              <a:buFontTx/>
+              <a:buNone/>
+              <a:tabLst/>
+              <a:defRPr/>
+            </a:pPr>
+            <a:r>
+              <a:rPr kumimoji="0" lang="zh-CN" altLang="en-US" sz="1200" b="0" i="0" u="none" strike="noStrike" kern="1200" cap="none" spc="0" normalizeH="0" baseline="0" noProof="0" dirty="0">
+                <a:ln>
+                  <a:noFill/>
+                </a:ln>
                 <a:solidFill>
-                  <a:schemeClr val="tx1"/>
+                  <a:prstClr val="black"/>
                 </a:solidFill>
+                <a:effectLst/>
+                <a:uLnTx/>
+                <a:uFillTx/>
                 <a:latin typeface="SimHei" panose="02010609060101010101" pitchFamily="49" charset="-122"/>
                 <a:ea typeface="SimHei" panose="02010609060101010101" pitchFamily="49" charset="-122"/>
+                <a:cs typeface="+mn-cs"/>
               </a:rPr>
               <a:t>客户端</a:t>
             </a:r>
-            <a:endParaRPr lang="en-US" sz="1200" dirty="0">
+            <a:endParaRPr kumimoji="0" lang="en-US" sz="1200" b="0" i="0" u="none" strike="noStrike" kern="1200" cap="none" spc="0" normalizeH="0" baseline="0" noProof="0" dirty="0">
+              <a:ln>
+                <a:noFill/>
+              </a:ln>
               <a:solidFill>
-                <a:schemeClr val="tx1"/>
+                <a:prstClr val="black"/>
               </a:solidFill>
+              <a:effectLst/>
+              <a:uLnTx/>
+              <a:uFillTx/>
               <a:latin typeface="SimHei" panose="02010609060101010101" pitchFamily="49" charset="-122"/>
               <a:ea typeface="SimHei" panose="02010609060101010101" pitchFamily="49" charset="-122"/>
+              <a:cs typeface="+mn-cs"/>
             </a:endParaRPr>
           </a:p>
         </p:txBody>
@@ -4830,8 +5377,8 @@
         </p:nvCxnSpPr>
         <p:spPr>
           <a:xfrm flipV="1">
-            <a:off x="4842608" y="3062832"/>
-            <a:ext cx="1864209" cy="198724"/>
+            <a:off x="4842608" y="2903586"/>
+            <a:ext cx="1943968" cy="357970"/>
           </a:xfrm>
           <a:prstGeom prst="straightConnector1">
             <a:avLst/>
@@ -4925,16 +5472,53 @@
           </a:bodyPr>
           <a:lstStyle/>
           <a:p>
-            <a:r>
-              <a:rPr lang="zh-CN" altLang="en-US" dirty="0">
+            <a:pPr marL="0" marR="0" lvl="0" indent="0" algn="l" defTabSz="914400" rtl="0" eaLnBrk="1" fontAlgn="auto" latinLnBrk="0" hangingPunct="1">
+              <a:lnSpc>
+                <a:spcPct val="100000"/>
+              </a:lnSpc>
+              <a:spcBef>
+                <a:spcPts val="0"/>
+              </a:spcBef>
+              <a:spcAft>
+                <a:spcPts val="0"/>
+              </a:spcAft>
+              <a:buClrTx/>
+              <a:buSzTx/>
+              <a:buFontTx/>
+              <a:buNone/>
+              <a:tabLst/>
+              <a:defRPr/>
+            </a:pPr>
+            <a:r>
+              <a:rPr kumimoji="0" lang="zh-CN" altLang="en-US" sz="1800" b="0" i="0" u="none" strike="noStrike" kern="1200" cap="none" spc="0" normalizeH="0" baseline="0" noProof="0" dirty="0">
+                <a:ln>
+                  <a:noFill/>
+                </a:ln>
+                <a:solidFill>
+                  <a:prstClr val="black"/>
+                </a:solidFill>
+                <a:effectLst/>
+                <a:uLnTx/>
+                <a:uFillTx/>
                 <a:latin typeface="SimHei" panose="02010609060101010101" pitchFamily="49" charset="-122"/>
                 <a:ea typeface="SimHei" panose="02010609060101010101" pitchFamily="49" charset="-122"/>
+                <a:cs typeface="+mn-cs"/>
               </a:rPr>
               <a:t>租户</a:t>
             </a:r>
-            <a:endParaRPr lang="en-US" dirty="0">
+            <a:endParaRPr kumimoji="0" lang="en-US" sz="1800" b="0" i="0" u="none" strike="noStrike" kern="1200" cap="none" spc="0" normalizeH="0" baseline="0" noProof="0" dirty="0">
+              <a:ln>
+                <a:noFill/>
+              </a:ln>
+              <a:solidFill>
+                <a:prstClr val="black"/>
+              </a:solidFill>
+              <a:effectLst/>
+              <a:uLnTx/>
+              <a:uFillTx/>
               <a:latin typeface="SimHei" panose="02010609060101010101" pitchFamily="49" charset="-122"/>
               <a:ea typeface="SimHei" panose="02010609060101010101" pitchFamily="49" charset="-122"/>
+              <a:cs typeface="+mn-cs"/>
             </a:endParaRPr>
           </a:p>
         </p:txBody>
@@ -4967,16 +5551,53 @@
           </a:bodyPr>
           <a:lstStyle/>
           <a:p>
-            <a:r>
-              <a:rPr lang="zh-CN" altLang="en-US" dirty="0">
+            <a:pPr marL="0" marR="0" lvl="0" indent="0" algn="l" defTabSz="914400" rtl="0" eaLnBrk="1" fontAlgn="auto" latinLnBrk="0" hangingPunct="1">
+              <a:lnSpc>
+                <a:spcPct val="100000"/>
+              </a:lnSpc>
+              <a:spcBef>
+                <a:spcPts val="0"/>
+              </a:spcBef>
+              <a:spcAft>
+                <a:spcPts val="0"/>
+              </a:spcAft>
+              <a:buClrTx/>
+              <a:buSzTx/>
+              <a:buFontTx/>
+              <a:buNone/>
+              <a:tabLst/>
+              <a:defRPr/>
+            </a:pPr>
+            <a:r>
+              <a:rPr kumimoji="0" lang="zh-CN" altLang="en-US" sz="1800" b="0" i="0" u="none" strike="noStrike" kern="1200" cap="none" spc="0" normalizeH="0" baseline="0" noProof="0" dirty="0">
+                <a:ln>
+                  <a:noFill/>
+                </a:ln>
+                <a:solidFill>
+                  <a:prstClr val="black"/>
+                </a:solidFill>
+                <a:effectLst/>
+                <a:uLnTx/>
+                <a:uFillTx/>
                 <a:latin typeface="SimHei" panose="02010609060101010101" pitchFamily="49" charset="-122"/>
                 <a:ea typeface="SimHei" panose="02010609060101010101" pitchFamily="49" charset="-122"/>
+                <a:cs typeface="+mn-cs"/>
               </a:rPr>
               <a:t>存储单元</a:t>
             </a:r>
-            <a:endParaRPr lang="en-US" dirty="0">
+            <a:endParaRPr kumimoji="0" lang="en-US" sz="1800" b="0" i="0" u="none" strike="noStrike" kern="1200" cap="none" spc="0" normalizeH="0" baseline="0" noProof="0" dirty="0">
+              <a:ln>
+                <a:noFill/>
+              </a:ln>
+              <a:solidFill>
+                <a:prstClr val="black"/>
+              </a:solidFill>
+              <a:effectLst/>
+              <a:uLnTx/>
+              <a:uFillTx/>
               <a:latin typeface="SimHei" panose="02010609060101010101" pitchFamily="49" charset="-122"/>
               <a:ea typeface="SimHei" panose="02010609060101010101" pitchFamily="49" charset="-122"/>
+              <a:cs typeface="+mn-cs"/>
             </a:endParaRPr>
           </a:p>
         </p:txBody>
@@ -5031,10 +5652,36 @@
           <a:bodyPr rtlCol="0" anchor="ctr"/>
           <a:lstStyle/>
           <a:p>
-            <a:pPr algn="ctr"/>
-            <a:endParaRPr lang="en-US">
+            <a:pPr marL="0" marR="0" lvl="0" indent="0" algn="ctr" defTabSz="914400" rtl="0" eaLnBrk="1" fontAlgn="auto" latinLnBrk="0" hangingPunct="1">
+              <a:lnSpc>
+                <a:spcPct val="100000"/>
+              </a:lnSpc>
+              <a:spcBef>
+                <a:spcPts val="0"/>
+              </a:spcBef>
+              <a:spcAft>
+                <a:spcPts val="0"/>
+              </a:spcAft>
+              <a:buClrTx/>
+              <a:buSzTx/>
+              <a:buFontTx/>
+              <a:buNone/>
+              <a:tabLst/>
+              <a:defRPr/>
+            </a:pPr>
+            <a:endParaRPr kumimoji="0" lang="en-US" sz="1800" b="0" i="0" u="none" strike="noStrike" kern="1200" cap="none" spc="0" normalizeH="0" baseline="0" noProof="0">
+              <a:ln>
+                <a:noFill/>
+              </a:ln>
+              <a:solidFill>
+                <a:prstClr val="white"/>
+              </a:solidFill>
+              <a:effectLst/>
+              <a:uLnTx/>
+              <a:uFillTx/>
               <a:latin typeface="SimHei" panose="02010609060101010101" pitchFamily="49" charset="-122"/>
               <a:ea typeface="SimHei" panose="02010609060101010101" pitchFamily="49" charset="-122"/>
+              <a:cs typeface="+mn-cs"/>
             </a:endParaRPr>
           </a:p>
         </p:txBody>
@@ -5053,7 +5700,7 @@
         </p:nvSpPr>
         <p:spPr>
           <a:xfrm>
-            <a:off x="6872613" y="2714835"/>
+            <a:off x="6872613" y="2675278"/>
             <a:ext cx="2182168" cy="2421811"/>
           </a:xfrm>
           <a:prstGeom prst="rect">
@@ -5089,10 +5736,36 @@
           <a:bodyPr rtlCol="0" anchor="ctr"/>
           <a:lstStyle/>
           <a:p>
-            <a:pPr algn="ctr"/>
-            <a:endParaRPr lang="en-US">
+            <a:pPr marL="0" marR="0" lvl="0" indent="0" algn="ctr" defTabSz="914400" rtl="0" eaLnBrk="1" fontAlgn="auto" latinLnBrk="0" hangingPunct="1">
+              <a:lnSpc>
+                <a:spcPct val="100000"/>
+              </a:lnSpc>
+              <a:spcBef>
+                <a:spcPts val="0"/>
+              </a:spcBef>
+              <a:spcAft>
+                <a:spcPts val="0"/>
+              </a:spcAft>
+              <a:buClrTx/>
+              <a:buSzTx/>
+              <a:buFontTx/>
+              <a:buNone/>
+              <a:tabLst/>
+              <a:defRPr/>
+            </a:pPr>
+            <a:endParaRPr kumimoji="0" lang="en-US" sz="1800" b="0" i="0" u="none" strike="noStrike" kern="1200" cap="none" spc="0" normalizeH="0" baseline="0" noProof="0">
+              <a:ln>
+                <a:noFill/>
+              </a:ln>
+              <a:solidFill>
+                <a:prstClr val="white"/>
+              </a:solidFill>
+              <a:effectLst/>
+              <a:uLnTx/>
+              <a:uFillTx/>
               <a:latin typeface="SimHei" panose="02010609060101010101" pitchFamily="49" charset="-122"/>
               <a:ea typeface="SimHei" panose="02010609060101010101" pitchFamily="49" charset="-122"/>
+              <a:cs typeface="+mn-cs"/>
             </a:endParaRPr>
           </a:p>
         </p:txBody>
@@ -5125,53 +5798,104 @@
           </a:bodyPr>
           <a:lstStyle/>
           <a:p>
-            <a:pPr algn="ctr"/>
-            <a:r>
-              <a:rPr lang="en-US" altLang="zh-CN" sz="1200" dirty="0">
+            <a:pPr marL="0" marR="0" lvl="0" indent="0" algn="ctr" defTabSz="914400" rtl="0" eaLnBrk="1" fontAlgn="auto" latinLnBrk="0" hangingPunct="1">
+              <a:lnSpc>
+                <a:spcPct val="100000"/>
+              </a:lnSpc>
+              <a:spcBef>
+                <a:spcPts val="0"/>
+              </a:spcBef>
+              <a:spcAft>
+                <a:spcPts val="0"/>
+              </a:spcAft>
+              <a:buClrTx/>
+              <a:buSzTx/>
+              <a:buFontTx/>
+              <a:buNone/>
+              <a:tabLst/>
+              <a:defRPr/>
+            </a:pPr>
+            <a:r>
+              <a:rPr kumimoji="0" lang="en-US" altLang="zh-CN" sz="1200" b="0" i="0" u="none" strike="noStrike" kern="1200" cap="none" spc="0" normalizeH="0" baseline="0" noProof="0" dirty="0">
+                <a:ln>
+                  <a:noFill/>
+                </a:ln>
                 <a:solidFill>
-                  <a:schemeClr val="accent1"/>
+                  <a:srgbClr val="4472C4"/>
                 </a:solidFill>
+                <a:effectLst/>
+                <a:uLnTx/>
+                <a:uFillTx/>
                 <a:latin typeface="SimHei" panose="02010609060101010101" pitchFamily="49" charset="-122"/>
                 <a:ea typeface="SimHei" panose="02010609060101010101" pitchFamily="49" charset="-122"/>
+                <a:cs typeface="+mn-cs"/>
               </a:rPr>
               <a:t>1. </a:t>
             </a:r>
             <a:r>
-              <a:rPr lang="zh-CN" altLang="en-US" sz="1200" dirty="0">
+              <a:rPr kumimoji="0" lang="zh-CN" altLang="en-US" sz="1200" b="0" i="0" u="none" strike="noStrike" kern="1200" cap="none" spc="0" normalizeH="0" baseline="0" noProof="0" dirty="0">
+                <a:ln>
+                  <a:noFill/>
+                </a:ln>
                 <a:solidFill>
-                  <a:schemeClr val="accent1"/>
+                  <a:srgbClr val="4472C4"/>
                 </a:solidFill>
+                <a:effectLst/>
+                <a:uLnTx/>
+                <a:uFillTx/>
                 <a:latin typeface="SimHei" panose="02010609060101010101" pitchFamily="49" charset="-122"/>
                 <a:ea typeface="SimHei" panose="02010609060101010101" pitchFamily="49" charset="-122"/>
+                <a:cs typeface="+mn-cs"/>
               </a:rPr>
               <a:t>向控制器提出</a:t>
             </a:r>
             <a:r>
-              <a:rPr lang="en-US" altLang="zh-CN" sz="1200" dirty="0">
+              <a:rPr kumimoji="0" lang="en-US" altLang="zh-CN" sz="1200" b="0" i="0" u="none" strike="noStrike" kern="1200" cap="none" spc="0" normalizeH="0" baseline="0" noProof="0" dirty="0">
+                <a:ln>
+                  <a:noFill/>
+                </a:ln>
                 <a:solidFill>
-                  <a:schemeClr val="accent1"/>
+                  <a:srgbClr val="4472C4"/>
                 </a:solidFill>
+                <a:effectLst/>
+                <a:uLnTx/>
+                <a:uFillTx/>
                 <a:latin typeface="SimHei" panose="02010609060101010101" pitchFamily="49" charset="-122"/>
                 <a:ea typeface="SimHei" panose="02010609060101010101" pitchFamily="49" charset="-122"/>
+                <a:cs typeface="+mn-cs"/>
               </a:rPr>
               <a:t>SLA</a:t>
             </a:r>
             <a:r>
-              <a:rPr lang="zh-CN" altLang="en-US" sz="1200" dirty="0">
+              <a:rPr kumimoji="0" lang="zh-CN" altLang="en-US" sz="1200" b="0" i="0" u="none" strike="noStrike" kern="1200" cap="none" spc="0" normalizeH="0" baseline="0" noProof="0" dirty="0">
+                <a:ln>
+                  <a:noFill/>
+                </a:ln>
                 <a:solidFill>
-                  <a:schemeClr val="accent1"/>
+                  <a:srgbClr val="4472C4"/>
                 </a:solidFill>
+                <a:effectLst/>
+                <a:uLnTx/>
+                <a:uFillTx/>
                 <a:latin typeface="SimHei" panose="02010609060101010101" pitchFamily="49" charset="-122"/>
                 <a:ea typeface="SimHei" panose="02010609060101010101" pitchFamily="49" charset="-122"/>
+                <a:cs typeface="+mn-cs"/>
               </a:rPr>
               <a:t>需求</a:t>
             </a:r>
-            <a:endParaRPr lang="en-US" sz="1200" dirty="0">
+            <a:endParaRPr kumimoji="0" lang="en-US" sz="1200" b="0" i="0" u="none" strike="noStrike" kern="1200" cap="none" spc="0" normalizeH="0" baseline="0" noProof="0" dirty="0">
+              <a:ln>
+                <a:noFill/>
+              </a:ln>
               <a:solidFill>
-                <a:schemeClr val="accent1"/>
+                <a:srgbClr val="4472C4"/>
               </a:solidFill>
+              <a:effectLst/>
+              <a:uLnTx/>
+              <a:uFillTx/>
               <a:latin typeface="SimHei" panose="02010609060101010101" pitchFamily="49" charset="-122"/>
               <a:ea typeface="SimHei" panose="02010609060101010101" pitchFamily="49" charset="-122"/>
+              <a:cs typeface="+mn-cs"/>
             </a:endParaRPr>
           </a:p>
         </p:txBody>
@@ -5204,33 +5928,70 @@
           </a:bodyPr>
           <a:lstStyle/>
           <a:p>
-            <a:pPr algn="ctr"/>
-            <a:r>
-              <a:rPr lang="en-US" altLang="zh-CN" sz="1200" dirty="0">
+            <a:pPr marL="0" marR="0" lvl="0" indent="0" algn="ctr" defTabSz="914400" rtl="0" eaLnBrk="1" fontAlgn="auto" latinLnBrk="0" hangingPunct="1">
+              <a:lnSpc>
+                <a:spcPct val="100000"/>
+              </a:lnSpc>
+              <a:spcBef>
+                <a:spcPts val="0"/>
+              </a:spcBef>
+              <a:spcAft>
+                <a:spcPts val="0"/>
+              </a:spcAft>
+              <a:buClrTx/>
+              <a:buSzTx/>
+              <a:buFontTx/>
+              <a:buNone/>
+              <a:tabLst/>
+              <a:defRPr/>
+            </a:pPr>
+            <a:r>
+              <a:rPr kumimoji="0" lang="en-US" altLang="zh-CN" sz="1200" b="0" i="0" u="none" strike="noStrike" kern="1200" cap="none" spc="0" normalizeH="0" baseline="0" noProof="0" dirty="0">
+                <a:ln>
+                  <a:noFill/>
+                </a:ln>
                 <a:solidFill>
-                  <a:schemeClr val="accent1"/>
+                  <a:srgbClr val="4472C4"/>
                 </a:solidFill>
+                <a:effectLst/>
+                <a:uLnTx/>
+                <a:uFillTx/>
                 <a:latin typeface="SimHei" panose="02010609060101010101" pitchFamily="49" charset="-122"/>
                 <a:ea typeface="SimHei" panose="02010609060101010101" pitchFamily="49" charset="-122"/>
+                <a:cs typeface="+mn-cs"/>
               </a:rPr>
               <a:t>2. </a:t>
             </a:r>
             <a:r>
-              <a:rPr lang="zh-CN" altLang="en-US" sz="1200" dirty="0">
+              <a:rPr kumimoji="0" lang="zh-CN" altLang="en-US" sz="1200" b="0" i="0" u="none" strike="noStrike" kern="1200" cap="none" spc="0" normalizeH="0" baseline="0" noProof="0" dirty="0">
+                <a:ln>
+                  <a:noFill/>
+                </a:ln>
                 <a:solidFill>
-                  <a:schemeClr val="accent1"/>
+                  <a:srgbClr val="4472C4"/>
                 </a:solidFill>
+                <a:effectLst/>
+                <a:uLnTx/>
+                <a:uFillTx/>
                 <a:latin typeface="SimHei" panose="02010609060101010101" pitchFamily="49" charset="-122"/>
                 <a:ea typeface="SimHei" panose="02010609060101010101" pitchFamily="49" charset="-122"/>
+                <a:cs typeface="+mn-cs"/>
               </a:rPr>
               <a:t>计算数据分布方式</a:t>
             </a:r>
-            <a:endParaRPr lang="en-US" sz="1200" dirty="0">
+            <a:endParaRPr kumimoji="0" lang="en-US" sz="1200" b="0" i="0" u="none" strike="noStrike" kern="1200" cap="none" spc="0" normalizeH="0" baseline="0" noProof="0" dirty="0">
+              <a:ln>
+                <a:noFill/>
+              </a:ln>
               <a:solidFill>
-                <a:schemeClr val="accent1"/>
+                <a:srgbClr val="4472C4"/>
               </a:solidFill>
+              <a:effectLst/>
+              <a:uLnTx/>
+              <a:uFillTx/>
               <a:latin typeface="SimHei" panose="02010609060101010101" pitchFamily="49" charset="-122"/>
               <a:ea typeface="SimHei" panose="02010609060101010101" pitchFamily="49" charset="-122"/>
+              <a:cs typeface="+mn-cs"/>
             </a:endParaRPr>
           </a:p>
         </p:txBody>
@@ -5263,33 +6024,70 @@
           </a:bodyPr>
           <a:lstStyle/>
           <a:p>
-            <a:pPr algn="ctr"/>
-            <a:r>
-              <a:rPr lang="en-US" altLang="zh-CN" sz="1200" dirty="0">
+            <a:pPr marL="0" marR="0" lvl="0" indent="0" algn="ctr" defTabSz="914400" rtl="0" eaLnBrk="1" fontAlgn="auto" latinLnBrk="0" hangingPunct="1">
+              <a:lnSpc>
+                <a:spcPct val="100000"/>
+              </a:lnSpc>
+              <a:spcBef>
+                <a:spcPts val="0"/>
+              </a:spcBef>
+              <a:spcAft>
+                <a:spcPts val="0"/>
+              </a:spcAft>
+              <a:buClrTx/>
+              <a:buSzTx/>
+              <a:buFontTx/>
+              <a:buNone/>
+              <a:tabLst/>
+              <a:defRPr/>
+            </a:pPr>
+            <a:r>
+              <a:rPr kumimoji="0" lang="en-US" altLang="zh-CN" sz="1200" b="0" i="0" u="none" strike="noStrike" kern="1200" cap="none" spc="0" normalizeH="0" baseline="0" noProof="0" dirty="0">
+                <a:ln>
+                  <a:noFill/>
+                </a:ln>
                 <a:solidFill>
-                  <a:schemeClr val="accent1"/>
+                  <a:srgbClr val="4472C4"/>
                 </a:solidFill>
+                <a:effectLst/>
+                <a:uLnTx/>
+                <a:uFillTx/>
                 <a:latin typeface="SimHei" panose="02010609060101010101" pitchFamily="49" charset="-122"/>
                 <a:ea typeface="SimHei" panose="02010609060101010101" pitchFamily="49" charset="-122"/>
+                <a:cs typeface="+mn-cs"/>
               </a:rPr>
               <a:t>3. </a:t>
             </a:r>
             <a:r>
-              <a:rPr lang="zh-CN" altLang="en-US" sz="1200" dirty="0">
+              <a:rPr kumimoji="0" lang="zh-CN" altLang="en-US" sz="1200" b="0" i="0" u="none" strike="noStrike" kern="1200" cap="none" spc="0" normalizeH="0" baseline="0" noProof="0" dirty="0">
+                <a:ln>
+                  <a:noFill/>
+                </a:ln>
                 <a:solidFill>
-                  <a:schemeClr val="accent1"/>
+                  <a:srgbClr val="4472C4"/>
                 </a:solidFill>
+                <a:effectLst/>
+                <a:uLnTx/>
+                <a:uFillTx/>
                 <a:latin typeface="SimHei" panose="02010609060101010101" pitchFamily="49" charset="-122"/>
                 <a:ea typeface="SimHei" panose="02010609060101010101" pitchFamily="49" charset="-122"/>
+                <a:cs typeface="+mn-cs"/>
               </a:rPr>
               <a:t>启用新的存储单元</a:t>
             </a:r>
-            <a:endParaRPr lang="en-US" sz="1200" dirty="0">
+            <a:endParaRPr kumimoji="0" lang="en-US" sz="1200" b="0" i="0" u="none" strike="noStrike" kern="1200" cap="none" spc="0" normalizeH="0" baseline="0" noProof="0" dirty="0">
+              <a:ln>
+                <a:noFill/>
+              </a:ln>
               <a:solidFill>
-                <a:schemeClr val="accent1"/>
+                <a:srgbClr val="4472C4"/>
               </a:solidFill>
+              <a:effectLst/>
+              <a:uLnTx/>
+              <a:uFillTx/>
               <a:latin typeface="SimHei" panose="02010609060101010101" pitchFamily="49" charset="-122"/>
               <a:ea typeface="SimHei" panose="02010609060101010101" pitchFamily="49" charset="-122"/>
+              <a:cs typeface="+mn-cs"/>
             </a:endParaRPr>
           </a:p>
         </p:txBody>
@@ -5310,8 +6108,8 @@
         </p:nvCxnSpPr>
         <p:spPr>
           <a:xfrm>
-            <a:off x="4911687" y="4669092"/>
-            <a:ext cx="1795130" cy="235883"/>
+            <a:off x="4911687" y="4669093"/>
+            <a:ext cx="1874889" cy="91254"/>
           </a:xfrm>
           <a:prstGeom prst="straightConnector1">
             <a:avLst/>
@@ -5351,8 +6149,8 @@
         </p:nvCxnSpPr>
         <p:spPr>
           <a:xfrm flipV="1">
-            <a:off x="4911687" y="3681614"/>
-            <a:ext cx="1795130" cy="896303"/>
+            <a:off x="4911687" y="3634740"/>
+            <a:ext cx="1843775" cy="943179"/>
           </a:xfrm>
           <a:prstGeom prst="straightConnector1">
             <a:avLst/>
@@ -5404,53 +6202,120 @@
           </a:bodyPr>
           <a:lstStyle/>
           <a:p>
-            <a:pPr algn="ctr"/>
-            <a:r>
-              <a:rPr lang="en-US" altLang="zh-CN" sz="1200" dirty="0">
+            <a:pPr marL="0" marR="0" lvl="0" indent="0" algn="ctr" defTabSz="914400" rtl="0" eaLnBrk="1" fontAlgn="auto" latinLnBrk="0" hangingPunct="1">
+              <a:lnSpc>
+                <a:spcPct val="100000"/>
+              </a:lnSpc>
+              <a:spcBef>
+                <a:spcPts val="0"/>
+              </a:spcBef>
+              <a:spcAft>
+                <a:spcPts val="0"/>
+              </a:spcAft>
+              <a:buClrTx/>
+              <a:buSzTx/>
+              <a:buFontTx/>
+              <a:buNone/>
+              <a:tabLst/>
+              <a:defRPr/>
+            </a:pPr>
+            <a:r>
+              <a:rPr kumimoji="0" lang="en-US" altLang="zh-CN" sz="1200" b="0" i="0" u="none" strike="noStrike" kern="1200" cap="none" spc="0" normalizeH="0" baseline="0" noProof="0" dirty="0">
+                <a:ln>
+                  <a:noFill/>
+                </a:ln>
                 <a:solidFill>
-                  <a:schemeClr val="accent1"/>
+                  <a:srgbClr val="4472C4"/>
                 </a:solidFill>
+                <a:effectLst/>
+                <a:uLnTx/>
+                <a:uFillTx/>
                 <a:latin typeface="SimHei" panose="02010609060101010101" pitchFamily="49" charset="-122"/>
                 <a:ea typeface="SimHei" panose="02010609060101010101" pitchFamily="49" charset="-122"/>
+                <a:cs typeface="+mn-cs"/>
               </a:rPr>
               <a:t>4. </a:t>
             </a:r>
             <a:r>
-              <a:rPr lang="zh-CN" altLang="en-US" sz="1200" dirty="0">
+              <a:rPr kumimoji="0" lang="zh-CN" altLang="en-US" sz="1200" b="0" i="0" u="none" strike="noStrike" kern="1200" cap="none" spc="0" normalizeH="0" baseline="0" noProof="0" dirty="0">
+                <a:ln>
+                  <a:noFill/>
+                </a:ln>
                 <a:solidFill>
-                  <a:schemeClr val="accent1"/>
+                  <a:srgbClr val="4472C4"/>
                 </a:solidFill>
+                <a:effectLst/>
+                <a:uLnTx/>
+                <a:uFillTx/>
                 <a:latin typeface="SimHei" panose="02010609060101010101" pitchFamily="49" charset="-122"/>
                 <a:ea typeface="SimHei" panose="02010609060101010101" pitchFamily="49" charset="-122"/>
+                <a:cs typeface="+mn-cs"/>
               </a:rPr>
               <a:t>将数据块映射</a:t>
             </a:r>
-            <a:endParaRPr lang="en-US" altLang="zh-CN" sz="1200" dirty="0">
+            <a:endParaRPr kumimoji="0" lang="en-US" altLang="zh-CN" sz="1200" b="0" i="0" u="none" strike="noStrike" kern="1200" cap="none" spc="0" normalizeH="0" baseline="0" noProof="0" dirty="0">
+              <a:ln>
+                <a:noFill/>
+              </a:ln>
               <a:solidFill>
-                <a:schemeClr val="accent1"/>
+                <a:srgbClr val="4472C4"/>
               </a:solidFill>
+              <a:effectLst/>
+              <a:uLnTx/>
+              <a:uFillTx/>
               <a:latin typeface="SimHei" panose="02010609060101010101" pitchFamily="49" charset="-122"/>
               <a:ea typeface="SimHei" panose="02010609060101010101" pitchFamily="49" charset="-122"/>
+              <a:cs typeface="+mn-cs"/>
             </a:endParaRPr>
           </a:p>
           <a:p>
-            <a:pPr algn="ctr"/>
-            <a:r>
-              <a:rPr lang="zh-CN" altLang="en-US" sz="1200" dirty="0">
+            <a:pPr marL="0" marR="0" lvl="0" indent="0" algn="ctr" defTabSz="914400" rtl="0" eaLnBrk="1" fontAlgn="auto" latinLnBrk="0" hangingPunct="1">
+              <a:lnSpc>
+                <a:spcPct val="100000"/>
+              </a:lnSpc>
+              <a:spcBef>
+                <a:spcPts val="0"/>
+              </a:spcBef>
+              <a:spcAft>
+                <a:spcPts val="0"/>
+              </a:spcAft>
+              <a:buClrTx/>
+              <a:buSzTx/>
+              <a:buFontTx/>
+              <a:buNone/>
+              <a:tabLst/>
+              <a:defRPr/>
+            </a:pPr>
+            <a:r>
+              <a:rPr kumimoji="0" lang="zh-CN" altLang="en-US" sz="1200" b="0" i="0" u="none" strike="noStrike" kern="1200" cap="none" spc="0" normalizeH="0" baseline="0" noProof="0" dirty="0">
+                <a:ln>
+                  <a:noFill/>
+                </a:ln>
                 <a:solidFill>
-                  <a:schemeClr val="accent1"/>
+                  <a:srgbClr val="4472C4"/>
                 </a:solidFill>
+                <a:effectLst/>
+                <a:uLnTx/>
+                <a:uFillTx/>
                 <a:latin typeface="SimHei" panose="02010609060101010101" pitchFamily="49" charset="-122"/>
                 <a:ea typeface="SimHei" panose="02010609060101010101" pitchFamily="49" charset="-122"/>
+                <a:cs typeface="+mn-cs"/>
               </a:rPr>
               <a:t>方式返回给客户端</a:t>
             </a:r>
-            <a:endParaRPr lang="en-US" sz="1200" dirty="0">
+            <a:endParaRPr kumimoji="0" lang="en-US" sz="1200" b="0" i="0" u="none" strike="noStrike" kern="1200" cap="none" spc="0" normalizeH="0" baseline="0" noProof="0" dirty="0">
+              <a:ln>
+                <a:noFill/>
+              </a:ln>
               <a:solidFill>
-                <a:schemeClr val="accent1"/>
+                <a:srgbClr val="4472C4"/>
               </a:solidFill>
+              <a:effectLst/>
+              <a:uLnTx/>
+              <a:uFillTx/>
               <a:latin typeface="SimHei" panose="02010609060101010101" pitchFamily="49" charset="-122"/>
               <a:ea typeface="SimHei" panose="02010609060101010101" pitchFamily="49" charset="-122"/>
+              <a:cs typeface="+mn-cs"/>
             </a:endParaRPr>
           </a:p>
         </p:txBody>
@@ -5469,7 +6334,7 @@
         </p:nvSpPr>
         <p:spPr>
           <a:xfrm>
-            <a:off x="5035256" y="3449980"/>
+            <a:off x="4934373" y="3343432"/>
             <a:ext cx="1519358" cy="461665"/>
           </a:xfrm>
           <a:prstGeom prst="rect">
@@ -5483,43 +6348,103 @@
           </a:bodyPr>
           <a:lstStyle/>
           <a:p>
-            <a:pPr algn="ctr"/>
-            <a:r>
-              <a:rPr lang="zh-CN" altLang="en-US" sz="1200" dirty="0">
+            <a:pPr marL="0" marR="0" lvl="0" indent="0" algn="ctr" defTabSz="914400" rtl="0" eaLnBrk="1" fontAlgn="auto" latinLnBrk="0" hangingPunct="1">
+              <a:lnSpc>
+                <a:spcPct val="100000"/>
+              </a:lnSpc>
+              <a:spcBef>
+                <a:spcPts val="0"/>
+              </a:spcBef>
+              <a:spcAft>
+                <a:spcPts val="0"/>
+              </a:spcAft>
+              <a:buClrTx/>
+              <a:buSzTx/>
+              <a:buFontTx/>
+              <a:buNone/>
+              <a:tabLst/>
+              <a:defRPr/>
+            </a:pPr>
+            <a:r>
+              <a:rPr kumimoji="0" lang="zh-CN" altLang="en-US" sz="1200" b="0" i="0" u="none" strike="noStrike" kern="1200" cap="none" spc="0" normalizeH="0" baseline="0" noProof="0" dirty="0">
+                <a:ln>
+                  <a:noFill/>
+                </a:ln>
                 <a:solidFill>
-                  <a:schemeClr val="accent6"/>
+                  <a:srgbClr val="70AD47"/>
                 </a:solidFill>
+                <a:effectLst/>
+                <a:uLnTx/>
+                <a:uFillTx/>
                 <a:latin typeface="SimHei" panose="02010609060101010101" pitchFamily="49" charset="-122"/>
                 <a:ea typeface="SimHei" panose="02010609060101010101" pitchFamily="49" charset="-122"/>
+                <a:cs typeface="+mn-cs"/>
               </a:rPr>
               <a:t>根据数据块映射</a:t>
             </a:r>
-            <a:endParaRPr lang="en-US" altLang="zh-CN" sz="1200" dirty="0">
+            <a:endParaRPr kumimoji="0" lang="en-US" altLang="zh-CN" sz="1200" b="0" i="0" u="none" strike="noStrike" kern="1200" cap="none" spc="0" normalizeH="0" baseline="0" noProof="0" dirty="0">
+              <a:ln>
+                <a:noFill/>
+              </a:ln>
               <a:solidFill>
-                <a:schemeClr val="accent6"/>
+                <a:srgbClr val="70AD47"/>
               </a:solidFill>
+              <a:effectLst/>
+              <a:uLnTx/>
+              <a:uFillTx/>
               <a:latin typeface="SimHei" panose="02010609060101010101" pitchFamily="49" charset="-122"/>
               <a:ea typeface="SimHei" panose="02010609060101010101" pitchFamily="49" charset="-122"/>
+              <a:cs typeface="+mn-cs"/>
             </a:endParaRPr>
           </a:p>
           <a:p>
-            <a:pPr algn="ctr"/>
-            <a:r>
-              <a:rPr lang="zh-CN" altLang="en-US" sz="1200" dirty="0">
+            <a:pPr marL="0" marR="0" lvl="0" indent="0" algn="ctr" defTabSz="914400" rtl="0" eaLnBrk="1" fontAlgn="auto" latinLnBrk="0" hangingPunct="1">
+              <a:lnSpc>
+                <a:spcPct val="100000"/>
+              </a:lnSpc>
+              <a:spcBef>
+                <a:spcPts val="0"/>
+              </a:spcBef>
+              <a:spcAft>
+                <a:spcPts val="0"/>
+              </a:spcAft>
+              <a:buClrTx/>
+              <a:buSzTx/>
+              <a:buFontTx/>
+              <a:buNone/>
+              <a:tabLst/>
+              <a:defRPr/>
+            </a:pPr>
+            <a:r>
+              <a:rPr kumimoji="0" lang="zh-CN" altLang="en-US" sz="1200" b="0" i="0" u="none" strike="noStrike" kern="1200" cap="none" spc="0" normalizeH="0" baseline="0" noProof="0" dirty="0">
+                <a:ln>
+                  <a:noFill/>
+                </a:ln>
                 <a:solidFill>
-                  <a:schemeClr val="accent6"/>
+                  <a:srgbClr val="70AD47"/>
                 </a:solidFill>
+                <a:effectLst/>
+                <a:uLnTx/>
+                <a:uFillTx/>
                 <a:latin typeface="SimHei" panose="02010609060101010101" pitchFamily="49" charset="-122"/>
                 <a:ea typeface="SimHei" panose="02010609060101010101" pitchFamily="49" charset="-122"/>
+                <a:cs typeface="+mn-cs"/>
               </a:rPr>
               <a:t>方式访问存储单元</a:t>
             </a:r>
-            <a:endParaRPr lang="en-US" sz="1200" dirty="0">
+            <a:endParaRPr kumimoji="0" lang="en-US" sz="1200" b="0" i="0" u="none" strike="noStrike" kern="1200" cap="none" spc="0" normalizeH="0" baseline="0" noProof="0" dirty="0">
+              <a:ln>
+                <a:noFill/>
+              </a:ln>
               <a:solidFill>
-                <a:schemeClr val="accent6"/>
+                <a:srgbClr val="70AD47"/>
               </a:solidFill>
+              <a:effectLst/>
+              <a:uLnTx/>
+              <a:uFillTx/>
               <a:latin typeface="SimHei" panose="02010609060101010101" pitchFamily="49" charset="-122"/>
               <a:ea typeface="SimHei" panose="02010609060101010101" pitchFamily="49" charset="-122"/>
+              <a:cs typeface="+mn-cs"/>
             </a:endParaRPr>
           </a:p>
         </p:txBody>
@@ -5527,7 +6452,7 @@
     </p:spTree>
     <p:extLst>
       <p:ext uri="{BB962C8B-B14F-4D97-AF65-F5344CB8AC3E}">
-        <p14:creationId xmlns:p14="http://schemas.microsoft.com/office/powerpoint/2010/main" val="1812062908"/>
+        <p14:creationId xmlns:p14="http://schemas.microsoft.com/office/powerpoint/2010/main" val="2980270571"/>
       </p:ext>
     </p:extLst>
   </p:cSld>

</xml_diff>